<commit_message>
colour changes + images
</commit_message>
<xml_diff>
--- a/Shared Documentation/Luke's Documents/Clash of Cos - Visual Pitch.pptx
+++ b/Shared Documentation/Luke's Documents/Clash of Cos - Visual Pitch.pptx
@@ -13,25 +13,26 @@
     <p:sldId id="261" r:id="rId7"/>
     <p:sldId id="262" r:id="rId8"/>
     <p:sldId id="263" r:id="rId9"/>
-    <p:sldId id="264" r:id="rId10"/>
-    <p:sldId id="266" r:id="rId11"/>
-    <p:sldId id="265" r:id="rId12"/>
-    <p:sldId id="267" r:id="rId13"/>
-    <p:sldId id="268" r:id="rId14"/>
-    <p:sldId id="269" r:id="rId15"/>
-    <p:sldId id="270" r:id="rId16"/>
-    <p:sldId id="271" r:id="rId17"/>
-    <p:sldId id="272" r:id="rId18"/>
-    <p:sldId id="273" r:id="rId19"/>
-    <p:sldId id="274" r:id="rId20"/>
-    <p:sldId id="275" r:id="rId21"/>
-    <p:sldId id="277" r:id="rId22"/>
-    <p:sldId id="276" r:id="rId23"/>
-    <p:sldId id="279" r:id="rId24"/>
-    <p:sldId id="278" r:id="rId25"/>
-    <p:sldId id="282" r:id="rId26"/>
-    <p:sldId id="281" r:id="rId27"/>
-    <p:sldId id="283" r:id="rId28"/>
+    <p:sldId id="284" r:id="rId10"/>
+    <p:sldId id="264" r:id="rId11"/>
+    <p:sldId id="266" r:id="rId12"/>
+    <p:sldId id="265" r:id="rId13"/>
+    <p:sldId id="267" r:id="rId14"/>
+    <p:sldId id="268" r:id="rId15"/>
+    <p:sldId id="269" r:id="rId16"/>
+    <p:sldId id="270" r:id="rId17"/>
+    <p:sldId id="271" r:id="rId18"/>
+    <p:sldId id="272" r:id="rId19"/>
+    <p:sldId id="273" r:id="rId20"/>
+    <p:sldId id="274" r:id="rId21"/>
+    <p:sldId id="275" r:id="rId22"/>
+    <p:sldId id="277" r:id="rId23"/>
+    <p:sldId id="276" r:id="rId24"/>
+    <p:sldId id="279" r:id="rId25"/>
+    <p:sldId id="278" r:id="rId26"/>
+    <p:sldId id="282" r:id="rId27"/>
+    <p:sldId id="281" r:id="rId28"/>
+    <p:sldId id="283" r:id="rId29"/>
   </p:sldIdLst>
   <p:sldSz cx="12192000" cy="6858000"/>
   <p:notesSz cx="6858000" cy="9144000"/>
@@ -2965,10 +2966,10 @@
         <a:gradFill flip="none" rotWithShape="1">
           <a:gsLst>
             <a:gs pos="21000">
-              <a:srgbClr val="F5B038"/>
+              <a:srgbClr val="EE9D0C"/>
             </a:gs>
             <a:gs pos="19000">
-              <a:srgbClr val="30F2FF"/>
+              <a:srgbClr val="00D6B2"/>
             </a:gs>
           </a:gsLst>
           <a:lin ang="5400000" scaled="0"/>
@@ -3515,7 +3516,7 @@
     <p:bg>
       <p:bgPr>
         <a:solidFill>
-          <a:srgbClr val="30F2FF"/>
+          <a:srgbClr val="00D6B2"/>
         </a:solidFill>
         <a:effectLst/>
       </p:bgPr>
@@ -3665,7 +3666,7 @@
           <p:cNvPr id="2" name="Title 1">
             <a:extLst>
               <a:ext uri="{FF2B5EF4-FFF2-40B4-BE49-F238E27FC236}">
-                <a16:creationId xmlns:a16="http://schemas.microsoft.com/office/drawing/2014/main" id="{7E3CF829-2252-1E5B-5AEC-C997FB209DA5}"/>
+                <a16:creationId xmlns:a16="http://schemas.microsoft.com/office/drawing/2014/main" id="{F74824CB-C71E-86C0-6E64-408ECAB51A0F}"/>
               </a:ext>
             </a:extLst>
           </p:cNvPr>
@@ -3686,7 +3687,7 @@
                 <a:ea typeface="Calibri Light"/>
                 <a:cs typeface="Calibri Light"/>
               </a:rPr>
-              <a:t>Travel Gameplay/Mechanics</a:t>
+              <a:t>Interaction</a:t>
             </a:r>
             <a:endParaRPr lang="en-US" dirty="0"/>
           </a:p>
@@ -3697,7 +3698,7 @@
           <p:cNvPr id="3" name="Content Placeholder 2">
             <a:extLst>
               <a:ext uri="{FF2B5EF4-FFF2-40B4-BE49-F238E27FC236}">
-                <a16:creationId xmlns:a16="http://schemas.microsoft.com/office/drawing/2014/main" id="{BA748016-E1E6-A0C2-382D-8A1D056E5B65}"/>
+                <a16:creationId xmlns:a16="http://schemas.microsoft.com/office/drawing/2014/main" id="{72DEA321-32E2-440C-635F-BBC9E0E1A05F}"/>
               </a:ext>
             </a:extLst>
           </p:cNvPr>
@@ -3710,17 +3711,26 @@
         </p:nvSpPr>
         <p:spPr/>
         <p:txBody>
-          <a:bodyPr/>
-          <a:lstStyle/>
-          <a:p>
-            <a:endParaRPr lang="en-US"/>
+          <a:bodyPr vert="horz" lIns="91440" tIns="45720" rIns="91440" bIns="45720" rtlCol="0" anchor="t">
+            <a:normAutofit/>
+          </a:bodyPr>
+          <a:lstStyle/>
+          <a:p>
+            <a:r>
+              <a:rPr lang="en-US" dirty="0">
+                <a:ea typeface="Calibri"/>
+                <a:cs typeface="Calibri"/>
+              </a:rPr>
+              <a:t>[Controls layout]</a:t>
+            </a:r>
+            <a:endParaRPr lang="en-US" dirty="0"/>
           </a:p>
         </p:txBody>
       </p:sp>
     </p:spTree>
     <p:extLst>
       <p:ext uri="{BB962C8B-B14F-4D97-AF65-F5344CB8AC3E}">
-        <p14:creationId xmlns:p14="http://schemas.microsoft.com/office/powerpoint/2010/main" val="3514244704"/>
+        <p14:creationId xmlns:p14="http://schemas.microsoft.com/office/powerpoint/2010/main" val="1229603757"/>
       </p:ext>
     </p:extLst>
   </p:cSld>
@@ -3752,6 +3762,93 @@
           <p:cNvPr id="2" name="Title 1">
             <a:extLst>
               <a:ext uri="{FF2B5EF4-FFF2-40B4-BE49-F238E27FC236}">
+                <a16:creationId xmlns:a16="http://schemas.microsoft.com/office/drawing/2014/main" id="{7E3CF829-2252-1E5B-5AEC-C997FB209DA5}"/>
+              </a:ext>
+            </a:extLst>
+          </p:cNvPr>
+          <p:cNvSpPr>
+            <a:spLocks noGrp="1"/>
+          </p:cNvSpPr>
+          <p:nvPr>
+            <p:ph type="title"/>
+          </p:nvPr>
+        </p:nvSpPr>
+        <p:spPr/>
+        <p:txBody>
+          <a:bodyPr/>
+          <a:lstStyle/>
+          <a:p>
+            <a:r>
+              <a:rPr lang="en-US" dirty="0">
+                <a:ea typeface="Calibri Light"/>
+                <a:cs typeface="Calibri Light"/>
+              </a:rPr>
+              <a:t>Travel Gameplay/Mechanics</a:t>
+            </a:r>
+            <a:endParaRPr lang="en-US" dirty="0"/>
+          </a:p>
+        </p:txBody>
+      </p:sp>
+      <p:sp>
+        <p:nvSpPr>
+          <p:cNvPr id="3" name="Content Placeholder 2">
+            <a:extLst>
+              <a:ext uri="{FF2B5EF4-FFF2-40B4-BE49-F238E27FC236}">
+                <a16:creationId xmlns:a16="http://schemas.microsoft.com/office/drawing/2014/main" id="{BA748016-E1E6-A0C2-382D-8A1D056E5B65}"/>
+              </a:ext>
+            </a:extLst>
+          </p:cNvPr>
+          <p:cNvSpPr>
+            <a:spLocks noGrp="1"/>
+          </p:cNvSpPr>
+          <p:nvPr>
+            <p:ph idx="1"/>
+          </p:nvPr>
+        </p:nvSpPr>
+        <p:spPr/>
+        <p:txBody>
+          <a:bodyPr/>
+          <a:lstStyle/>
+          <a:p>
+            <a:endParaRPr lang="en-US"/>
+          </a:p>
+        </p:txBody>
+      </p:sp>
+    </p:spTree>
+    <p:extLst>
+      <p:ext uri="{BB962C8B-B14F-4D97-AF65-F5344CB8AC3E}">
+        <p14:creationId xmlns:p14="http://schemas.microsoft.com/office/powerpoint/2010/main" val="3514244704"/>
+      </p:ext>
+    </p:extLst>
+  </p:cSld>
+  <p:clrMapOvr>
+    <a:masterClrMapping/>
+  </p:clrMapOvr>
+</p:sld>
+</file>
+
+<file path=ppt/slides/slide12.xml><?xml version="1.0" encoding="utf-8"?>
+<p:sld xmlns:a="http://schemas.openxmlformats.org/drawingml/2006/main" xmlns:r="http://schemas.openxmlformats.org/officeDocument/2006/relationships" xmlns:p="http://schemas.openxmlformats.org/presentationml/2006/main">
+  <p:cSld>
+    <p:spTree>
+      <p:nvGrpSpPr>
+        <p:cNvPr id="1" name=""/>
+        <p:cNvGrpSpPr/>
+        <p:nvPr/>
+      </p:nvGrpSpPr>
+      <p:grpSpPr>
+        <a:xfrm>
+          <a:off x="0" y="0"/>
+          <a:ext cx="0" cy="0"/>
+          <a:chOff x="0" y="0"/>
+          <a:chExt cx="0" cy="0"/>
+        </a:xfrm>
+      </p:grpSpPr>
+      <p:sp>
+        <p:nvSpPr>
+          <p:cNvPr id="2" name="Title 1">
+            <a:extLst>
+              <a:ext uri="{FF2B5EF4-FFF2-40B4-BE49-F238E27FC236}">
                 <a16:creationId xmlns:a16="http://schemas.microsoft.com/office/drawing/2014/main" id="{5062687C-677B-942A-9161-3269826DDD4E}"/>
               </a:ext>
             </a:extLst>
@@ -3828,13 +3925,13 @@
 </p:sld>
 </file>
 
-<file path=ppt/slides/slide12.xml><?xml version="1.0" encoding="utf-8"?>
+<file path=ppt/slides/slide13.xml><?xml version="1.0" encoding="utf-8"?>
 <p:sld xmlns:a="http://schemas.openxmlformats.org/drawingml/2006/main" xmlns:r="http://schemas.openxmlformats.org/officeDocument/2006/relationships" xmlns:p="http://schemas.openxmlformats.org/presentationml/2006/main">
   <p:cSld>
     <p:bg>
       <p:bgPr>
         <a:solidFill>
-          <a:srgbClr val="30F2FF"/>
+          <a:srgbClr val="00D6B2"/>
         </a:solidFill>
         <a:effectLst/>
       </p:bgPr>
@@ -3923,7 +4020,7 @@
 </p:sld>
 </file>
 
-<file path=ppt/slides/slide13.xml><?xml version="1.0" encoding="utf-8"?>
+<file path=ppt/slides/slide14.xml><?xml version="1.0" encoding="utf-8"?>
 <p:sld xmlns:a="http://schemas.openxmlformats.org/drawingml/2006/main" xmlns:r="http://schemas.openxmlformats.org/officeDocument/2006/relationships" xmlns:p="http://schemas.openxmlformats.org/presentationml/2006/main">
   <p:cSld>
     <p:spTree>
@@ -4010,13 +4107,13 @@
 </p:sld>
 </file>
 
-<file path=ppt/slides/slide14.xml><?xml version="1.0" encoding="utf-8"?>
+<file path=ppt/slides/slide15.xml><?xml version="1.0" encoding="utf-8"?>
 <p:sld xmlns:a="http://schemas.openxmlformats.org/drawingml/2006/main" xmlns:r="http://schemas.openxmlformats.org/officeDocument/2006/relationships" xmlns:p="http://schemas.openxmlformats.org/presentationml/2006/main">
   <p:cSld>
     <p:bg>
       <p:bgPr>
         <a:solidFill>
-          <a:srgbClr val="30F2FF"/>
+          <a:srgbClr val="00D6B2"/>
         </a:solidFill>
         <a:effectLst/>
       </p:bgPr>
@@ -4096,160 +4193,6 @@
     <p:extLst>
       <p:ext uri="{BB962C8B-B14F-4D97-AF65-F5344CB8AC3E}">
         <p14:creationId xmlns:p14="http://schemas.microsoft.com/office/powerpoint/2010/main" val="1475552678"/>
-      </p:ext>
-    </p:extLst>
-  </p:cSld>
-  <p:clrMapOvr>
-    <a:masterClrMapping/>
-  </p:clrMapOvr>
-</p:sld>
-</file>
-
-<file path=ppt/slides/slide15.xml><?xml version="1.0" encoding="utf-8"?>
-<p:sld xmlns:a="http://schemas.openxmlformats.org/drawingml/2006/main" xmlns:r="http://schemas.openxmlformats.org/officeDocument/2006/relationships" xmlns:p="http://schemas.openxmlformats.org/presentationml/2006/main">
-  <p:cSld>
-    <p:spTree>
-      <p:nvGrpSpPr>
-        <p:cNvPr id="1" name=""/>
-        <p:cNvGrpSpPr/>
-        <p:nvPr/>
-      </p:nvGrpSpPr>
-      <p:grpSpPr>
-        <a:xfrm>
-          <a:off x="0" y="0"/>
-          <a:ext cx="0" cy="0"/>
-          <a:chOff x="0" y="0"/>
-          <a:chExt cx="0" cy="0"/>
-        </a:xfrm>
-      </p:grpSpPr>
-      <p:sp>
-        <p:nvSpPr>
-          <p:cNvPr id="2" name="Title 1">
-            <a:extLst>
-              <a:ext uri="{FF2B5EF4-FFF2-40B4-BE49-F238E27FC236}">
-                <a16:creationId xmlns:a16="http://schemas.microsoft.com/office/drawing/2014/main" id="{2F510B3C-B5D3-672A-E50D-68FC8DEC6E94}"/>
-              </a:ext>
-            </a:extLst>
-          </p:cNvPr>
-          <p:cNvSpPr>
-            <a:spLocks noGrp="1"/>
-          </p:cNvSpPr>
-          <p:nvPr>
-            <p:ph type="title"/>
-          </p:nvPr>
-        </p:nvSpPr>
-        <p:spPr/>
-        <p:txBody>
-          <a:bodyPr/>
-          <a:lstStyle/>
-          <a:p>
-            <a:r>
-              <a:rPr lang="en-US" dirty="0">
-                <a:ea typeface="Calibri Light"/>
-                <a:cs typeface="Calibri Light"/>
-              </a:rPr>
-              <a:t>Basic Thug</a:t>
-            </a:r>
-            <a:endParaRPr lang="en-US" dirty="0"/>
-          </a:p>
-        </p:txBody>
-      </p:sp>
-      <p:sp>
-        <p:nvSpPr>
-          <p:cNvPr id="3" name="Content Placeholder 2">
-            <a:extLst>
-              <a:ext uri="{FF2B5EF4-FFF2-40B4-BE49-F238E27FC236}">
-                <a16:creationId xmlns:a16="http://schemas.microsoft.com/office/drawing/2014/main" id="{34213A9F-A72E-C85A-E6F3-A17B97972F15}"/>
-              </a:ext>
-            </a:extLst>
-          </p:cNvPr>
-          <p:cNvSpPr>
-            <a:spLocks noGrp="1"/>
-          </p:cNvSpPr>
-          <p:nvPr>
-            <p:ph idx="1"/>
-          </p:nvPr>
-        </p:nvSpPr>
-        <p:spPr/>
-        <p:txBody>
-          <a:bodyPr vert="horz" lIns="91440" tIns="45720" rIns="91440" bIns="45720" rtlCol="0" anchor="t">
-            <a:normAutofit/>
-          </a:bodyPr>
-          <a:lstStyle/>
-          <a:p>
-            <a:r>
-              <a:rPr lang="en-US" dirty="0">
-                <a:ea typeface="Calibri"/>
-                <a:cs typeface="Calibri"/>
-              </a:rPr>
-              <a:t>We can add enemy variety with different weapons/equipment</a:t>
-            </a:r>
-          </a:p>
-          <a:p>
-            <a:r>
-              <a:rPr lang="en-US" dirty="0">
-                <a:ea typeface="Calibri"/>
-                <a:cs typeface="Calibri"/>
-              </a:rPr>
-              <a:t>Bosses could also add variety (if we </a:t>
-            </a:r>
-            <a:r>
-              <a:rPr lang="en-US" err="1">
-                <a:ea typeface="Calibri"/>
-                <a:cs typeface="Calibri"/>
-              </a:rPr>
-              <a:t>perscribe</a:t>
-            </a:r>
-            <a:r>
-              <a:rPr lang="en-US" dirty="0">
-                <a:ea typeface="Calibri"/>
-                <a:cs typeface="Calibri"/>
-              </a:rPr>
-              <a:t> sufficient time)</a:t>
-            </a:r>
-          </a:p>
-          <a:p>
-            <a:r>
-              <a:rPr lang="en-US" dirty="0">
-                <a:ea typeface="Calibri"/>
-                <a:cs typeface="Calibri"/>
-              </a:rPr>
-              <a:t>No weapons (so little damage)</a:t>
-            </a:r>
-          </a:p>
-          <a:p>
-            <a:r>
-              <a:rPr lang="en-US" dirty="0">
-                <a:ea typeface="Calibri"/>
-                <a:cs typeface="Calibri"/>
-              </a:rPr>
-              <a:t>Only option is to attack player with melee</a:t>
-            </a:r>
-          </a:p>
-          <a:p>
-            <a:r>
-              <a:rPr lang="en-US" dirty="0">
-                <a:ea typeface="Calibri"/>
-                <a:cs typeface="Calibri"/>
-              </a:rPr>
-              <a:t>{maybe we allow friendly fire – helps with the repetitive nature of melee enemies ganging up on the player, and also entertaining}</a:t>
-            </a:r>
-          </a:p>
-          <a:p>
-            <a:r>
-              <a:rPr lang="en-US" dirty="0">
-                <a:ea typeface="Calibri"/>
-                <a:cs typeface="Calibri"/>
-              </a:rPr>
-              <a:t>[each enemy weapon type we use will have it's own slide to allow for more detail]</a:t>
-            </a:r>
-          </a:p>
-        </p:txBody>
-      </p:sp>
-    </p:spTree>
-    <p:extLst>
-      <p:ext uri="{BB962C8B-B14F-4D97-AF65-F5344CB8AC3E}">
-        <p14:creationId xmlns:p14="http://schemas.microsoft.com/office/powerpoint/2010/main" val="1839603197"/>
       </p:ext>
     </p:extLst>
   </p:cSld>
@@ -4281,6 +4224,160 @@
           <p:cNvPr id="2" name="Title 1">
             <a:extLst>
               <a:ext uri="{FF2B5EF4-FFF2-40B4-BE49-F238E27FC236}">
+                <a16:creationId xmlns:a16="http://schemas.microsoft.com/office/drawing/2014/main" id="{2F510B3C-B5D3-672A-E50D-68FC8DEC6E94}"/>
+              </a:ext>
+            </a:extLst>
+          </p:cNvPr>
+          <p:cNvSpPr>
+            <a:spLocks noGrp="1"/>
+          </p:cNvSpPr>
+          <p:nvPr>
+            <p:ph type="title"/>
+          </p:nvPr>
+        </p:nvSpPr>
+        <p:spPr/>
+        <p:txBody>
+          <a:bodyPr/>
+          <a:lstStyle/>
+          <a:p>
+            <a:r>
+              <a:rPr lang="en-US" dirty="0">
+                <a:ea typeface="Calibri Light"/>
+                <a:cs typeface="Calibri Light"/>
+              </a:rPr>
+              <a:t>Basic Thug</a:t>
+            </a:r>
+            <a:endParaRPr lang="en-US" dirty="0"/>
+          </a:p>
+        </p:txBody>
+      </p:sp>
+      <p:sp>
+        <p:nvSpPr>
+          <p:cNvPr id="3" name="Content Placeholder 2">
+            <a:extLst>
+              <a:ext uri="{FF2B5EF4-FFF2-40B4-BE49-F238E27FC236}">
+                <a16:creationId xmlns:a16="http://schemas.microsoft.com/office/drawing/2014/main" id="{34213A9F-A72E-C85A-E6F3-A17B97972F15}"/>
+              </a:ext>
+            </a:extLst>
+          </p:cNvPr>
+          <p:cNvSpPr>
+            <a:spLocks noGrp="1"/>
+          </p:cNvSpPr>
+          <p:nvPr>
+            <p:ph idx="1"/>
+          </p:nvPr>
+        </p:nvSpPr>
+        <p:spPr/>
+        <p:txBody>
+          <a:bodyPr vert="horz" lIns="91440" tIns="45720" rIns="91440" bIns="45720" rtlCol="0" anchor="t">
+            <a:normAutofit/>
+          </a:bodyPr>
+          <a:lstStyle/>
+          <a:p>
+            <a:r>
+              <a:rPr lang="en-US" dirty="0">
+                <a:ea typeface="Calibri"/>
+                <a:cs typeface="Calibri"/>
+              </a:rPr>
+              <a:t>We can add enemy variety with different weapons/equipment</a:t>
+            </a:r>
+          </a:p>
+          <a:p>
+            <a:r>
+              <a:rPr lang="en-US" dirty="0">
+                <a:ea typeface="Calibri"/>
+                <a:cs typeface="Calibri"/>
+              </a:rPr>
+              <a:t>Bosses could also add variety (if we </a:t>
+            </a:r>
+            <a:r>
+              <a:rPr lang="en-US" err="1">
+                <a:ea typeface="Calibri"/>
+                <a:cs typeface="Calibri"/>
+              </a:rPr>
+              <a:t>perscribe</a:t>
+            </a:r>
+            <a:r>
+              <a:rPr lang="en-US" dirty="0">
+                <a:ea typeface="Calibri"/>
+                <a:cs typeface="Calibri"/>
+              </a:rPr>
+              <a:t> sufficient time)</a:t>
+            </a:r>
+          </a:p>
+          <a:p>
+            <a:r>
+              <a:rPr lang="en-US" dirty="0">
+                <a:ea typeface="Calibri"/>
+                <a:cs typeface="Calibri"/>
+              </a:rPr>
+              <a:t>No weapons (so little damage)</a:t>
+            </a:r>
+          </a:p>
+          <a:p>
+            <a:r>
+              <a:rPr lang="en-US" dirty="0">
+                <a:ea typeface="Calibri"/>
+                <a:cs typeface="Calibri"/>
+              </a:rPr>
+              <a:t>Only option is to attack player with melee</a:t>
+            </a:r>
+          </a:p>
+          <a:p>
+            <a:r>
+              <a:rPr lang="en-US" dirty="0">
+                <a:ea typeface="Calibri"/>
+                <a:cs typeface="Calibri"/>
+              </a:rPr>
+              <a:t>{maybe we allow friendly fire – helps with the repetitive nature of melee enemies ganging up on the player, and also entertaining}</a:t>
+            </a:r>
+          </a:p>
+          <a:p>
+            <a:r>
+              <a:rPr lang="en-US" dirty="0">
+                <a:ea typeface="Calibri"/>
+                <a:cs typeface="Calibri"/>
+              </a:rPr>
+              <a:t>[each enemy weapon type we use will have it's own slide to allow for more detail]</a:t>
+            </a:r>
+          </a:p>
+        </p:txBody>
+      </p:sp>
+    </p:spTree>
+    <p:extLst>
+      <p:ext uri="{BB962C8B-B14F-4D97-AF65-F5344CB8AC3E}">
+        <p14:creationId xmlns:p14="http://schemas.microsoft.com/office/powerpoint/2010/main" val="1839603197"/>
+      </p:ext>
+    </p:extLst>
+  </p:cSld>
+  <p:clrMapOvr>
+    <a:masterClrMapping/>
+  </p:clrMapOvr>
+</p:sld>
+</file>
+
+<file path=ppt/slides/slide17.xml><?xml version="1.0" encoding="utf-8"?>
+<p:sld xmlns:a="http://schemas.openxmlformats.org/drawingml/2006/main" xmlns:r="http://schemas.openxmlformats.org/officeDocument/2006/relationships" xmlns:p="http://schemas.openxmlformats.org/presentationml/2006/main">
+  <p:cSld>
+    <p:spTree>
+      <p:nvGrpSpPr>
+        <p:cNvPr id="1" name=""/>
+        <p:cNvGrpSpPr/>
+        <p:nvPr/>
+      </p:nvGrpSpPr>
+      <p:grpSpPr>
+        <a:xfrm>
+          <a:off x="0" y="0"/>
+          <a:ext cx="0" cy="0"/>
+          <a:chOff x="0" y="0"/>
+          <a:chExt cx="0" cy="0"/>
+        </a:xfrm>
+      </p:grpSpPr>
+      <p:sp>
+        <p:nvSpPr>
+          <p:cNvPr id="2" name="Title 1">
+            <a:extLst>
+              <a:ext uri="{FF2B5EF4-FFF2-40B4-BE49-F238E27FC236}">
                 <a16:creationId xmlns:a16="http://schemas.microsoft.com/office/drawing/2014/main" id="{B96217FF-11F1-02A9-1262-DA7D6DEF9869}"/>
               </a:ext>
             </a:extLst>
@@ -4378,13 +4475,13 @@
 </p:sld>
 </file>
 
-<file path=ppt/slides/slide17.xml><?xml version="1.0" encoding="utf-8"?>
+<file path=ppt/slides/slide18.xml><?xml version="1.0" encoding="utf-8"?>
 <p:sld xmlns:a="http://schemas.openxmlformats.org/drawingml/2006/main" xmlns:r="http://schemas.openxmlformats.org/officeDocument/2006/relationships" xmlns:p="http://schemas.openxmlformats.org/presentationml/2006/main">
   <p:cSld>
     <p:bg>
       <p:bgPr>
         <a:solidFill>
-          <a:srgbClr val="30F2FF"/>
+          <a:srgbClr val="00D6B2"/>
         </a:solidFill>
         <a:effectLst/>
       </p:bgPr>
@@ -4464,101 +4561,6 @@
     <p:extLst>
       <p:ext uri="{BB962C8B-B14F-4D97-AF65-F5344CB8AC3E}">
         <p14:creationId xmlns:p14="http://schemas.microsoft.com/office/powerpoint/2010/main" val="2226716358"/>
-      </p:ext>
-    </p:extLst>
-  </p:cSld>
-  <p:clrMapOvr>
-    <a:masterClrMapping/>
-  </p:clrMapOvr>
-</p:sld>
-</file>
-
-<file path=ppt/slides/slide18.xml><?xml version="1.0" encoding="utf-8"?>
-<p:sld xmlns:a="http://schemas.openxmlformats.org/drawingml/2006/main" xmlns:r="http://schemas.openxmlformats.org/officeDocument/2006/relationships" xmlns:p="http://schemas.openxmlformats.org/presentationml/2006/main">
-  <p:cSld>
-    <p:spTree>
-      <p:nvGrpSpPr>
-        <p:cNvPr id="1" name=""/>
-        <p:cNvGrpSpPr/>
-        <p:nvPr/>
-      </p:nvGrpSpPr>
-      <p:grpSpPr>
-        <a:xfrm>
-          <a:off x="0" y="0"/>
-          <a:ext cx="0" cy="0"/>
-          <a:chOff x="0" y="0"/>
-          <a:chExt cx="0" cy="0"/>
-        </a:xfrm>
-      </p:grpSpPr>
-      <p:sp>
-        <p:nvSpPr>
-          <p:cNvPr id="2" name="Title 1">
-            <a:extLst>
-              <a:ext uri="{FF2B5EF4-FFF2-40B4-BE49-F238E27FC236}">
-                <a16:creationId xmlns:a16="http://schemas.microsoft.com/office/drawing/2014/main" id="{672EB8FE-9BDC-99D2-20B3-823111937B3C}"/>
-              </a:ext>
-            </a:extLst>
-          </p:cNvPr>
-          <p:cNvSpPr>
-            <a:spLocks noGrp="1"/>
-          </p:cNvSpPr>
-          <p:nvPr>
-            <p:ph type="title"/>
-          </p:nvPr>
-        </p:nvSpPr>
-        <p:spPr/>
-        <p:txBody>
-          <a:bodyPr/>
-          <a:lstStyle/>
-          <a:p>
-            <a:r>
-              <a:rPr lang="en-US" dirty="0">
-                <a:ea typeface="Calibri Light"/>
-                <a:cs typeface="Calibri Light"/>
-              </a:rPr>
-              <a:t>Wall Bounce</a:t>
-            </a:r>
-            <a:endParaRPr lang="en-US" dirty="0" err="1"/>
-          </a:p>
-        </p:txBody>
-      </p:sp>
-      <p:sp>
-        <p:nvSpPr>
-          <p:cNvPr id="3" name="Content Placeholder 2">
-            <a:extLst>
-              <a:ext uri="{FF2B5EF4-FFF2-40B4-BE49-F238E27FC236}">
-                <a16:creationId xmlns:a16="http://schemas.microsoft.com/office/drawing/2014/main" id="{E06D7B82-1649-EF9C-0051-D71FCC349B43}"/>
-              </a:ext>
-            </a:extLst>
-          </p:cNvPr>
-          <p:cNvSpPr>
-            <a:spLocks noGrp="1"/>
-          </p:cNvSpPr>
-          <p:nvPr>
-            <p:ph idx="1"/>
-          </p:nvPr>
-        </p:nvSpPr>
-        <p:spPr/>
-        <p:txBody>
-          <a:bodyPr vert="horz" lIns="91440" tIns="45720" rIns="91440" bIns="45720" rtlCol="0" anchor="t">
-            <a:normAutofit/>
-          </a:bodyPr>
-          <a:lstStyle/>
-          <a:p>
-            <a:r>
-              <a:rPr lang="en-US" dirty="0">
-                <a:ea typeface="Calibri"/>
-                <a:cs typeface="Calibri"/>
-              </a:rPr>
-              <a:t>Knock back into wall deals little extra damage [additional cool thing to make combat more varied]</a:t>
-            </a:r>
-          </a:p>
-        </p:txBody>
-      </p:sp>
-    </p:spTree>
-    <p:extLst>
-      <p:ext uri="{BB962C8B-B14F-4D97-AF65-F5344CB8AC3E}">
-        <p14:creationId xmlns:p14="http://schemas.microsoft.com/office/powerpoint/2010/main" val="2820152346"/>
       </p:ext>
     </p:extLst>
   </p:cSld>
@@ -4590,7 +4592,7 @@
           <p:cNvPr id="2" name="Title 1">
             <a:extLst>
               <a:ext uri="{FF2B5EF4-FFF2-40B4-BE49-F238E27FC236}">
-                <a16:creationId xmlns:a16="http://schemas.microsoft.com/office/drawing/2014/main" id="{422205A5-894D-A436-DB8B-3D5D1AB2C1C2}"/>
+                <a16:creationId xmlns:a16="http://schemas.microsoft.com/office/drawing/2014/main" id="{672EB8FE-9BDC-99D2-20B3-823111937B3C}"/>
               </a:ext>
             </a:extLst>
           </p:cNvPr>
@@ -4611,9 +4613,9 @@
                 <a:ea typeface="Calibri Light"/>
                 <a:cs typeface="Calibri Light"/>
               </a:rPr>
-              <a:t>Conveyer Belt</a:t>
-            </a:r>
-            <a:endParaRPr lang="en-US" dirty="0"/>
+              <a:t>Wall Bounce</a:t>
+            </a:r>
+            <a:endParaRPr lang="en-US" dirty="0" err="1"/>
           </a:p>
         </p:txBody>
       </p:sp>
@@ -4622,7 +4624,7 @@
           <p:cNvPr id="3" name="Content Placeholder 2">
             <a:extLst>
               <a:ext uri="{FF2B5EF4-FFF2-40B4-BE49-F238E27FC236}">
-                <a16:creationId xmlns:a16="http://schemas.microsoft.com/office/drawing/2014/main" id="{5D4ACD69-08EC-E60A-EEA0-F8522ECB9175}"/>
+                <a16:creationId xmlns:a16="http://schemas.microsoft.com/office/drawing/2014/main" id="{E06D7B82-1649-EF9C-0051-D71FCC349B43}"/>
               </a:ext>
             </a:extLst>
           </p:cNvPr>
@@ -4645,30 +4647,15 @@
                 <a:ea typeface="Calibri"/>
                 <a:cs typeface="Calibri"/>
               </a:rPr>
-              <a:t>[Very </a:t>
-            </a:r>
-            <a:r>
-              <a:rPr lang="en-US" dirty="0" err="1">
-                <a:ea typeface="Calibri"/>
-                <a:cs typeface="Calibri"/>
-              </a:rPr>
-              <a:t>gangbeasts</a:t>
-            </a:r>
-            <a:r>
-              <a:rPr lang="en-US" dirty="0">
-                <a:ea typeface="Calibri"/>
-                <a:cs typeface="Calibri"/>
-              </a:rPr>
-              <a:t> – also additional]</a:t>
-            </a:r>
-            <a:endParaRPr lang="en-US" dirty="0"/>
+              <a:t>Knock back into wall deals little extra damage [additional cool thing to make combat more varied]</a:t>
+            </a:r>
           </a:p>
         </p:txBody>
       </p:sp>
     </p:spTree>
     <p:extLst>
       <p:ext uri="{BB962C8B-B14F-4D97-AF65-F5344CB8AC3E}">
-        <p14:creationId xmlns:p14="http://schemas.microsoft.com/office/powerpoint/2010/main" val="3072309207"/>
+        <p14:creationId xmlns:p14="http://schemas.microsoft.com/office/powerpoint/2010/main" val="2820152346"/>
       </p:ext>
     </p:extLst>
   </p:cSld>
@@ -4822,6 +4809,116 @@
           <p:cNvPr id="2" name="Title 1">
             <a:extLst>
               <a:ext uri="{FF2B5EF4-FFF2-40B4-BE49-F238E27FC236}">
+                <a16:creationId xmlns:a16="http://schemas.microsoft.com/office/drawing/2014/main" id="{422205A5-894D-A436-DB8B-3D5D1AB2C1C2}"/>
+              </a:ext>
+            </a:extLst>
+          </p:cNvPr>
+          <p:cNvSpPr>
+            <a:spLocks noGrp="1"/>
+          </p:cNvSpPr>
+          <p:nvPr>
+            <p:ph type="title"/>
+          </p:nvPr>
+        </p:nvSpPr>
+        <p:spPr/>
+        <p:txBody>
+          <a:bodyPr/>
+          <a:lstStyle/>
+          <a:p>
+            <a:r>
+              <a:rPr lang="en-US" dirty="0">
+                <a:ea typeface="Calibri Light"/>
+                <a:cs typeface="Calibri Light"/>
+              </a:rPr>
+              <a:t>Conveyer Belt</a:t>
+            </a:r>
+            <a:endParaRPr lang="en-US" dirty="0"/>
+          </a:p>
+        </p:txBody>
+      </p:sp>
+      <p:sp>
+        <p:nvSpPr>
+          <p:cNvPr id="3" name="Content Placeholder 2">
+            <a:extLst>
+              <a:ext uri="{FF2B5EF4-FFF2-40B4-BE49-F238E27FC236}">
+                <a16:creationId xmlns:a16="http://schemas.microsoft.com/office/drawing/2014/main" id="{5D4ACD69-08EC-E60A-EEA0-F8522ECB9175}"/>
+              </a:ext>
+            </a:extLst>
+          </p:cNvPr>
+          <p:cNvSpPr>
+            <a:spLocks noGrp="1"/>
+          </p:cNvSpPr>
+          <p:nvPr>
+            <p:ph idx="1"/>
+          </p:nvPr>
+        </p:nvSpPr>
+        <p:spPr/>
+        <p:txBody>
+          <a:bodyPr vert="horz" lIns="91440" tIns="45720" rIns="91440" bIns="45720" rtlCol="0" anchor="t">
+            <a:normAutofit/>
+          </a:bodyPr>
+          <a:lstStyle/>
+          <a:p>
+            <a:r>
+              <a:rPr lang="en-US" dirty="0">
+                <a:ea typeface="Calibri"/>
+                <a:cs typeface="Calibri"/>
+              </a:rPr>
+              <a:t>[Very </a:t>
+            </a:r>
+            <a:r>
+              <a:rPr lang="en-US" dirty="0" err="1">
+                <a:ea typeface="Calibri"/>
+                <a:cs typeface="Calibri"/>
+              </a:rPr>
+              <a:t>gangbeasts</a:t>
+            </a:r>
+            <a:r>
+              <a:rPr lang="en-US" dirty="0">
+                <a:ea typeface="Calibri"/>
+                <a:cs typeface="Calibri"/>
+              </a:rPr>
+              <a:t> – also additional]</a:t>
+            </a:r>
+            <a:endParaRPr lang="en-US" dirty="0"/>
+          </a:p>
+        </p:txBody>
+      </p:sp>
+    </p:spTree>
+    <p:extLst>
+      <p:ext uri="{BB962C8B-B14F-4D97-AF65-F5344CB8AC3E}">
+        <p14:creationId xmlns:p14="http://schemas.microsoft.com/office/powerpoint/2010/main" val="3072309207"/>
+      </p:ext>
+    </p:extLst>
+  </p:cSld>
+  <p:clrMapOvr>
+    <a:masterClrMapping/>
+  </p:clrMapOvr>
+</p:sld>
+</file>
+
+<file path=ppt/slides/slide21.xml><?xml version="1.0" encoding="utf-8"?>
+<p:sld xmlns:a="http://schemas.openxmlformats.org/drawingml/2006/main" xmlns:r="http://schemas.openxmlformats.org/officeDocument/2006/relationships" xmlns:p="http://schemas.openxmlformats.org/presentationml/2006/main">
+  <p:cSld>
+    <p:spTree>
+      <p:nvGrpSpPr>
+        <p:cNvPr id="1" name=""/>
+        <p:cNvGrpSpPr/>
+        <p:nvPr/>
+      </p:nvGrpSpPr>
+      <p:grpSpPr>
+        <a:xfrm>
+          <a:off x="0" y="0"/>
+          <a:ext cx="0" cy="0"/>
+          <a:chOff x="0" y="0"/>
+          <a:chExt cx="0" cy="0"/>
+        </a:xfrm>
+      </p:grpSpPr>
+      <p:sp>
+        <p:nvSpPr>
+          <p:cNvPr id="2" name="Title 1">
+            <a:extLst>
+              <a:ext uri="{FF2B5EF4-FFF2-40B4-BE49-F238E27FC236}">
                 <a16:creationId xmlns:a16="http://schemas.microsoft.com/office/drawing/2014/main" id="{78BEE34F-7820-348C-3C35-B3AB325D387F}"/>
               </a:ext>
             </a:extLst>
@@ -4910,13 +5007,13 @@
 </p:sld>
 </file>
 
-<file path=ppt/slides/slide21.xml><?xml version="1.0" encoding="utf-8"?>
+<file path=ppt/slides/slide22.xml><?xml version="1.0" encoding="utf-8"?>
 <p:sld xmlns:a="http://schemas.openxmlformats.org/drawingml/2006/main" xmlns:r="http://schemas.openxmlformats.org/officeDocument/2006/relationships" xmlns:p="http://schemas.openxmlformats.org/presentationml/2006/main">
   <p:cSld>
     <p:bg>
       <p:bgPr>
         <a:solidFill>
-          <a:srgbClr val="30F2FF"/>
+          <a:srgbClr val="00D6B2"/>
         </a:solidFill>
         <a:effectLst/>
       </p:bgPr>
@@ -4996,160 +5093,6 @@
     <p:extLst>
       <p:ext uri="{BB962C8B-B14F-4D97-AF65-F5344CB8AC3E}">
         <p14:creationId xmlns:p14="http://schemas.microsoft.com/office/powerpoint/2010/main" val="1050023752"/>
-      </p:ext>
-    </p:extLst>
-  </p:cSld>
-  <p:clrMapOvr>
-    <a:masterClrMapping/>
-  </p:clrMapOvr>
-</p:sld>
-</file>
-
-<file path=ppt/slides/slide22.xml><?xml version="1.0" encoding="utf-8"?>
-<p:sld xmlns:a="http://schemas.openxmlformats.org/drawingml/2006/main" xmlns:r="http://schemas.openxmlformats.org/officeDocument/2006/relationships" xmlns:p="http://schemas.openxmlformats.org/presentationml/2006/main">
-  <p:cSld>
-    <p:spTree>
-      <p:nvGrpSpPr>
-        <p:cNvPr id="1" name=""/>
-        <p:cNvGrpSpPr/>
-        <p:nvPr/>
-      </p:nvGrpSpPr>
-      <p:grpSpPr>
-        <a:xfrm>
-          <a:off x="0" y="0"/>
-          <a:ext cx="0" cy="0"/>
-          <a:chOff x="0" y="0"/>
-          <a:chExt cx="0" cy="0"/>
-        </a:xfrm>
-      </p:grpSpPr>
-      <p:sp>
-        <p:nvSpPr>
-          <p:cNvPr id="2" name="Title 1">
-            <a:extLst>
-              <a:ext uri="{FF2B5EF4-FFF2-40B4-BE49-F238E27FC236}">
-                <a16:creationId xmlns:a16="http://schemas.microsoft.com/office/drawing/2014/main" id="{A63136AD-2458-A357-223A-99708E79B52F}"/>
-              </a:ext>
-            </a:extLst>
-          </p:cNvPr>
-          <p:cNvSpPr>
-            <a:spLocks noGrp="1"/>
-          </p:cNvSpPr>
-          <p:nvPr>
-            <p:ph type="title"/>
-          </p:nvPr>
-        </p:nvSpPr>
-        <p:spPr/>
-        <p:txBody>
-          <a:bodyPr/>
-          <a:lstStyle/>
-          <a:p>
-            <a:r>
-              <a:rPr lang="en-US" dirty="0" err="1">
-                <a:ea typeface="Calibri Light"/>
-                <a:cs typeface="Calibri Light"/>
-              </a:rPr>
-              <a:t>Anouncer</a:t>
-            </a:r>
-            <a:endParaRPr lang="en-US" dirty="0" err="1"/>
-          </a:p>
-        </p:txBody>
-      </p:sp>
-      <p:sp>
-        <p:nvSpPr>
-          <p:cNvPr id="3" name="Content Placeholder 2">
-            <a:extLst>
-              <a:ext uri="{FF2B5EF4-FFF2-40B4-BE49-F238E27FC236}">
-                <a16:creationId xmlns:a16="http://schemas.microsoft.com/office/drawing/2014/main" id="{DD6D8731-A978-7BF7-5CBC-1F1B0E0C37A6}"/>
-              </a:ext>
-            </a:extLst>
-          </p:cNvPr>
-          <p:cNvSpPr>
-            <a:spLocks noGrp="1"/>
-          </p:cNvSpPr>
-          <p:nvPr>
-            <p:ph idx="1"/>
-          </p:nvPr>
-        </p:nvSpPr>
-        <p:spPr/>
-        <p:txBody>
-          <a:bodyPr vert="horz" lIns="91440" tIns="45720" rIns="91440" bIns="45720" rtlCol="0" anchor="t">
-            <a:normAutofit/>
-          </a:bodyPr>
-          <a:lstStyle/>
-          <a:p>
-            <a:r>
-              <a:rPr lang="en-US" err="1">
-                <a:ea typeface="Calibri"/>
-                <a:cs typeface="Calibri"/>
-              </a:rPr>
-              <a:t>Basicaly</a:t>
-            </a:r>
-            <a:r>
-              <a:rPr lang="en-US" dirty="0">
-                <a:ea typeface="Calibri"/>
-                <a:cs typeface="Calibri"/>
-              </a:rPr>
-              <a:t> </a:t>
-            </a:r>
-            <a:r>
-              <a:rPr lang="en-US" err="1">
-                <a:ea typeface="Calibri"/>
-                <a:cs typeface="Calibri"/>
-              </a:rPr>
-              <a:t>Narator</a:t>
-            </a:r>
-            <a:endParaRPr lang="en-US" dirty="0" err="1">
-              <a:ea typeface="Calibri"/>
-              <a:cs typeface="Calibri"/>
-            </a:endParaRPr>
-          </a:p>
-          <a:p>
-            <a:r>
-              <a:rPr lang="en-US" dirty="0">
-                <a:ea typeface="Calibri"/>
-                <a:cs typeface="Calibri"/>
-              </a:rPr>
-              <a:t>They explain things</a:t>
-            </a:r>
-          </a:p>
-          <a:p>
-            <a:r>
-              <a:rPr lang="en-US" dirty="0">
-                <a:ea typeface="Calibri"/>
-                <a:cs typeface="Calibri"/>
-              </a:rPr>
-              <a:t>Game is </a:t>
-            </a:r>
-            <a:r>
-              <a:rPr lang="en-US" dirty="0" err="1">
-                <a:ea typeface="Calibri"/>
-                <a:cs typeface="Calibri"/>
-              </a:rPr>
-              <a:t>basicaly</a:t>
-            </a:r>
-            <a:r>
-              <a:rPr lang="en-US" dirty="0">
-                <a:ea typeface="Calibri"/>
-                <a:cs typeface="Calibri"/>
-              </a:rPr>
-              <a:t> a game show that they announce [either text or voiced dialogue would work fine]</a:t>
-            </a:r>
-          </a:p>
-          <a:p>
-            <a:r>
-              <a:rPr lang="en-US" dirty="0">
-                <a:ea typeface="Calibri"/>
-                <a:cs typeface="Calibri"/>
-              </a:rPr>
-              <a:t>They are a hype man, they're dramatic, and snarky</a:t>
-            </a:r>
-          </a:p>
-        </p:txBody>
-      </p:sp>
-    </p:spTree>
-    <p:extLst>
-      <p:ext uri="{BB962C8B-B14F-4D97-AF65-F5344CB8AC3E}">
-        <p14:creationId xmlns:p14="http://schemas.microsoft.com/office/powerpoint/2010/main" val="2803468791"/>
       </p:ext>
     </p:extLst>
   </p:cSld>
@@ -5181,7 +5124,7 @@
           <p:cNvPr id="2" name="Title 1">
             <a:extLst>
               <a:ext uri="{FF2B5EF4-FFF2-40B4-BE49-F238E27FC236}">
-                <a16:creationId xmlns:a16="http://schemas.microsoft.com/office/drawing/2014/main" id="{73408831-85EB-0A22-A16F-D07147AC07AA}"/>
+                <a16:creationId xmlns:a16="http://schemas.microsoft.com/office/drawing/2014/main" id="{A63136AD-2458-A357-223A-99708E79B52F}"/>
               </a:ext>
             </a:extLst>
           </p:cNvPr>
@@ -5198,11 +5141,11 @@
           <a:lstStyle/>
           <a:p>
             <a:r>
-              <a:rPr lang="en-US" dirty="0">
+              <a:rPr lang="en-US" dirty="0" err="1">
                 <a:ea typeface="Calibri Light"/>
                 <a:cs typeface="Calibri Light"/>
               </a:rPr>
-              <a:t>"Zeus"</a:t>
+              <a:t>Anouncer</a:t>
             </a:r>
             <a:endParaRPr lang="en-US" dirty="0" err="1"/>
           </a:p>
@@ -5213,7 +5156,7 @@
           <p:cNvPr id="3" name="Content Placeholder 2">
             <a:extLst>
               <a:ext uri="{FF2B5EF4-FFF2-40B4-BE49-F238E27FC236}">
-                <a16:creationId xmlns:a16="http://schemas.microsoft.com/office/drawing/2014/main" id="{A7866C89-A741-3DAF-6DA7-673A0946994C}"/>
+                <a16:creationId xmlns:a16="http://schemas.microsoft.com/office/drawing/2014/main" id="{DD6D8731-A978-7BF7-5CBC-1F1B0E0C37A6}"/>
               </a:ext>
             </a:extLst>
           </p:cNvPr>
@@ -5231,69 +5174,71 @@
           </a:bodyPr>
           <a:lstStyle/>
           <a:p>
-            <a:pPr marL="0" indent="0">
-              <a:buNone/>
-            </a:pPr>
+            <a:r>
+              <a:rPr lang="en-US" err="1">
+                <a:ea typeface="Calibri"/>
+                <a:cs typeface="Calibri"/>
+              </a:rPr>
+              <a:t>Basicaly</a:t>
+            </a:r>
             <a:r>
               <a:rPr lang="en-US" dirty="0">
                 <a:ea typeface="Calibri"/>
                 <a:cs typeface="Calibri"/>
               </a:rPr>
-              <a:t>[explanation of double Zeus entry]While they are a threat, they're presence as an NPC would be separate from Zeus the threat if we did not make the connection clear (through label and </a:t>
+              <a:t> </a:t>
+            </a:r>
+            <a:r>
+              <a:rPr lang="en-US" err="1">
+                <a:ea typeface="Calibri"/>
+                <a:cs typeface="Calibri"/>
+              </a:rPr>
+              <a:t>Narator</a:t>
+            </a:r>
+            <a:endParaRPr lang="en-US" dirty="0" err="1">
+              <a:ea typeface="Calibri"/>
+              <a:cs typeface="Calibri"/>
+            </a:endParaRPr>
+          </a:p>
+          <a:p>
+            <a:r>
+              <a:rPr lang="en-US" dirty="0">
+                <a:ea typeface="Calibri"/>
+                <a:cs typeface="Calibri"/>
+              </a:rPr>
+              <a:t>They explain things</a:t>
+            </a:r>
+          </a:p>
+          <a:p>
+            <a:r>
+              <a:rPr lang="en-US" dirty="0">
+                <a:ea typeface="Calibri"/>
+                <a:cs typeface="Calibri"/>
+              </a:rPr>
+              <a:t>Game is </a:t>
             </a:r>
             <a:r>
               <a:rPr lang="en-US" dirty="0" err="1">
                 <a:ea typeface="Calibri"/>
                 <a:cs typeface="Calibri"/>
               </a:rPr>
-              <a:t>narative</a:t>
+              <a:t>basicaly</a:t>
             </a:r>
             <a:r>
               <a:rPr lang="en-US" dirty="0">
                 <a:ea typeface="Calibri"/>
                 <a:cs typeface="Calibri"/>
               </a:rPr>
-              <a:t> context)</a:t>
-            </a:r>
-          </a:p>
-          <a:p>
-            <a:pPr marL="457200" indent="-457200"/>
+              <a:t> a game show that they announce [either text or voiced dialogue would work fine]</a:t>
+            </a:r>
+          </a:p>
+          <a:p>
             <a:r>
               <a:rPr lang="en-US" dirty="0">
                 <a:ea typeface="Calibri"/>
                 <a:cs typeface="Calibri"/>
               </a:rPr>
-              <a:t>Will talk shit</a:t>
-            </a:r>
-          </a:p>
-          <a:p>
-            <a:pPr marL="457200" indent="-457200"/>
-            <a:r>
-              <a:rPr lang="en-US" dirty="0">
-                <a:ea typeface="Calibri"/>
-                <a:cs typeface="Calibri"/>
-              </a:rPr>
-              <a:t>Talk about the good fight (even if they lost – like they're trying to save face)</a:t>
-            </a:r>
-          </a:p>
-          <a:p>
-            <a:pPr marL="457200" indent="-457200"/>
-            <a:r>
-              <a:rPr lang="en-US">
-                <a:ea typeface="Calibri"/>
-                <a:cs typeface="Calibri"/>
-              </a:rPr>
-              <a:t>Will break character eventually</a:t>
-            </a:r>
-          </a:p>
-          <a:p>
-            <a:pPr marL="457200" indent="-457200"/>
-            <a:r>
-              <a:rPr lang="en-US" dirty="0">
-                <a:ea typeface="Calibri"/>
-                <a:cs typeface="Calibri"/>
-              </a:rPr>
-              <a:t>Egotist nerd</a:t>
+              <a:t>They are a hype man, they're dramatic, and snarky</a:t>
             </a:r>
           </a:p>
         </p:txBody>
@@ -5301,7 +5246,7 @@
     </p:spTree>
     <p:extLst>
       <p:ext uri="{BB962C8B-B14F-4D97-AF65-F5344CB8AC3E}">
-        <p14:creationId xmlns:p14="http://schemas.microsoft.com/office/powerpoint/2010/main" val="3016071352"/>
+        <p14:creationId xmlns:p14="http://schemas.microsoft.com/office/powerpoint/2010/main" val="2803468791"/>
       </p:ext>
     </p:extLst>
   </p:cSld>
@@ -5333,6 +5278,158 @@
           <p:cNvPr id="2" name="Title 1">
             <a:extLst>
               <a:ext uri="{FF2B5EF4-FFF2-40B4-BE49-F238E27FC236}">
+                <a16:creationId xmlns:a16="http://schemas.microsoft.com/office/drawing/2014/main" id="{73408831-85EB-0A22-A16F-D07147AC07AA}"/>
+              </a:ext>
+            </a:extLst>
+          </p:cNvPr>
+          <p:cNvSpPr>
+            <a:spLocks noGrp="1"/>
+          </p:cNvSpPr>
+          <p:nvPr>
+            <p:ph type="title"/>
+          </p:nvPr>
+        </p:nvSpPr>
+        <p:spPr/>
+        <p:txBody>
+          <a:bodyPr/>
+          <a:lstStyle/>
+          <a:p>
+            <a:r>
+              <a:rPr lang="en-US" dirty="0">
+                <a:ea typeface="Calibri Light"/>
+                <a:cs typeface="Calibri Light"/>
+              </a:rPr>
+              <a:t>"Zeus"</a:t>
+            </a:r>
+            <a:endParaRPr lang="en-US" dirty="0" err="1"/>
+          </a:p>
+        </p:txBody>
+      </p:sp>
+      <p:sp>
+        <p:nvSpPr>
+          <p:cNvPr id="3" name="Content Placeholder 2">
+            <a:extLst>
+              <a:ext uri="{FF2B5EF4-FFF2-40B4-BE49-F238E27FC236}">
+                <a16:creationId xmlns:a16="http://schemas.microsoft.com/office/drawing/2014/main" id="{A7866C89-A741-3DAF-6DA7-673A0946994C}"/>
+              </a:ext>
+            </a:extLst>
+          </p:cNvPr>
+          <p:cNvSpPr>
+            <a:spLocks noGrp="1"/>
+          </p:cNvSpPr>
+          <p:nvPr>
+            <p:ph idx="1"/>
+          </p:nvPr>
+        </p:nvSpPr>
+        <p:spPr/>
+        <p:txBody>
+          <a:bodyPr vert="horz" lIns="91440" tIns="45720" rIns="91440" bIns="45720" rtlCol="0" anchor="t">
+            <a:normAutofit/>
+          </a:bodyPr>
+          <a:lstStyle/>
+          <a:p>
+            <a:pPr marL="0" indent="0">
+              <a:buNone/>
+            </a:pPr>
+            <a:r>
+              <a:rPr lang="en-US" dirty="0">
+                <a:ea typeface="Calibri"/>
+                <a:cs typeface="Calibri"/>
+              </a:rPr>
+              <a:t>[explanation of double Zeus entry]While they are a threat, they're presence as an NPC would be separate from Zeus the threat if we did not make the connection clear (through label and </a:t>
+            </a:r>
+            <a:r>
+              <a:rPr lang="en-US" dirty="0" err="1">
+                <a:ea typeface="Calibri"/>
+                <a:cs typeface="Calibri"/>
+              </a:rPr>
+              <a:t>narative</a:t>
+            </a:r>
+            <a:r>
+              <a:rPr lang="en-US" dirty="0">
+                <a:ea typeface="Calibri"/>
+                <a:cs typeface="Calibri"/>
+              </a:rPr>
+              <a:t> context)</a:t>
+            </a:r>
+          </a:p>
+          <a:p>
+            <a:pPr marL="457200" indent="-457200"/>
+            <a:r>
+              <a:rPr lang="en-US" dirty="0">
+                <a:ea typeface="Calibri"/>
+                <a:cs typeface="Calibri"/>
+              </a:rPr>
+              <a:t>Will talk shit</a:t>
+            </a:r>
+          </a:p>
+          <a:p>
+            <a:pPr marL="457200" indent="-457200"/>
+            <a:r>
+              <a:rPr lang="en-US" dirty="0">
+                <a:ea typeface="Calibri"/>
+                <a:cs typeface="Calibri"/>
+              </a:rPr>
+              <a:t>Talk about the good fight (even if they lost – like they're trying to save face)</a:t>
+            </a:r>
+          </a:p>
+          <a:p>
+            <a:pPr marL="457200" indent="-457200"/>
+            <a:r>
+              <a:rPr lang="en-US">
+                <a:ea typeface="Calibri"/>
+                <a:cs typeface="Calibri"/>
+              </a:rPr>
+              <a:t>Will break character eventually</a:t>
+            </a:r>
+          </a:p>
+          <a:p>
+            <a:pPr marL="457200" indent="-457200"/>
+            <a:r>
+              <a:rPr lang="en-US" dirty="0">
+                <a:ea typeface="Calibri"/>
+                <a:cs typeface="Calibri"/>
+              </a:rPr>
+              <a:t>Egotist nerd</a:t>
+            </a:r>
+          </a:p>
+        </p:txBody>
+      </p:sp>
+    </p:spTree>
+    <p:extLst>
+      <p:ext uri="{BB962C8B-B14F-4D97-AF65-F5344CB8AC3E}">
+        <p14:creationId xmlns:p14="http://schemas.microsoft.com/office/powerpoint/2010/main" val="3016071352"/>
+      </p:ext>
+    </p:extLst>
+  </p:cSld>
+  <p:clrMapOvr>
+    <a:masterClrMapping/>
+  </p:clrMapOvr>
+</p:sld>
+</file>
+
+<file path=ppt/slides/slide25.xml><?xml version="1.0" encoding="utf-8"?>
+<p:sld xmlns:a="http://schemas.openxmlformats.org/drawingml/2006/main" xmlns:r="http://schemas.openxmlformats.org/officeDocument/2006/relationships" xmlns:p="http://schemas.openxmlformats.org/presentationml/2006/main">
+  <p:cSld>
+    <p:spTree>
+      <p:nvGrpSpPr>
+        <p:cNvPr id="1" name=""/>
+        <p:cNvGrpSpPr/>
+        <p:nvPr/>
+      </p:nvGrpSpPr>
+      <p:grpSpPr>
+        <a:xfrm>
+          <a:off x="0" y="0"/>
+          <a:ext cx="0" cy="0"/>
+          <a:chOff x="0" y="0"/>
+          <a:chExt cx="0" cy="0"/>
+        </a:xfrm>
+      </p:grpSpPr>
+      <p:sp>
+        <p:nvSpPr>
+          <p:cNvPr id="2" name="Title 1">
+            <a:extLst>
+              <a:ext uri="{FF2B5EF4-FFF2-40B4-BE49-F238E27FC236}">
                 <a16:creationId xmlns:a16="http://schemas.microsoft.com/office/drawing/2014/main" id="{0EA2C688-3E4E-CD7E-94EC-2E1D4A29E39E}"/>
               </a:ext>
             </a:extLst>
@@ -5484,13 +5581,13 @@
 </p:sld>
 </file>
 
-<file path=ppt/slides/slide25.xml><?xml version="1.0" encoding="utf-8"?>
+<file path=ppt/slides/slide26.xml><?xml version="1.0" encoding="utf-8"?>
 <p:sld xmlns:a="http://schemas.openxmlformats.org/drawingml/2006/main" xmlns:r="http://schemas.openxmlformats.org/officeDocument/2006/relationships" xmlns:p="http://schemas.openxmlformats.org/presentationml/2006/main">
   <p:cSld>
     <p:bg>
       <p:bgPr>
         <a:solidFill>
-          <a:srgbClr val="30F2FF"/>
+          <a:srgbClr val="00D6B2"/>
         </a:solidFill>
         <a:effectLst/>
       </p:bgPr>
@@ -5575,7 +5672,7 @@
 </p:sld>
 </file>
 
-<file path=ppt/slides/slide26.xml><?xml version="1.0" encoding="utf-8"?>
+<file path=ppt/slides/slide27.xml><?xml version="1.0" encoding="utf-8"?>
 <p:sld xmlns:a="http://schemas.openxmlformats.org/drawingml/2006/main" xmlns:r="http://schemas.openxmlformats.org/officeDocument/2006/relationships" xmlns:p="http://schemas.openxmlformats.org/presentationml/2006/main">
   <p:cSld>
     <p:spTree>
@@ -5662,7 +5759,7 @@
 </p:sld>
 </file>
 
-<file path=ppt/slides/slide27.xml><?xml version="1.0" encoding="utf-8"?>
+<file path=ppt/slides/slide28.xml><?xml version="1.0" encoding="utf-8"?>
 <p:sld xmlns:a="http://schemas.openxmlformats.org/drawingml/2006/main" xmlns:r="http://schemas.openxmlformats.org/officeDocument/2006/relationships" xmlns:p="http://schemas.openxmlformats.org/presentationml/2006/main">
   <p:cSld>
     <p:spTree>
@@ -6009,7 +6106,7 @@
     <p:bg>
       <p:bgPr>
         <a:solidFill>
-          <a:srgbClr val="30F2FF"/>
+          <a:srgbClr val="00D6B2"/>
         </a:solidFill>
         <a:effectLst/>
       </p:bgPr>
@@ -6269,6 +6366,51 @@
           </a:p>
         </p:txBody>
       </p:sp>
+      <p:pic>
+        <p:nvPicPr>
+          <p:cNvPr id="1026" name="Picture 2">
+            <a:extLst>
+              <a:ext uri="{FF2B5EF4-FFF2-40B4-BE49-F238E27FC236}">
+                <a16:creationId xmlns:a16="http://schemas.microsoft.com/office/drawing/2014/main" id="{4AEA6883-D57F-12B2-67B6-D0C7616E4080}"/>
+              </a:ext>
+            </a:extLst>
+          </p:cNvPr>
+          <p:cNvPicPr>
+            <a:picLocks noChangeAspect="1" noChangeArrowheads="1"/>
+          </p:cNvPicPr>
+          <p:nvPr/>
+        </p:nvPicPr>
+        <p:blipFill rotWithShape="1">
+          <a:blip r:embed="rId2">
+            <a:extLst>
+              <a:ext uri="{28A0092B-C50C-407E-A947-70E740481C1C}">
+                <a14:useLocalDpi xmlns:a14="http://schemas.microsoft.com/office/drawing/2010/main" val="0"/>
+              </a:ext>
+            </a:extLst>
+          </a:blip>
+          <a:srcRect l="16430" r="42907" b="29716"/>
+          <a:stretch/>
+        </p:blipFill>
+        <p:spPr bwMode="auto">
+          <a:xfrm rot="5400000">
+            <a:off x="2726718" y="183455"/>
+            <a:ext cx="3359819" cy="7743218"/>
+          </a:xfrm>
+          <a:prstGeom prst="rect">
+            <a:avLst/>
+          </a:prstGeom>
+          <a:noFill/>
+          <a:extLst>
+            <a:ext uri="{909E8E84-426E-40DD-AFC4-6F175D3DCCD1}">
+              <a14:hiddenFill xmlns:a14="http://schemas.microsoft.com/office/drawing/2010/main">
+                <a:solidFill>
+                  <a:srgbClr val="FFFFFF"/>
+                </a:solidFill>
+              </a14:hiddenFill>
+            </a:ext>
+          </a:extLst>
+        </p:spPr>
+      </p:pic>
     </p:spTree>
     <p:extLst>
       <p:ext uri="{BB962C8B-B14F-4D97-AF65-F5344CB8AC3E}">
@@ -6304,7 +6446,7 @@
           <p:cNvPr id="2" name="Title 1">
             <a:extLst>
               <a:ext uri="{FF2B5EF4-FFF2-40B4-BE49-F238E27FC236}">
-                <a16:creationId xmlns:a16="http://schemas.microsoft.com/office/drawing/2014/main" id="{F74824CB-C71E-86C0-6E64-408ECAB51A0F}"/>
+                <a16:creationId xmlns:a16="http://schemas.microsoft.com/office/drawing/2014/main" id="{0965B83C-0DDB-09BD-44E1-DF7B40F1D084}"/>
               </a:ext>
             </a:extLst>
           </p:cNvPr>
@@ -6320,55 +6462,61 @@
           <a:bodyPr/>
           <a:lstStyle/>
           <a:p>
-            <a:r>
-              <a:rPr lang="en-US" dirty="0">
-                <a:ea typeface="Calibri Light"/>
-                <a:cs typeface="Calibri Light"/>
-              </a:rPr>
-              <a:t>Interaction</a:t>
-            </a:r>
-            <a:endParaRPr lang="en-US" dirty="0"/>
-          </a:p>
-        </p:txBody>
-      </p:sp>
-      <p:sp>
-        <p:nvSpPr>
-          <p:cNvPr id="3" name="Content Placeholder 2">
+            <a:endParaRPr lang="en-GB"/>
+          </a:p>
+        </p:txBody>
+      </p:sp>
+      <p:pic>
+        <p:nvPicPr>
+          <p:cNvPr id="4" name="Picture 2">
             <a:extLst>
               <a:ext uri="{FF2B5EF4-FFF2-40B4-BE49-F238E27FC236}">
-                <a16:creationId xmlns:a16="http://schemas.microsoft.com/office/drawing/2014/main" id="{72DEA321-32E2-440C-635F-BBC9E0E1A05F}"/>
+                <a16:creationId xmlns:a16="http://schemas.microsoft.com/office/drawing/2014/main" id="{F717A71B-B9D0-208A-F707-ECAA99C778D8}"/>
               </a:ext>
             </a:extLst>
           </p:cNvPr>
-          <p:cNvSpPr>
-            <a:spLocks noGrp="1"/>
-          </p:cNvSpPr>
+          <p:cNvPicPr>
+            <a:picLocks noGrp="1" noChangeAspect="1" noChangeArrowheads="1"/>
+          </p:cNvPicPr>
           <p:nvPr>
             <p:ph idx="1"/>
           </p:nvPr>
-        </p:nvSpPr>
-        <p:spPr/>
-        <p:txBody>
-          <a:bodyPr vert="horz" lIns="91440" tIns="45720" rIns="91440" bIns="45720" rtlCol="0" anchor="t">
-            <a:normAutofit/>
-          </a:bodyPr>
-          <a:lstStyle/>
-          <a:p>
-            <a:r>
-              <a:rPr lang="en-US" dirty="0">
-                <a:ea typeface="Calibri"/>
-                <a:cs typeface="Calibri"/>
-              </a:rPr>
-              <a:t>[Controls layout]</a:t>
-            </a:r>
-            <a:endParaRPr lang="en-US" dirty="0"/>
-          </a:p>
-        </p:txBody>
-      </p:sp>
+        </p:nvPicPr>
+        <p:blipFill rotWithShape="1">
+          <a:blip r:embed="rId2" cstate="print">
+            <a:extLst>
+              <a:ext uri="{28A0092B-C50C-407E-A947-70E740481C1C}">
+                <a14:useLocalDpi xmlns:a14="http://schemas.microsoft.com/office/drawing/2010/main" val="0"/>
+              </a:ext>
+            </a:extLst>
+          </a:blip>
+          <a:srcRect l="56937" r="18132"/>
+          <a:stretch/>
+        </p:blipFill>
+        <p:spPr bwMode="auto">
+          <a:xfrm rot="5400000">
+            <a:off x="5433219" y="1971100"/>
+            <a:ext cx="1325563" cy="7089338"/>
+          </a:xfrm>
+          <a:prstGeom prst="rect">
+            <a:avLst/>
+          </a:prstGeom>
+          <a:noFill/>
+          <a:extLst>
+            <a:ext uri="{909E8E84-426E-40DD-AFC4-6F175D3DCCD1}">
+              <a14:hiddenFill xmlns:a14="http://schemas.microsoft.com/office/drawing/2010/main">
+                <a:solidFill>
+                  <a:srgbClr val="FFFFFF"/>
+                </a:solidFill>
+              </a14:hiddenFill>
+            </a:ext>
+          </a:extLst>
+        </p:spPr>
+      </p:pic>
     </p:spTree>
     <p:extLst>
       <p:ext uri="{BB962C8B-B14F-4D97-AF65-F5344CB8AC3E}">
-        <p14:creationId xmlns:p14="http://schemas.microsoft.com/office/powerpoint/2010/main" val="1229603757"/>
+        <p14:creationId xmlns:p14="http://schemas.microsoft.com/office/powerpoint/2010/main" val="1685779077"/>
       </p:ext>
     </p:extLst>
   </p:cSld>

</xml_diff>

<commit_message>
Edited Moodboards/added quations/removed travel section
travel section was unnecessary
</commit_message>
<xml_diff>
--- a/Shared Documentation/Luke's Documents/Clash of Cos - Visual Pitch.pptx
+++ b/Shared Documentation/Luke's Documents/Clash of Cos - Visual Pitch.pptx
@@ -15,24 +15,25 @@
     <p:sldId id="263" r:id="rId9"/>
     <p:sldId id="284" r:id="rId10"/>
     <p:sldId id="264" r:id="rId11"/>
-    <p:sldId id="266" r:id="rId12"/>
-    <p:sldId id="265" r:id="rId13"/>
-    <p:sldId id="267" r:id="rId14"/>
-    <p:sldId id="268" r:id="rId15"/>
-    <p:sldId id="269" r:id="rId16"/>
-    <p:sldId id="270" r:id="rId17"/>
-    <p:sldId id="271" r:id="rId18"/>
-    <p:sldId id="272" r:id="rId19"/>
-    <p:sldId id="273" r:id="rId20"/>
-    <p:sldId id="274" r:id="rId21"/>
-    <p:sldId id="275" r:id="rId22"/>
-    <p:sldId id="277" r:id="rId23"/>
-    <p:sldId id="276" r:id="rId24"/>
-    <p:sldId id="279" r:id="rId25"/>
-    <p:sldId id="278" r:id="rId26"/>
-    <p:sldId id="282" r:id="rId27"/>
-    <p:sldId id="281" r:id="rId28"/>
-    <p:sldId id="283" r:id="rId29"/>
+    <p:sldId id="265" r:id="rId12"/>
+    <p:sldId id="267" r:id="rId13"/>
+    <p:sldId id="268" r:id="rId14"/>
+    <p:sldId id="269" r:id="rId15"/>
+    <p:sldId id="270" r:id="rId16"/>
+    <p:sldId id="271" r:id="rId17"/>
+    <p:sldId id="272" r:id="rId18"/>
+    <p:sldId id="273" r:id="rId19"/>
+    <p:sldId id="274" r:id="rId20"/>
+    <p:sldId id="275" r:id="rId21"/>
+    <p:sldId id="277" r:id="rId22"/>
+    <p:sldId id="276" r:id="rId23"/>
+    <p:sldId id="279" r:id="rId24"/>
+    <p:sldId id="278" r:id="rId25"/>
+    <p:sldId id="282" r:id="rId26"/>
+    <p:sldId id="281" r:id="rId27"/>
+    <p:sldId id="283" r:id="rId28"/>
+    <p:sldId id="285" r:id="rId29"/>
+    <p:sldId id="286" r:id="rId30"/>
   </p:sldIdLst>
   <p:sldSz cx="12192000" cy="6858000"/>
   <p:notesSz cx="6858000" cy="9144000"/>
@@ -785,7 +786,7 @@
           <a:p>
             <a:fld id="{846CE7D5-CF57-46EF-B807-FDD0502418D4}" type="datetimeFigureOut">
               <a:rPr lang="en-US" smtClean="0"/>
-              <a:t>10/9/2023</a:t>
+              <a:t>10/10/2023</a:t>
             </a:fld>
             <a:endParaRPr lang="en-US"/>
           </a:p>
@@ -955,7 +956,7 @@
           <a:p>
             <a:fld id="{846CE7D5-CF57-46EF-B807-FDD0502418D4}" type="datetimeFigureOut">
               <a:rPr lang="en-US" smtClean="0"/>
-              <a:t>10/9/2023</a:t>
+              <a:t>10/10/2023</a:t>
             </a:fld>
             <a:endParaRPr lang="en-US"/>
           </a:p>
@@ -1135,7 +1136,7 @@
           <a:p>
             <a:fld id="{846CE7D5-CF57-46EF-B807-FDD0502418D4}" type="datetimeFigureOut">
               <a:rPr lang="en-US" smtClean="0"/>
-              <a:t>10/9/2023</a:t>
+              <a:t>10/10/2023</a:t>
             </a:fld>
             <a:endParaRPr lang="en-US"/>
           </a:p>
@@ -1305,7 +1306,7 @@
           <a:p>
             <a:fld id="{846CE7D5-CF57-46EF-B807-FDD0502418D4}" type="datetimeFigureOut">
               <a:rPr lang="en-US" smtClean="0"/>
-              <a:t>10/9/2023</a:t>
+              <a:t>10/10/2023</a:t>
             </a:fld>
             <a:endParaRPr lang="en-US"/>
           </a:p>
@@ -1551,7 +1552,7 @@
           <a:p>
             <a:fld id="{846CE7D5-CF57-46EF-B807-FDD0502418D4}" type="datetimeFigureOut">
               <a:rPr lang="en-US" smtClean="0"/>
-              <a:t>10/9/2023</a:t>
+              <a:t>10/10/2023</a:t>
             </a:fld>
             <a:endParaRPr lang="en-US"/>
           </a:p>
@@ -1783,7 +1784,7 @@
           <a:p>
             <a:fld id="{846CE7D5-CF57-46EF-B807-FDD0502418D4}" type="datetimeFigureOut">
               <a:rPr lang="en-US" smtClean="0"/>
-              <a:t>10/9/2023</a:t>
+              <a:t>10/10/2023</a:t>
             </a:fld>
             <a:endParaRPr lang="en-US"/>
           </a:p>
@@ -2150,7 +2151,7 @@
           <a:p>
             <a:fld id="{846CE7D5-CF57-46EF-B807-FDD0502418D4}" type="datetimeFigureOut">
               <a:rPr lang="en-US" smtClean="0"/>
-              <a:t>10/9/2023</a:t>
+              <a:t>10/10/2023</a:t>
             </a:fld>
             <a:endParaRPr lang="en-US"/>
           </a:p>
@@ -2268,7 +2269,7 @@
           <a:p>
             <a:fld id="{846CE7D5-CF57-46EF-B807-FDD0502418D4}" type="datetimeFigureOut">
               <a:rPr lang="en-US" smtClean="0"/>
-              <a:t>10/9/2023</a:t>
+              <a:t>10/10/2023</a:t>
             </a:fld>
             <a:endParaRPr lang="en-US"/>
           </a:p>
@@ -2363,7 +2364,7 @@
           <a:p>
             <a:fld id="{846CE7D5-CF57-46EF-B807-FDD0502418D4}" type="datetimeFigureOut">
               <a:rPr lang="en-US" smtClean="0"/>
-              <a:t>10/9/2023</a:t>
+              <a:t>10/10/2023</a:t>
             </a:fld>
             <a:endParaRPr lang="en-US"/>
           </a:p>
@@ -2640,7 +2641,7 @@
           <a:p>
             <a:fld id="{846CE7D5-CF57-46EF-B807-FDD0502418D4}" type="datetimeFigureOut">
               <a:rPr lang="en-US" smtClean="0"/>
-              <a:t>10/9/2023</a:t>
+              <a:t>10/10/2023</a:t>
             </a:fld>
             <a:endParaRPr lang="en-US"/>
           </a:p>
@@ -2897,7 +2898,7 @@
           <a:p>
             <a:fld id="{846CE7D5-CF57-46EF-B807-FDD0502418D4}" type="datetimeFigureOut">
               <a:rPr lang="en-US" smtClean="0"/>
-              <a:t>10/9/2023</a:t>
+              <a:t>10/10/2023</a:t>
             </a:fld>
             <a:endParaRPr lang="en-US"/>
           </a:p>
@@ -3122,7 +3123,7 @@
           <a:p>
             <a:fld id="{846CE7D5-CF57-46EF-B807-FDD0502418D4}" type="datetimeFigureOut">
               <a:rPr lang="en-US" smtClean="0"/>
-              <a:t>10/9/2023</a:t>
+              <a:t>10/10/2023</a:t>
             </a:fld>
             <a:endParaRPr lang="en-US"/>
           </a:p>
@@ -3762,93 +3763,6 @@
           <p:cNvPr id="2" name="Title 1">
             <a:extLst>
               <a:ext uri="{FF2B5EF4-FFF2-40B4-BE49-F238E27FC236}">
-                <a16:creationId xmlns:a16="http://schemas.microsoft.com/office/drawing/2014/main" id="{7E3CF829-2252-1E5B-5AEC-C997FB209DA5}"/>
-              </a:ext>
-            </a:extLst>
-          </p:cNvPr>
-          <p:cNvSpPr>
-            <a:spLocks noGrp="1"/>
-          </p:cNvSpPr>
-          <p:nvPr>
-            <p:ph type="title"/>
-          </p:nvPr>
-        </p:nvSpPr>
-        <p:spPr/>
-        <p:txBody>
-          <a:bodyPr/>
-          <a:lstStyle/>
-          <a:p>
-            <a:r>
-              <a:rPr lang="en-US" dirty="0">
-                <a:ea typeface="Calibri Light"/>
-                <a:cs typeface="Calibri Light"/>
-              </a:rPr>
-              <a:t>Travel Gameplay/Mechanics</a:t>
-            </a:r>
-            <a:endParaRPr lang="en-US" dirty="0"/>
-          </a:p>
-        </p:txBody>
-      </p:sp>
-      <p:sp>
-        <p:nvSpPr>
-          <p:cNvPr id="3" name="Content Placeholder 2">
-            <a:extLst>
-              <a:ext uri="{FF2B5EF4-FFF2-40B4-BE49-F238E27FC236}">
-                <a16:creationId xmlns:a16="http://schemas.microsoft.com/office/drawing/2014/main" id="{BA748016-E1E6-A0C2-382D-8A1D056E5B65}"/>
-              </a:ext>
-            </a:extLst>
-          </p:cNvPr>
-          <p:cNvSpPr>
-            <a:spLocks noGrp="1"/>
-          </p:cNvSpPr>
-          <p:nvPr>
-            <p:ph idx="1"/>
-          </p:nvPr>
-        </p:nvSpPr>
-        <p:spPr/>
-        <p:txBody>
-          <a:bodyPr/>
-          <a:lstStyle/>
-          <a:p>
-            <a:endParaRPr lang="en-US"/>
-          </a:p>
-        </p:txBody>
-      </p:sp>
-    </p:spTree>
-    <p:extLst>
-      <p:ext uri="{BB962C8B-B14F-4D97-AF65-F5344CB8AC3E}">
-        <p14:creationId xmlns:p14="http://schemas.microsoft.com/office/powerpoint/2010/main" val="3514244704"/>
-      </p:ext>
-    </p:extLst>
-  </p:cSld>
-  <p:clrMapOvr>
-    <a:masterClrMapping/>
-  </p:clrMapOvr>
-</p:sld>
-</file>
-
-<file path=ppt/slides/slide12.xml><?xml version="1.0" encoding="utf-8"?>
-<p:sld xmlns:a="http://schemas.openxmlformats.org/drawingml/2006/main" xmlns:r="http://schemas.openxmlformats.org/officeDocument/2006/relationships" xmlns:p="http://schemas.openxmlformats.org/presentationml/2006/main">
-  <p:cSld>
-    <p:spTree>
-      <p:nvGrpSpPr>
-        <p:cNvPr id="1" name=""/>
-        <p:cNvGrpSpPr/>
-        <p:nvPr/>
-      </p:nvGrpSpPr>
-      <p:grpSpPr>
-        <a:xfrm>
-          <a:off x="0" y="0"/>
-          <a:ext cx="0" cy="0"/>
-          <a:chOff x="0" y="0"/>
-          <a:chExt cx="0" cy="0"/>
-        </a:xfrm>
-      </p:grpSpPr>
-      <p:sp>
-        <p:nvSpPr>
-          <p:cNvPr id="2" name="Title 1">
-            <a:extLst>
-              <a:ext uri="{FF2B5EF4-FFF2-40B4-BE49-F238E27FC236}">
                 <a16:creationId xmlns:a16="http://schemas.microsoft.com/office/drawing/2014/main" id="{5062687C-677B-942A-9161-3269826DDD4E}"/>
               </a:ext>
             </a:extLst>
@@ -3899,15 +3813,7 @@
           <a:p>
             <a:r>
               <a:rPr lang="en-US" dirty="0"/>
-              <a:t>We don’t need many buttons, so we could bind </a:t>
-            </a:r>
-            <a:r>
-              <a:rPr lang="en-US"/>
-              <a:t>each equip key to corelating </a:t>
-            </a:r>
-            <a:r>
-              <a:rPr lang="en-US" dirty="0"/>
-              <a:t>socket</a:t>
+              <a:t>We don’t need many buttons, so we could bind each equip key to corelating socket</a:t>
             </a:r>
           </a:p>
         </p:txBody>
@@ -3925,7 +3831,7 @@
 </p:sld>
 </file>
 
-<file path=ppt/slides/slide13.xml><?xml version="1.0" encoding="utf-8"?>
+<file path=ppt/slides/slide12.xml><?xml version="1.0" encoding="utf-8"?>
 <p:sld xmlns:a="http://schemas.openxmlformats.org/drawingml/2006/main" xmlns:r="http://schemas.openxmlformats.org/officeDocument/2006/relationships" xmlns:p="http://schemas.openxmlformats.org/presentationml/2006/main">
   <p:cSld>
     <p:bg>
@@ -4020,7 +3926,7 @@
 </p:sld>
 </file>
 
-<file path=ppt/slides/slide14.xml><?xml version="1.0" encoding="utf-8"?>
+<file path=ppt/slides/slide13.xml><?xml version="1.0" encoding="utf-8"?>
 <p:sld xmlns:a="http://schemas.openxmlformats.org/drawingml/2006/main" xmlns:r="http://schemas.openxmlformats.org/officeDocument/2006/relationships" xmlns:p="http://schemas.openxmlformats.org/presentationml/2006/main">
   <p:cSld>
     <p:spTree>
@@ -4107,7 +4013,7 @@
 </p:sld>
 </file>
 
-<file path=ppt/slides/slide15.xml><?xml version="1.0" encoding="utf-8"?>
+<file path=ppt/slides/slide14.xml><?xml version="1.0" encoding="utf-8"?>
 <p:sld xmlns:a="http://schemas.openxmlformats.org/drawingml/2006/main" xmlns:r="http://schemas.openxmlformats.org/officeDocument/2006/relationships" xmlns:p="http://schemas.openxmlformats.org/presentationml/2006/main">
   <p:cSld>
     <p:bg>
@@ -4193,6 +4099,160 @@
     <p:extLst>
       <p:ext uri="{BB962C8B-B14F-4D97-AF65-F5344CB8AC3E}">
         <p14:creationId xmlns:p14="http://schemas.microsoft.com/office/powerpoint/2010/main" val="1475552678"/>
+      </p:ext>
+    </p:extLst>
+  </p:cSld>
+  <p:clrMapOvr>
+    <a:masterClrMapping/>
+  </p:clrMapOvr>
+</p:sld>
+</file>
+
+<file path=ppt/slides/slide15.xml><?xml version="1.0" encoding="utf-8"?>
+<p:sld xmlns:a="http://schemas.openxmlformats.org/drawingml/2006/main" xmlns:r="http://schemas.openxmlformats.org/officeDocument/2006/relationships" xmlns:p="http://schemas.openxmlformats.org/presentationml/2006/main">
+  <p:cSld>
+    <p:spTree>
+      <p:nvGrpSpPr>
+        <p:cNvPr id="1" name=""/>
+        <p:cNvGrpSpPr/>
+        <p:nvPr/>
+      </p:nvGrpSpPr>
+      <p:grpSpPr>
+        <a:xfrm>
+          <a:off x="0" y="0"/>
+          <a:ext cx="0" cy="0"/>
+          <a:chOff x="0" y="0"/>
+          <a:chExt cx="0" cy="0"/>
+        </a:xfrm>
+      </p:grpSpPr>
+      <p:sp>
+        <p:nvSpPr>
+          <p:cNvPr id="2" name="Title 1">
+            <a:extLst>
+              <a:ext uri="{FF2B5EF4-FFF2-40B4-BE49-F238E27FC236}">
+                <a16:creationId xmlns:a16="http://schemas.microsoft.com/office/drawing/2014/main" id="{2F510B3C-B5D3-672A-E50D-68FC8DEC6E94}"/>
+              </a:ext>
+            </a:extLst>
+          </p:cNvPr>
+          <p:cNvSpPr>
+            <a:spLocks noGrp="1"/>
+          </p:cNvSpPr>
+          <p:nvPr>
+            <p:ph type="title"/>
+          </p:nvPr>
+        </p:nvSpPr>
+        <p:spPr/>
+        <p:txBody>
+          <a:bodyPr/>
+          <a:lstStyle/>
+          <a:p>
+            <a:r>
+              <a:rPr lang="en-US" dirty="0">
+                <a:ea typeface="Calibri Light"/>
+                <a:cs typeface="Calibri Light"/>
+              </a:rPr>
+              <a:t>Basic Thug</a:t>
+            </a:r>
+            <a:endParaRPr lang="en-US" dirty="0"/>
+          </a:p>
+        </p:txBody>
+      </p:sp>
+      <p:sp>
+        <p:nvSpPr>
+          <p:cNvPr id="3" name="Content Placeholder 2">
+            <a:extLst>
+              <a:ext uri="{FF2B5EF4-FFF2-40B4-BE49-F238E27FC236}">
+                <a16:creationId xmlns:a16="http://schemas.microsoft.com/office/drawing/2014/main" id="{34213A9F-A72E-C85A-E6F3-A17B97972F15}"/>
+              </a:ext>
+            </a:extLst>
+          </p:cNvPr>
+          <p:cNvSpPr>
+            <a:spLocks noGrp="1"/>
+          </p:cNvSpPr>
+          <p:nvPr>
+            <p:ph idx="1"/>
+          </p:nvPr>
+        </p:nvSpPr>
+        <p:spPr/>
+        <p:txBody>
+          <a:bodyPr vert="horz" lIns="91440" tIns="45720" rIns="91440" bIns="45720" rtlCol="0" anchor="t">
+            <a:normAutofit/>
+          </a:bodyPr>
+          <a:lstStyle/>
+          <a:p>
+            <a:r>
+              <a:rPr lang="en-US" dirty="0">
+                <a:ea typeface="Calibri"/>
+                <a:cs typeface="Calibri"/>
+              </a:rPr>
+              <a:t>We can add enemy variety with different weapons/equipment</a:t>
+            </a:r>
+          </a:p>
+          <a:p>
+            <a:r>
+              <a:rPr lang="en-US" dirty="0">
+                <a:ea typeface="Calibri"/>
+                <a:cs typeface="Calibri"/>
+              </a:rPr>
+              <a:t>Bosses could also add variety (if we </a:t>
+            </a:r>
+            <a:r>
+              <a:rPr lang="en-US" err="1">
+                <a:ea typeface="Calibri"/>
+                <a:cs typeface="Calibri"/>
+              </a:rPr>
+              <a:t>perscribe</a:t>
+            </a:r>
+            <a:r>
+              <a:rPr lang="en-US" dirty="0">
+                <a:ea typeface="Calibri"/>
+                <a:cs typeface="Calibri"/>
+              </a:rPr>
+              <a:t> sufficient time)</a:t>
+            </a:r>
+          </a:p>
+          <a:p>
+            <a:r>
+              <a:rPr lang="en-US" dirty="0">
+                <a:ea typeface="Calibri"/>
+                <a:cs typeface="Calibri"/>
+              </a:rPr>
+              <a:t>No weapons (so little damage)</a:t>
+            </a:r>
+          </a:p>
+          <a:p>
+            <a:r>
+              <a:rPr lang="en-US" dirty="0">
+                <a:ea typeface="Calibri"/>
+                <a:cs typeface="Calibri"/>
+              </a:rPr>
+              <a:t>Only option is to attack player with melee</a:t>
+            </a:r>
+          </a:p>
+          <a:p>
+            <a:r>
+              <a:rPr lang="en-US" dirty="0">
+                <a:ea typeface="Calibri"/>
+                <a:cs typeface="Calibri"/>
+              </a:rPr>
+              <a:t>{maybe we allow friendly fire – helps with the repetitive nature of melee enemies ganging up on the player, and also entertaining}</a:t>
+            </a:r>
+          </a:p>
+          <a:p>
+            <a:r>
+              <a:rPr lang="en-US" dirty="0">
+                <a:ea typeface="Calibri"/>
+                <a:cs typeface="Calibri"/>
+              </a:rPr>
+              <a:t>[each enemy weapon type we use will have it's own slide to allow for more detail]</a:t>
+            </a:r>
+          </a:p>
+        </p:txBody>
+      </p:sp>
+    </p:spTree>
+    <p:extLst>
+      <p:ext uri="{BB962C8B-B14F-4D97-AF65-F5344CB8AC3E}">
+        <p14:creationId xmlns:p14="http://schemas.microsoft.com/office/powerpoint/2010/main" val="1839603197"/>
       </p:ext>
     </p:extLst>
   </p:cSld>
@@ -4224,160 +4284,6 @@
           <p:cNvPr id="2" name="Title 1">
             <a:extLst>
               <a:ext uri="{FF2B5EF4-FFF2-40B4-BE49-F238E27FC236}">
-                <a16:creationId xmlns:a16="http://schemas.microsoft.com/office/drawing/2014/main" id="{2F510B3C-B5D3-672A-E50D-68FC8DEC6E94}"/>
-              </a:ext>
-            </a:extLst>
-          </p:cNvPr>
-          <p:cNvSpPr>
-            <a:spLocks noGrp="1"/>
-          </p:cNvSpPr>
-          <p:nvPr>
-            <p:ph type="title"/>
-          </p:nvPr>
-        </p:nvSpPr>
-        <p:spPr/>
-        <p:txBody>
-          <a:bodyPr/>
-          <a:lstStyle/>
-          <a:p>
-            <a:r>
-              <a:rPr lang="en-US" dirty="0">
-                <a:ea typeface="Calibri Light"/>
-                <a:cs typeface="Calibri Light"/>
-              </a:rPr>
-              <a:t>Basic Thug</a:t>
-            </a:r>
-            <a:endParaRPr lang="en-US" dirty="0"/>
-          </a:p>
-        </p:txBody>
-      </p:sp>
-      <p:sp>
-        <p:nvSpPr>
-          <p:cNvPr id="3" name="Content Placeholder 2">
-            <a:extLst>
-              <a:ext uri="{FF2B5EF4-FFF2-40B4-BE49-F238E27FC236}">
-                <a16:creationId xmlns:a16="http://schemas.microsoft.com/office/drawing/2014/main" id="{34213A9F-A72E-C85A-E6F3-A17B97972F15}"/>
-              </a:ext>
-            </a:extLst>
-          </p:cNvPr>
-          <p:cNvSpPr>
-            <a:spLocks noGrp="1"/>
-          </p:cNvSpPr>
-          <p:nvPr>
-            <p:ph idx="1"/>
-          </p:nvPr>
-        </p:nvSpPr>
-        <p:spPr/>
-        <p:txBody>
-          <a:bodyPr vert="horz" lIns="91440" tIns="45720" rIns="91440" bIns="45720" rtlCol="0" anchor="t">
-            <a:normAutofit/>
-          </a:bodyPr>
-          <a:lstStyle/>
-          <a:p>
-            <a:r>
-              <a:rPr lang="en-US" dirty="0">
-                <a:ea typeface="Calibri"/>
-                <a:cs typeface="Calibri"/>
-              </a:rPr>
-              <a:t>We can add enemy variety with different weapons/equipment</a:t>
-            </a:r>
-          </a:p>
-          <a:p>
-            <a:r>
-              <a:rPr lang="en-US" dirty="0">
-                <a:ea typeface="Calibri"/>
-                <a:cs typeface="Calibri"/>
-              </a:rPr>
-              <a:t>Bosses could also add variety (if we </a:t>
-            </a:r>
-            <a:r>
-              <a:rPr lang="en-US" err="1">
-                <a:ea typeface="Calibri"/>
-                <a:cs typeface="Calibri"/>
-              </a:rPr>
-              <a:t>perscribe</a:t>
-            </a:r>
-            <a:r>
-              <a:rPr lang="en-US" dirty="0">
-                <a:ea typeface="Calibri"/>
-                <a:cs typeface="Calibri"/>
-              </a:rPr>
-              <a:t> sufficient time)</a:t>
-            </a:r>
-          </a:p>
-          <a:p>
-            <a:r>
-              <a:rPr lang="en-US" dirty="0">
-                <a:ea typeface="Calibri"/>
-                <a:cs typeface="Calibri"/>
-              </a:rPr>
-              <a:t>No weapons (so little damage)</a:t>
-            </a:r>
-          </a:p>
-          <a:p>
-            <a:r>
-              <a:rPr lang="en-US" dirty="0">
-                <a:ea typeface="Calibri"/>
-                <a:cs typeface="Calibri"/>
-              </a:rPr>
-              <a:t>Only option is to attack player with melee</a:t>
-            </a:r>
-          </a:p>
-          <a:p>
-            <a:r>
-              <a:rPr lang="en-US" dirty="0">
-                <a:ea typeface="Calibri"/>
-                <a:cs typeface="Calibri"/>
-              </a:rPr>
-              <a:t>{maybe we allow friendly fire – helps with the repetitive nature of melee enemies ganging up on the player, and also entertaining}</a:t>
-            </a:r>
-          </a:p>
-          <a:p>
-            <a:r>
-              <a:rPr lang="en-US" dirty="0">
-                <a:ea typeface="Calibri"/>
-                <a:cs typeface="Calibri"/>
-              </a:rPr>
-              <a:t>[each enemy weapon type we use will have it's own slide to allow for more detail]</a:t>
-            </a:r>
-          </a:p>
-        </p:txBody>
-      </p:sp>
-    </p:spTree>
-    <p:extLst>
-      <p:ext uri="{BB962C8B-B14F-4D97-AF65-F5344CB8AC3E}">
-        <p14:creationId xmlns:p14="http://schemas.microsoft.com/office/powerpoint/2010/main" val="1839603197"/>
-      </p:ext>
-    </p:extLst>
-  </p:cSld>
-  <p:clrMapOvr>
-    <a:masterClrMapping/>
-  </p:clrMapOvr>
-</p:sld>
-</file>
-
-<file path=ppt/slides/slide17.xml><?xml version="1.0" encoding="utf-8"?>
-<p:sld xmlns:a="http://schemas.openxmlformats.org/drawingml/2006/main" xmlns:r="http://schemas.openxmlformats.org/officeDocument/2006/relationships" xmlns:p="http://schemas.openxmlformats.org/presentationml/2006/main">
-  <p:cSld>
-    <p:spTree>
-      <p:nvGrpSpPr>
-        <p:cNvPr id="1" name=""/>
-        <p:cNvGrpSpPr/>
-        <p:nvPr/>
-      </p:nvGrpSpPr>
-      <p:grpSpPr>
-        <a:xfrm>
-          <a:off x="0" y="0"/>
-          <a:ext cx="0" cy="0"/>
-          <a:chOff x="0" y="0"/>
-          <a:chExt cx="0" cy="0"/>
-        </a:xfrm>
-      </p:grpSpPr>
-      <p:sp>
-        <p:nvSpPr>
-          <p:cNvPr id="2" name="Title 1">
-            <a:extLst>
-              <a:ext uri="{FF2B5EF4-FFF2-40B4-BE49-F238E27FC236}">
                 <a16:creationId xmlns:a16="http://schemas.microsoft.com/office/drawing/2014/main" id="{B96217FF-11F1-02A9-1262-DA7D6DEF9869}"/>
               </a:ext>
             </a:extLst>
@@ -4475,7 +4381,7 @@
 </p:sld>
 </file>
 
-<file path=ppt/slides/slide18.xml><?xml version="1.0" encoding="utf-8"?>
+<file path=ppt/slides/slide17.xml><?xml version="1.0" encoding="utf-8"?>
 <p:sld xmlns:a="http://schemas.openxmlformats.org/drawingml/2006/main" xmlns:r="http://schemas.openxmlformats.org/officeDocument/2006/relationships" xmlns:p="http://schemas.openxmlformats.org/presentationml/2006/main">
   <p:cSld>
     <p:bg>
@@ -4561,6 +4467,101 @@
     <p:extLst>
       <p:ext uri="{BB962C8B-B14F-4D97-AF65-F5344CB8AC3E}">
         <p14:creationId xmlns:p14="http://schemas.microsoft.com/office/powerpoint/2010/main" val="2226716358"/>
+      </p:ext>
+    </p:extLst>
+  </p:cSld>
+  <p:clrMapOvr>
+    <a:masterClrMapping/>
+  </p:clrMapOvr>
+</p:sld>
+</file>
+
+<file path=ppt/slides/slide18.xml><?xml version="1.0" encoding="utf-8"?>
+<p:sld xmlns:a="http://schemas.openxmlformats.org/drawingml/2006/main" xmlns:r="http://schemas.openxmlformats.org/officeDocument/2006/relationships" xmlns:p="http://schemas.openxmlformats.org/presentationml/2006/main">
+  <p:cSld>
+    <p:spTree>
+      <p:nvGrpSpPr>
+        <p:cNvPr id="1" name=""/>
+        <p:cNvGrpSpPr/>
+        <p:nvPr/>
+      </p:nvGrpSpPr>
+      <p:grpSpPr>
+        <a:xfrm>
+          <a:off x="0" y="0"/>
+          <a:ext cx="0" cy="0"/>
+          <a:chOff x="0" y="0"/>
+          <a:chExt cx="0" cy="0"/>
+        </a:xfrm>
+      </p:grpSpPr>
+      <p:sp>
+        <p:nvSpPr>
+          <p:cNvPr id="2" name="Title 1">
+            <a:extLst>
+              <a:ext uri="{FF2B5EF4-FFF2-40B4-BE49-F238E27FC236}">
+                <a16:creationId xmlns:a16="http://schemas.microsoft.com/office/drawing/2014/main" id="{672EB8FE-9BDC-99D2-20B3-823111937B3C}"/>
+              </a:ext>
+            </a:extLst>
+          </p:cNvPr>
+          <p:cNvSpPr>
+            <a:spLocks noGrp="1"/>
+          </p:cNvSpPr>
+          <p:nvPr>
+            <p:ph type="title"/>
+          </p:nvPr>
+        </p:nvSpPr>
+        <p:spPr/>
+        <p:txBody>
+          <a:bodyPr/>
+          <a:lstStyle/>
+          <a:p>
+            <a:r>
+              <a:rPr lang="en-US" dirty="0">
+                <a:ea typeface="Calibri Light"/>
+                <a:cs typeface="Calibri Light"/>
+              </a:rPr>
+              <a:t>Wall Bounce</a:t>
+            </a:r>
+            <a:endParaRPr lang="en-US" dirty="0" err="1"/>
+          </a:p>
+        </p:txBody>
+      </p:sp>
+      <p:sp>
+        <p:nvSpPr>
+          <p:cNvPr id="3" name="Content Placeholder 2">
+            <a:extLst>
+              <a:ext uri="{FF2B5EF4-FFF2-40B4-BE49-F238E27FC236}">
+                <a16:creationId xmlns:a16="http://schemas.microsoft.com/office/drawing/2014/main" id="{E06D7B82-1649-EF9C-0051-D71FCC349B43}"/>
+              </a:ext>
+            </a:extLst>
+          </p:cNvPr>
+          <p:cNvSpPr>
+            <a:spLocks noGrp="1"/>
+          </p:cNvSpPr>
+          <p:nvPr>
+            <p:ph idx="1"/>
+          </p:nvPr>
+        </p:nvSpPr>
+        <p:spPr/>
+        <p:txBody>
+          <a:bodyPr vert="horz" lIns="91440" tIns="45720" rIns="91440" bIns="45720" rtlCol="0" anchor="t">
+            <a:normAutofit/>
+          </a:bodyPr>
+          <a:lstStyle/>
+          <a:p>
+            <a:r>
+              <a:rPr lang="en-US" dirty="0">
+                <a:ea typeface="Calibri"/>
+                <a:cs typeface="Calibri"/>
+              </a:rPr>
+              <a:t>Knock back into wall deals little extra damage [additional cool thing to make combat more varied]</a:t>
+            </a:r>
+          </a:p>
+        </p:txBody>
+      </p:sp>
+    </p:spTree>
+    <p:extLst>
+      <p:ext uri="{BB962C8B-B14F-4D97-AF65-F5344CB8AC3E}">
+        <p14:creationId xmlns:p14="http://schemas.microsoft.com/office/powerpoint/2010/main" val="2820152346"/>
       </p:ext>
     </p:extLst>
   </p:cSld>
@@ -4592,7 +4593,7 @@
           <p:cNvPr id="2" name="Title 1">
             <a:extLst>
               <a:ext uri="{FF2B5EF4-FFF2-40B4-BE49-F238E27FC236}">
-                <a16:creationId xmlns:a16="http://schemas.microsoft.com/office/drawing/2014/main" id="{672EB8FE-9BDC-99D2-20B3-823111937B3C}"/>
+                <a16:creationId xmlns:a16="http://schemas.microsoft.com/office/drawing/2014/main" id="{422205A5-894D-A436-DB8B-3D5D1AB2C1C2}"/>
               </a:ext>
             </a:extLst>
           </p:cNvPr>
@@ -4613,9 +4614,9 @@
                 <a:ea typeface="Calibri Light"/>
                 <a:cs typeface="Calibri Light"/>
               </a:rPr>
-              <a:t>Wall Bounce</a:t>
-            </a:r>
-            <a:endParaRPr lang="en-US" dirty="0" err="1"/>
+              <a:t>Conveyer Belt</a:t>
+            </a:r>
+            <a:endParaRPr lang="en-US" dirty="0"/>
           </a:p>
         </p:txBody>
       </p:sp>
@@ -4624,7 +4625,7 @@
           <p:cNvPr id="3" name="Content Placeholder 2">
             <a:extLst>
               <a:ext uri="{FF2B5EF4-FFF2-40B4-BE49-F238E27FC236}">
-                <a16:creationId xmlns:a16="http://schemas.microsoft.com/office/drawing/2014/main" id="{E06D7B82-1649-EF9C-0051-D71FCC349B43}"/>
+                <a16:creationId xmlns:a16="http://schemas.microsoft.com/office/drawing/2014/main" id="{5D4ACD69-08EC-E60A-EEA0-F8522ECB9175}"/>
               </a:ext>
             </a:extLst>
           </p:cNvPr>
@@ -4647,15 +4648,30 @@
                 <a:ea typeface="Calibri"/>
                 <a:cs typeface="Calibri"/>
               </a:rPr>
-              <a:t>Knock back into wall deals little extra damage [additional cool thing to make combat more varied]</a:t>
-            </a:r>
+              <a:t>[Very </a:t>
+            </a:r>
+            <a:r>
+              <a:rPr lang="en-US" dirty="0" err="1">
+                <a:ea typeface="Calibri"/>
+                <a:cs typeface="Calibri"/>
+              </a:rPr>
+              <a:t>gangbeasts</a:t>
+            </a:r>
+            <a:r>
+              <a:rPr lang="en-US" dirty="0">
+                <a:ea typeface="Calibri"/>
+                <a:cs typeface="Calibri"/>
+              </a:rPr>
+              <a:t> – also additional]</a:t>
+            </a:r>
+            <a:endParaRPr lang="en-US" dirty="0"/>
           </a:p>
         </p:txBody>
       </p:sp>
     </p:spTree>
     <p:extLst>
       <p:ext uri="{BB962C8B-B14F-4D97-AF65-F5344CB8AC3E}">
-        <p14:creationId xmlns:p14="http://schemas.microsoft.com/office/powerpoint/2010/main" val="2820152346"/>
+        <p14:creationId xmlns:p14="http://schemas.microsoft.com/office/powerpoint/2010/main" val="3072309207"/>
       </p:ext>
     </p:extLst>
   </p:cSld>
@@ -4809,116 +4825,6 @@
           <p:cNvPr id="2" name="Title 1">
             <a:extLst>
               <a:ext uri="{FF2B5EF4-FFF2-40B4-BE49-F238E27FC236}">
-                <a16:creationId xmlns:a16="http://schemas.microsoft.com/office/drawing/2014/main" id="{422205A5-894D-A436-DB8B-3D5D1AB2C1C2}"/>
-              </a:ext>
-            </a:extLst>
-          </p:cNvPr>
-          <p:cNvSpPr>
-            <a:spLocks noGrp="1"/>
-          </p:cNvSpPr>
-          <p:nvPr>
-            <p:ph type="title"/>
-          </p:nvPr>
-        </p:nvSpPr>
-        <p:spPr/>
-        <p:txBody>
-          <a:bodyPr/>
-          <a:lstStyle/>
-          <a:p>
-            <a:r>
-              <a:rPr lang="en-US" dirty="0">
-                <a:ea typeface="Calibri Light"/>
-                <a:cs typeface="Calibri Light"/>
-              </a:rPr>
-              <a:t>Conveyer Belt</a:t>
-            </a:r>
-            <a:endParaRPr lang="en-US" dirty="0"/>
-          </a:p>
-        </p:txBody>
-      </p:sp>
-      <p:sp>
-        <p:nvSpPr>
-          <p:cNvPr id="3" name="Content Placeholder 2">
-            <a:extLst>
-              <a:ext uri="{FF2B5EF4-FFF2-40B4-BE49-F238E27FC236}">
-                <a16:creationId xmlns:a16="http://schemas.microsoft.com/office/drawing/2014/main" id="{5D4ACD69-08EC-E60A-EEA0-F8522ECB9175}"/>
-              </a:ext>
-            </a:extLst>
-          </p:cNvPr>
-          <p:cNvSpPr>
-            <a:spLocks noGrp="1"/>
-          </p:cNvSpPr>
-          <p:nvPr>
-            <p:ph idx="1"/>
-          </p:nvPr>
-        </p:nvSpPr>
-        <p:spPr/>
-        <p:txBody>
-          <a:bodyPr vert="horz" lIns="91440" tIns="45720" rIns="91440" bIns="45720" rtlCol="0" anchor="t">
-            <a:normAutofit/>
-          </a:bodyPr>
-          <a:lstStyle/>
-          <a:p>
-            <a:r>
-              <a:rPr lang="en-US" dirty="0">
-                <a:ea typeface="Calibri"/>
-                <a:cs typeface="Calibri"/>
-              </a:rPr>
-              <a:t>[Very </a:t>
-            </a:r>
-            <a:r>
-              <a:rPr lang="en-US" dirty="0" err="1">
-                <a:ea typeface="Calibri"/>
-                <a:cs typeface="Calibri"/>
-              </a:rPr>
-              <a:t>gangbeasts</a:t>
-            </a:r>
-            <a:r>
-              <a:rPr lang="en-US" dirty="0">
-                <a:ea typeface="Calibri"/>
-                <a:cs typeface="Calibri"/>
-              </a:rPr>
-              <a:t> – also additional]</a:t>
-            </a:r>
-            <a:endParaRPr lang="en-US" dirty="0"/>
-          </a:p>
-        </p:txBody>
-      </p:sp>
-    </p:spTree>
-    <p:extLst>
-      <p:ext uri="{BB962C8B-B14F-4D97-AF65-F5344CB8AC3E}">
-        <p14:creationId xmlns:p14="http://schemas.microsoft.com/office/powerpoint/2010/main" val="3072309207"/>
-      </p:ext>
-    </p:extLst>
-  </p:cSld>
-  <p:clrMapOvr>
-    <a:masterClrMapping/>
-  </p:clrMapOvr>
-</p:sld>
-</file>
-
-<file path=ppt/slides/slide21.xml><?xml version="1.0" encoding="utf-8"?>
-<p:sld xmlns:a="http://schemas.openxmlformats.org/drawingml/2006/main" xmlns:r="http://schemas.openxmlformats.org/officeDocument/2006/relationships" xmlns:p="http://schemas.openxmlformats.org/presentationml/2006/main">
-  <p:cSld>
-    <p:spTree>
-      <p:nvGrpSpPr>
-        <p:cNvPr id="1" name=""/>
-        <p:cNvGrpSpPr/>
-        <p:nvPr/>
-      </p:nvGrpSpPr>
-      <p:grpSpPr>
-        <a:xfrm>
-          <a:off x="0" y="0"/>
-          <a:ext cx="0" cy="0"/>
-          <a:chOff x="0" y="0"/>
-          <a:chExt cx="0" cy="0"/>
-        </a:xfrm>
-      </p:grpSpPr>
-      <p:sp>
-        <p:nvSpPr>
-          <p:cNvPr id="2" name="Title 1">
-            <a:extLst>
-              <a:ext uri="{FF2B5EF4-FFF2-40B4-BE49-F238E27FC236}">
                 <a16:creationId xmlns:a16="http://schemas.microsoft.com/office/drawing/2014/main" id="{78BEE34F-7820-348C-3C35-B3AB325D387F}"/>
               </a:ext>
             </a:extLst>
@@ -4974,21 +4880,7 @@
                 <a:ea typeface="Calibri"/>
                 <a:cs typeface="Calibri"/>
               </a:rPr>
-              <a:t>Tables and furniture and stuff that player can use as a wall or cover, but also pick up for </a:t>
-            </a:r>
-            <a:r>
-              <a:rPr lang="en-US" dirty="0" err="1">
-                <a:ea typeface="Calibri"/>
-                <a:cs typeface="Calibri"/>
-              </a:rPr>
-              <a:t>shenanigins</a:t>
-            </a:r>
-            <a:r>
-              <a:rPr lang="en-US" dirty="0">
-                <a:ea typeface="Calibri"/>
-                <a:cs typeface="Calibri"/>
-              </a:rPr>
-              <a:t> (violence) [also additional]</a:t>
+              <a:t>Tables and furniture and stuff that player can use as a wall or cover, but also pick up for shenanigans (violence) [also additional]</a:t>
             </a:r>
             <a:endParaRPr lang="en-US" dirty="0"/>
           </a:p>
@@ -5007,7 +4899,7 @@
 </p:sld>
 </file>
 
-<file path=ppt/slides/slide22.xml><?xml version="1.0" encoding="utf-8"?>
+<file path=ppt/slides/slide21.xml><?xml version="1.0" encoding="utf-8"?>
 <p:sld xmlns:a="http://schemas.openxmlformats.org/drawingml/2006/main" xmlns:r="http://schemas.openxmlformats.org/officeDocument/2006/relationships" xmlns:p="http://schemas.openxmlformats.org/presentationml/2006/main">
   <p:cSld>
     <p:bg>
@@ -5093,6 +4985,160 @@
     <p:extLst>
       <p:ext uri="{BB962C8B-B14F-4D97-AF65-F5344CB8AC3E}">
         <p14:creationId xmlns:p14="http://schemas.microsoft.com/office/powerpoint/2010/main" val="1050023752"/>
+      </p:ext>
+    </p:extLst>
+  </p:cSld>
+  <p:clrMapOvr>
+    <a:masterClrMapping/>
+  </p:clrMapOvr>
+</p:sld>
+</file>
+
+<file path=ppt/slides/slide22.xml><?xml version="1.0" encoding="utf-8"?>
+<p:sld xmlns:a="http://schemas.openxmlformats.org/drawingml/2006/main" xmlns:r="http://schemas.openxmlformats.org/officeDocument/2006/relationships" xmlns:p="http://schemas.openxmlformats.org/presentationml/2006/main">
+  <p:cSld>
+    <p:spTree>
+      <p:nvGrpSpPr>
+        <p:cNvPr id="1" name=""/>
+        <p:cNvGrpSpPr/>
+        <p:nvPr/>
+      </p:nvGrpSpPr>
+      <p:grpSpPr>
+        <a:xfrm>
+          <a:off x="0" y="0"/>
+          <a:ext cx="0" cy="0"/>
+          <a:chOff x="0" y="0"/>
+          <a:chExt cx="0" cy="0"/>
+        </a:xfrm>
+      </p:grpSpPr>
+      <p:sp>
+        <p:nvSpPr>
+          <p:cNvPr id="2" name="Title 1">
+            <a:extLst>
+              <a:ext uri="{FF2B5EF4-FFF2-40B4-BE49-F238E27FC236}">
+                <a16:creationId xmlns:a16="http://schemas.microsoft.com/office/drawing/2014/main" id="{A63136AD-2458-A357-223A-99708E79B52F}"/>
+              </a:ext>
+            </a:extLst>
+          </p:cNvPr>
+          <p:cNvSpPr>
+            <a:spLocks noGrp="1"/>
+          </p:cNvSpPr>
+          <p:nvPr>
+            <p:ph type="title"/>
+          </p:nvPr>
+        </p:nvSpPr>
+        <p:spPr/>
+        <p:txBody>
+          <a:bodyPr/>
+          <a:lstStyle/>
+          <a:p>
+            <a:r>
+              <a:rPr lang="en-US" dirty="0">
+                <a:ea typeface="Calibri Light"/>
+                <a:cs typeface="Calibri Light"/>
+              </a:rPr>
+              <a:t>Announcer</a:t>
+            </a:r>
+            <a:endParaRPr lang="en-US" dirty="0"/>
+          </a:p>
+        </p:txBody>
+      </p:sp>
+      <p:sp>
+        <p:nvSpPr>
+          <p:cNvPr id="3" name="Content Placeholder 2">
+            <a:extLst>
+              <a:ext uri="{FF2B5EF4-FFF2-40B4-BE49-F238E27FC236}">
+                <a16:creationId xmlns:a16="http://schemas.microsoft.com/office/drawing/2014/main" id="{DD6D8731-A978-7BF7-5CBC-1F1B0E0C37A6}"/>
+              </a:ext>
+            </a:extLst>
+          </p:cNvPr>
+          <p:cNvSpPr>
+            <a:spLocks noGrp="1"/>
+          </p:cNvSpPr>
+          <p:nvPr>
+            <p:ph idx="1"/>
+          </p:nvPr>
+        </p:nvSpPr>
+        <p:spPr/>
+        <p:txBody>
+          <a:bodyPr vert="horz" lIns="91440" tIns="45720" rIns="91440" bIns="45720" rtlCol="0" anchor="t">
+            <a:normAutofit/>
+          </a:bodyPr>
+          <a:lstStyle/>
+          <a:p>
+            <a:r>
+              <a:rPr lang="en-US" err="1">
+                <a:ea typeface="Calibri"/>
+                <a:cs typeface="Calibri"/>
+              </a:rPr>
+              <a:t>Basicaly</a:t>
+            </a:r>
+            <a:r>
+              <a:rPr lang="en-US" dirty="0">
+                <a:ea typeface="Calibri"/>
+                <a:cs typeface="Calibri"/>
+              </a:rPr>
+              <a:t> </a:t>
+            </a:r>
+            <a:r>
+              <a:rPr lang="en-US" err="1">
+                <a:ea typeface="Calibri"/>
+                <a:cs typeface="Calibri"/>
+              </a:rPr>
+              <a:t>Narator</a:t>
+            </a:r>
+            <a:endParaRPr lang="en-US" dirty="0" err="1">
+              <a:ea typeface="Calibri"/>
+              <a:cs typeface="Calibri"/>
+            </a:endParaRPr>
+          </a:p>
+          <a:p>
+            <a:r>
+              <a:rPr lang="en-US" dirty="0">
+                <a:ea typeface="Calibri"/>
+                <a:cs typeface="Calibri"/>
+              </a:rPr>
+              <a:t>They explain things</a:t>
+            </a:r>
+          </a:p>
+          <a:p>
+            <a:r>
+              <a:rPr lang="en-US" dirty="0">
+                <a:ea typeface="Calibri"/>
+                <a:cs typeface="Calibri"/>
+              </a:rPr>
+              <a:t>Game is </a:t>
+            </a:r>
+            <a:r>
+              <a:rPr lang="en-US" dirty="0" err="1">
+                <a:ea typeface="Calibri"/>
+                <a:cs typeface="Calibri"/>
+              </a:rPr>
+              <a:t>basicaly</a:t>
+            </a:r>
+            <a:r>
+              <a:rPr lang="en-US" dirty="0">
+                <a:ea typeface="Calibri"/>
+                <a:cs typeface="Calibri"/>
+              </a:rPr>
+              <a:t> a game show that they announce [either text or voiced dialogue would work fine]</a:t>
+            </a:r>
+          </a:p>
+          <a:p>
+            <a:r>
+              <a:rPr lang="en-US" dirty="0">
+                <a:ea typeface="Calibri"/>
+                <a:cs typeface="Calibri"/>
+              </a:rPr>
+              <a:t>They are a hype man, they're dramatic, and snarky</a:t>
+            </a:r>
+          </a:p>
+        </p:txBody>
+      </p:sp>
+    </p:spTree>
+    <p:extLst>
+      <p:ext uri="{BB962C8B-B14F-4D97-AF65-F5344CB8AC3E}">
+        <p14:creationId xmlns:p14="http://schemas.microsoft.com/office/powerpoint/2010/main" val="2803468791"/>
       </p:ext>
     </p:extLst>
   </p:cSld>
@@ -5124,7 +5170,7 @@
           <p:cNvPr id="2" name="Title 1">
             <a:extLst>
               <a:ext uri="{FF2B5EF4-FFF2-40B4-BE49-F238E27FC236}">
-                <a16:creationId xmlns:a16="http://schemas.microsoft.com/office/drawing/2014/main" id="{A63136AD-2458-A357-223A-99708E79B52F}"/>
+                <a16:creationId xmlns:a16="http://schemas.microsoft.com/office/drawing/2014/main" id="{73408831-85EB-0A22-A16F-D07147AC07AA}"/>
               </a:ext>
             </a:extLst>
           </p:cNvPr>
@@ -5145,9 +5191,9 @@
                 <a:ea typeface="Calibri Light"/>
                 <a:cs typeface="Calibri Light"/>
               </a:rPr>
-              <a:t>Announcer</a:t>
-            </a:r>
-            <a:endParaRPr lang="en-US" dirty="0"/>
+              <a:t>"Zeus"</a:t>
+            </a:r>
+            <a:endParaRPr lang="en-US" dirty="0" err="1"/>
           </a:p>
         </p:txBody>
       </p:sp>
@@ -5156,7 +5202,7 @@
           <p:cNvPr id="3" name="Content Placeholder 2">
             <a:extLst>
               <a:ext uri="{FF2B5EF4-FFF2-40B4-BE49-F238E27FC236}">
-                <a16:creationId xmlns:a16="http://schemas.microsoft.com/office/drawing/2014/main" id="{DD6D8731-A978-7BF7-5CBC-1F1B0E0C37A6}"/>
+                <a16:creationId xmlns:a16="http://schemas.microsoft.com/office/drawing/2014/main" id="{A7866C89-A741-3DAF-6DA7-673A0946994C}"/>
               </a:ext>
             </a:extLst>
           </p:cNvPr>
@@ -5174,71 +5220,69 @@
           </a:bodyPr>
           <a:lstStyle/>
           <a:p>
-            <a:r>
-              <a:rPr lang="en-US" err="1">
-                <a:ea typeface="Calibri"/>
-                <a:cs typeface="Calibri"/>
-              </a:rPr>
-              <a:t>Basicaly</a:t>
-            </a:r>
+            <a:pPr marL="0" indent="0">
+              <a:buNone/>
+            </a:pPr>
             <a:r>
               <a:rPr lang="en-US" dirty="0">
                 <a:ea typeface="Calibri"/>
                 <a:cs typeface="Calibri"/>
               </a:rPr>
-              <a:t> </a:t>
-            </a:r>
-            <a:r>
-              <a:rPr lang="en-US" err="1">
+              <a:t>[explanation of double Zeus entry]While they are a threat, they're presence as an NPC would be separate from Zeus the threat if we did not make the connection clear (through label and </a:t>
+            </a:r>
+            <a:r>
+              <a:rPr lang="en-US" dirty="0" err="1">
                 <a:ea typeface="Calibri"/>
                 <a:cs typeface="Calibri"/>
               </a:rPr>
-              <a:t>Narator</a:t>
-            </a:r>
-            <a:endParaRPr lang="en-US" dirty="0" err="1">
-              <a:ea typeface="Calibri"/>
-              <a:cs typeface="Calibri"/>
-            </a:endParaRPr>
-          </a:p>
-          <a:p>
+              <a:t>narative</a:t>
+            </a:r>
             <a:r>
               <a:rPr lang="en-US" dirty="0">
                 <a:ea typeface="Calibri"/>
                 <a:cs typeface="Calibri"/>
               </a:rPr>
-              <a:t>They explain things</a:t>
-            </a:r>
-          </a:p>
-          <a:p>
+              <a:t> context)</a:t>
+            </a:r>
+          </a:p>
+          <a:p>
+            <a:pPr marL="457200" indent="-457200"/>
             <a:r>
               <a:rPr lang="en-US" dirty="0">
                 <a:ea typeface="Calibri"/>
                 <a:cs typeface="Calibri"/>
               </a:rPr>
-              <a:t>Game is </a:t>
-            </a:r>
-            <a:r>
-              <a:rPr lang="en-US" dirty="0" err="1">
-                <a:ea typeface="Calibri"/>
-                <a:cs typeface="Calibri"/>
-              </a:rPr>
-              <a:t>basicaly</a:t>
-            </a:r>
+              <a:t>Will talk shit</a:t>
+            </a:r>
+          </a:p>
+          <a:p>
+            <a:pPr marL="457200" indent="-457200"/>
             <a:r>
               <a:rPr lang="en-US" dirty="0">
                 <a:ea typeface="Calibri"/>
                 <a:cs typeface="Calibri"/>
               </a:rPr>
-              <a:t> a game show that they announce [either text or voiced dialogue would work fine]</a:t>
-            </a:r>
-          </a:p>
-          <a:p>
+              <a:t>Talk about the good fight (even if they lost – like they're trying to save face)</a:t>
+            </a:r>
+          </a:p>
+          <a:p>
+            <a:pPr marL="457200" indent="-457200"/>
+            <a:r>
+              <a:rPr lang="en-US">
+                <a:ea typeface="Calibri"/>
+                <a:cs typeface="Calibri"/>
+              </a:rPr>
+              <a:t>Will break character eventually</a:t>
+            </a:r>
+          </a:p>
+          <a:p>
+            <a:pPr marL="457200" indent="-457200"/>
             <a:r>
               <a:rPr lang="en-US" dirty="0">
                 <a:ea typeface="Calibri"/>
                 <a:cs typeface="Calibri"/>
               </a:rPr>
-              <a:t>They are a hype man, they're dramatic, and snarky</a:t>
+              <a:t>Egotist nerd</a:t>
             </a:r>
           </a:p>
         </p:txBody>
@@ -5246,7 +5290,7 @@
     </p:spTree>
     <p:extLst>
       <p:ext uri="{BB962C8B-B14F-4D97-AF65-F5344CB8AC3E}">
-        <p14:creationId xmlns:p14="http://schemas.microsoft.com/office/powerpoint/2010/main" val="2803468791"/>
+        <p14:creationId xmlns:p14="http://schemas.microsoft.com/office/powerpoint/2010/main" val="3016071352"/>
       </p:ext>
     </p:extLst>
   </p:cSld>
@@ -5278,158 +5322,6 @@
           <p:cNvPr id="2" name="Title 1">
             <a:extLst>
               <a:ext uri="{FF2B5EF4-FFF2-40B4-BE49-F238E27FC236}">
-                <a16:creationId xmlns:a16="http://schemas.microsoft.com/office/drawing/2014/main" id="{73408831-85EB-0A22-A16F-D07147AC07AA}"/>
-              </a:ext>
-            </a:extLst>
-          </p:cNvPr>
-          <p:cNvSpPr>
-            <a:spLocks noGrp="1"/>
-          </p:cNvSpPr>
-          <p:nvPr>
-            <p:ph type="title"/>
-          </p:nvPr>
-        </p:nvSpPr>
-        <p:spPr/>
-        <p:txBody>
-          <a:bodyPr/>
-          <a:lstStyle/>
-          <a:p>
-            <a:r>
-              <a:rPr lang="en-US" dirty="0">
-                <a:ea typeface="Calibri Light"/>
-                <a:cs typeface="Calibri Light"/>
-              </a:rPr>
-              <a:t>"Zeus"</a:t>
-            </a:r>
-            <a:endParaRPr lang="en-US" dirty="0" err="1"/>
-          </a:p>
-        </p:txBody>
-      </p:sp>
-      <p:sp>
-        <p:nvSpPr>
-          <p:cNvPr id="3" name="Content Placeholder 2">
-            <a:extLst>
-              <a:ext uri="{FF2B5EF4-FFF2-40B4-BE49-F238E27FC236}">
-                <a16:creationId xmlns:a16="http://schemas.microsoft.com/office/drawing/2014/main" id="{A7866C89-A741-3DAF-6DA7-673A0946994C}"/>
-              </a:ext>
-            </a:extLst>
-          </p:cNvPr>
-          <p:cNvSpPr>
-            <a:spLocks noGrp="1"/>
-          </p:cNvSpPr>
-          <p:nvPr>
-            <p:ph idx="1"/>
-          </p:nvPr>
-        </p:nvSpPr>
-        <p:spPr/>
-        <p:txBody>
-          <a:bodyPr vert="horz" lIns="91440" tIns="45720" rIns="91440" bIns="45720" rtlCol="0" anchor="t">
-            <a:normAutofit/>
-          </a:bodyPr>
-          <a:lstStyle/>
-          <a:p>
-            <a:pPr marL="0" indent="0">
-              <a:buNone/>
-            </a:pPr>
-            <a:r>
-              <a:rPr lang="en-US" dirty="0">
-                <a:ea typeface="Calibri"/>
-                <a:cs typeface="Calibri"/>
-              </a:rPr>
-              <a:t>[explanation of double Zeus entry]While they are a threat, they're presence as an NPC would be separate from Zeus the threat if we did not make the connection clear (through label and </a:t>
-            </a:r>
-            <a:r>
-              <a:rPr lang="en-US" dirty="0" err="1">
-                <a:ea typeface="Calibri"/>
-                <a:cs typeface="Calibri"/>
-              </a:rPr>
-              <a:t>narative</a:t>
-            </a:r>
-            <a:r>
-              <a:rPr lang="en-US" dirty="0">
-                <a:ea typeface="Calibri"/>
-                <a:cs typeface="Calibri"/>
-              </a:rPr>
-              <a:t> context)</a:t>
-            </a:r>
-          </a:p>
-          <a:p>
-            <a:pPr marL="457200" indent="-457200"/>
-            <a:r>
-              <a:rPr lang="en-US" dirty="0">
-                <a:ea typeface="Calibri"/>
-                <a:cs typeface="Calibri"/>
-              </a:rPr>
-              <a:t>Will talk shit</a:t>
-            </a:r>
-          </a:p>
-          <a:p>
-            <a:pPr marL="457200" indent="-457200"/>
-            <a:r>
-              <a:rPr lang="en-US" dirty="0">
-                <a:ea typeface="Calibri"/>
-                <a:cs typeface="Calibri"/>
-              </a:rPr>
-              <a:t>Talk about the good fight (even if they lost – like they're trying to save face)</a:t>
-            </a:r>
-          </a:p>
-          <a:p>
-            <a:pPr marL="457200" indent="-457200"/>
-            <a:r>
-              <a:rPr lang="en-US">
-                <a:ea typeface="Calibri"/>
-                <a:cs typeface="Calibri"/>
-              </a:rPr>
-              <a:t>Will break character eventually</a:t>
-            </a:r>
-          </a:p>
-          <a:p>
-            <a:pPr marL="457200" indent="-457200"/>
-            <a:r>
-              <a:rPr lang="en-US" dirty="0">
-                <a:ea typeface="Calibri"/>
-                <a:cs typeface="Calibri"/>
-              </a:rPr>
-              <a:t>Egotist nerd</a:t>
-            </a:r>
-          </a:p>
-        </p:txBody>
-      </p:sp>
-    </p:spTree>
-    <p:extLst>
-      <p:ext uri="{BB962C8B-B14F-4D97-AF65-F5344CB8AC3E}">
-        <p14:creationId xmlns:p14="http://schemas.microsoft.com/office/powerpoint/2010/main" val="3016071352"/>
-      </p:ext>
-    </p:extLst>
-  </p:cSld>
-  <p:clrMapOvr>
-    <a:masterClrMapping/>
-  </p:clrMapOvr>
-</p:sld>
-</file>
-
-<file path=ppt/slides/slide25.xml><?xml version="1.0" encoding="utf-8"?>
-<p:sld xmlns:a="http://schemas.openxmlformats.org/drawingml/2006/main" xmlns:r="http://schemas.openxmlformats.org/officeDocument/2006/relationships" xmlns:p="http://schemas.openxmlformats.org/presentationml/2006/main">
-  <p:cSld>
-    <p:spTree>
-      <p:nvGrpSpPr>
-        <p:cNvPr id="1" name=""/>
-        <p:cNvGrpSpPr/>
-        <p:nvPr/>
-      </p:nvGrpSpPr>
-      <p:grpSpPr>
-        <a:xfrm>
-          <a:off x="0" y="0"/>
-          <a:ext cx="0" cy="0"/>
-          <a:chOff x="0" y="0"/>
-          <a:chExt cx="0" cy="0"/>
-        </a:xfrm>
-      </p:grpSpPr>
-      <p:sp>
-        <p:nvSpPr>
-          <p:cNvPr id="2" name="Title 1">
-            <a:extLst>
-              <a:ext uri="{FF2B5EF4-FFF2-40B4-BE49-F238E27FC236}">
                 <a16:creationId xmlns:a16="http://schemas.microsoft.com/office/drawing/2014/main" id="{0EA2C688-3E4E-CD7E-94EC-2E1D4A29E39E}"/>
               </a:ext>
             </a:extLst>
@@ -5526,7 +5418,7 @@
                 <a:ea typeface="Calibri" panose="020F0502020204030204"/>
                 <a:cs typeface="Calibri" panose="020F0502020204030204"/>
               </a:rPr>
-              <a:t>Progress</a:t>
+              <a:t>Progress indicators</a:t>
             </a:r>
           </a:p>
           <a:p>
@@ -5581,7 +5473,7 @@
 </p:sld>
 </file>
 
-<file path=ppt/slides/slide26.xml><?xml version="1.0" encoding="utf-8"?>
+<file path=ppt/slides/slide25.xml><?xml version="1.0" encoding="utf-8"?>
 <p:sld xmlns:a="http://schemas.openxmlformats.org/drawingml/2006/main" xmlns:r="http://schemas.openxmlformats.org/officeDocument/2006/relationships" xmlns:p="http://schemas.openxmlformats.org/presentationml/2006/main">
   <p:cSld>
     <p:bg>
@@ -5672,7 +5564,7 @@
 </p:sld>
 </file>
 
-<file path=ppt/slides/slide27.xml><?xml version="1.0" encoding="utf-8"?>
+<file path=ppt/slides/slide26.xml><?xml version="1.0" encoding="utf-8"?>
 <p:sld xmlns:a="http://schemas.openxmlformats.org/drawingml/2006/main" xmlns:r="http://schemas.openxmlformats.org/officeDocument/2006/relationships" xmlns:p="http://schemas.openxmlformats.org/presentationml/2006/main">
   <p:cSld>
     <p:spTree>
@@ -5759,7 +5651,7 @@
 </p:sld>
 </file>
 
-<file path=ppt/slides/slide28.xml><?xml version="1.0" encoding="utf-8"?>
+<file path=ppt/slides/slide27.xml><?xml version="1.0" encoding="utf-8"?>
 <p:sld xmlns:a="http://schemas.openxmlformats.org/drawingml/2006/main" xmlns:r="http://schemas.openxmlformats.org/officeDocument/2006/relationships" xmlns:p="http://schemas.openxmlformats.org/presentationml/2006/main">
   <p:cSld>
     <p:spTree>
@@ -5880,6 +5772,242 @@
 </p:sld>
 </file>
 
+<file path=ppt/slides/slide28.xml><?xml version="1.0" encoding="utf-8"?>
+<p:sld xmlns:a="http://schemas.openxmlformats.org/drawingml/2006/main" xmlns:r="http://schemas.openxmlformats.org/officeDocument/2006/relationships" xmlns:p="http://schemas.openxmlformats.org/presentationml/2006/main">
+  <p:cSld>
+    <p:bg>
+      <p:bgPr>
+        <a:solidFill>
+          <a:srgbClr val="AB0C3F"/>
+        </a:solidFill>
+        <a:effectLst/>
+      </p:bgPr>
+    </p:bg>
+    <p:spTree>
+      <p:nvGrpSpPr>
+        <p:cNvPr id="1" name=""/>
+        <p:cNvGrpSpPr/>
+        <p:nvPr/>
+      </p:nvGrpSpPr>
+      <p:grpSpPr>
+        <a:xfrm>
+          <a:off x="0" y="0"/>
+          <a:ext cx="0" cy="0"/>
+          <a:chOff x="0" y="0"/>
+          <a:chExt cx="0" cy="0"/>
+        </a:xfrm>
+      </p:grpSpPr>
+      <p:sp>
+        <p:nvSpPr>
+          <p:cNvPr id="2" name="Title 1">
+            <a:extLst>
+              <a:ext uri="{FF2B5EF4-FFF2-40B4-BE49-F238E27FC236}">
+                <a16:creationId xmlns:a16="http://schemas.microsoft.com/office/drawing/2014/main" id="{6BA261AC-462A-1895-C5DF-A3CFDD6BC5A4}"/>
+              </a:ext>
+            </a:extLst>
+          </p:cNvPr>
+          <p:cNvSpPr>
+            <a:spLocks noGrp="1"/>
+          </p:cNvSpPr>
+          <p:nvPr>
+            <p:ph type="title"/>
+          </p:nvPr>
+        </p:nvSpPr>
+        <p:spPr/>
+        <p:txBody>
+          <a:bodyPr/>
+          <a:lstStyle/>
+          <a:p>
+            <a:r>
+              <a:rPr lang="en-GB" dirty="0"/>
+              <a:t>Questions</a:t>
+            </a:r>
+          </a:p>
+        </p:txBody>
+      </p:sp>
+      <p:sp>
+        <p:nvSpPr>
+          <p:cNvPr id="3" name="Text Placeholder 2">
+            <a:extLst>
+              <a:ext uri="{FF2B5EF4-FFF2-40B4-BE49-F238E27FC236}">
+                <a16:creationId xmlns:a16="http://schemas.microsoft.com/office/drawing/2014/main" id="{A1BC00C2-100F-EEB9-625B-95058B8CF55B}"/>
+              </a:ext>
+            </a:extLst>
+          </p:cNvPr>
+          <p:cNvSpPr>
+            <a:spLocks noGrp="1"/>
+          </p:cNvSpPr>
+          <p:nvPr>
+            <p:ph type="body" idx="1"/>
+          </p:nvPr>
+        </p:nvSpPr>
+        <p:spPr/>
+        <p:txBody>
+          <a:bodyPr/>
+          <a:lstStyle/>
+          <a:p>
+            <a:endParaRPr lang="en-GB"/>
+          </a:p>
+        </p:txBody>
+      </p:sp>
+    </p:spTree>
+    <p:extLst>
+      <p:ext uri="{BB962C8B-B14F-4D97-AF65-F5344CB8AC3E}">
+        <p14:creationId xmlns:p14="http://schemas.microsoft.com/office/powerpoint/2010/main" val="4078218223"/>
+      </p:ext>
+    </p:extLst>
+  </p:cSld>
+  <p:clrMapOvr>
+    <a:masterClrMapping/>
+  </p:clrMapOvr>
+</p:sld>
+</file>
+
+<file path=ppt/slides/slide29.xml><?xml version="1.0" encoding="utf-8"?>
+<p:sld xmlns:a="http://schemas.openxmlformats.org/drawingml/2006/main" xmlns:r="http://schemas.openxmlformats.org/officeDocument/2006/relationships" xmlns:p="http://schemas.openxmlformats.org/presentationml/2006/main">
+  <p:cSld>
+    <p:spTree>
+      <p:nvGrpSpPr>
+        <p:cNvPr id="1" name=""/>
+        <p:cNvGrpSpPr/>
+        <p:nvPr/>
+      </p:nvGrpSpPr>
+      <p:grpSpPr>
+        <a:xfrm>
+          <a:off x="0" y="0"/>
+          <a:ext cx="0" cy="0"/>
+          <a:chOff x="0" y="0"/>
+          <a:chExt cx="0" cy="0"/>
+        </a:xfrm>
+      </p:grpSpPr>
+      <p:sp>
+        <p:nvSpPr>
+          <p:cNvPr id="2" name="Title 1">
+            <a:extLst>
+              <a:ext uri="{FF2B5EF4-FFF2-40B4-BE49-F238E27FC236}">
+                <a16:creationId xmlns:a16="http://schemas.microsoft.com/office/drawing/2014/main" id="{FA7C05E7-A9B8-F2BD-E262-4B557C50E013}"/>
+              </a:ext>
+            </a:extLst>
+          </p:cNvPr>
+          <p:cNvSpPr>
+            <a:spLocks noGrp="1"/>
+          </p:cNvSpPr>
+          <p:nvPr>
+            <p:ph type="title"/>
+          </p:nvPr>
+        </p:nvSpPr>
+        <p:spPr/>
+        <p:txBody>
+          <a:bodyPr/>
+          <a:lstStyle/>
+          <a:p>
+            <a:r>
+              <a:rPr lang="en-US" dirty="0">
+                <a:ea typeface="Calibri Light"/>
+                <a:cs typeface="Calibri Light"/>
+              </a:rPr>
+              <a:t>Posible Questions</a:t>
+            </a:r>
+            <a:endParaRPr lang="en-US" dirty="0"/>
+          </a:p>
+        </p:txBody>
+      </p:sp>
+      <p:sp>
+        <p:nvSpPr>
+          <p:cNvPr id="3" name="Content Placeholder 2">
+            <a:extLst>
+              <a:ext uri="{FF2B5EF4-FFF2-40B4-BE49-F238E27FC236}">
+                <a16:creationId xmlns:a16="http://schemas.microsoft.com/office/drawing/2014/main" id="{F212CEC1-CF87-87D1-0DC9-0D67F69E3BE9}"/>
+              </a:ext>
+            </a:extLst>
+          </p:cNvPr>
+          <p:cNvSpPr>
+            <a:spLocks noGrp="1"/>
+          </p:cNvSpPr>
+          <p:nvPr>
+            <p:ph idx="1"/>
+          </p:nvPr>
+        </p:nvSpPr>
+        <p:spPr/>
+        <p:txBody>
+          <a:bodyPr vert="horz" lIns="91440" tIns="45720" rIns="91440" bIns="45720" rtlCol="0" anchor="t">
+            <a:normAutofit/>
+          </a:bodyPr>
+          <a:lstStyle/>
+          <a:p>
+            <a:r>
+              <a:rPr lang="en-US" dirty="0">
+                <a:ea typeface="Calibri"/>
+                <a:cs typeface="Calibri"/>
+              </a:rPr>
+              <a:t>How is this different from other top-downs</a:t>
+            </a:r>
+          </a:p>
+          <a:p>
+            <a:r>
+              <a:rPr lang="en-US" dirty="0">
+                <a:ea typeface="Calibri"/>
+                <a:cs typeface="Calibri"/>
+              </a:rPr>
+              <a:t>How would you sell/</a:t>
+            </a:r>
+            <a:r>
+              <a:rPr lang="en-US" dirty="0" err="1">
+                <a:ea typeface="Calibri"/>
+                <a:cs typeface="Calibri"/>
+              </a:rPr>
+              <a:t>monatise</a:t>
+            </a:r>
+            <a:r>
+              <a:rPr lang="en-US" dirty="0">
+                <a:ea typeface="Calibri"/>
+                <a:cs typeface="Calibri"/>
+              </a:rPr>
+              <a:t> this</a:t>
+            </a:r>
+          </a:p>
+          <a:p>
+            <a:r>
+              <a:rPr lang="en-US" dirty="0">
+                <a:ea typeface="Calibri"/>
+                <a:cs typeface="Calibri"/>
+              </a:rPr>
+              <a:t>What problems did you encounter/deal with</a:t>
+            </a:r>
+          </a:p>
+          <a:p>
+            <a:r>
+              <a:rPr lang="en-US">
+                <a:ea typeface="Calibri"/>
+                <a:cs typeface="Calibri"/>
+              </a:rPr>
+              <a:t>Why this mechanic</a:t>
+            </a:r>
+          </a:p>
+          <a:p>
+            <a:r>
+              <a:rPr lang="en-US" dirty="0">
+                <a:ea typeface="Calibri"/>
+                <a:cs typeface="Calibri"/>
+              </a:rPr>
+              <a:t>How would you improve it</a:t>
+            </a:r>
+          </a:p>
+        </p:txBody>
+      </p:sp>
+    </p:spTree>
+    <p:extLst>
+      <p:ext uri="{BB962C8B-B14F-4D97-AF65-F5344CB8AC3E}">
+        <p14:creationId xmlns:p14="http://schemas.microsoft.com/office/powerpoint/2010/main" val="1467298326"/>
+      </p:ext>
+    </p:extLst>
+  </p:cSld>
+  <p:clrMapOvr>
+    <a:masterClrMapping/>
+  </p:clrMapOvr>
+</p:sld>
+</file>
+
 <file path=ppt/slides/slide3.xml><?xml version="1.0" encoding="utf-8"?>
 <p:sld xmlns:a="http://schemas.openxmlformats.org/drawingml/2006/main" xmlns:r="http://schemas.openxmlformats.org/officeDocument/2006/relationships" xmlns:p="http://schemas.openxmlformats.org/presentationml/2006/main">
   <p:cSld>
@@ -5897,6 +6025,123 @@
           <a:chExt cx="0" cy="0"/>
         </a:xfrm>
       </p:grpSpPr>
+      <p:pic>
+        <p:nvPicPr>
+          <p:cNvPr id="10" name="Picture 10" descr="Bedford Hotel restaurants &amp; bars near British Museum">
+            <a:extLst>
+              <a:ext uri="{FF2B5EF4-FFF2-40B4-BE49-F238E27FC236}">
+                <a16:creationId xmlns:a16="http://schemas.microsoft.com/office/drawing/2014/main" id="{B1EBDA43-2A4C-06C0-85DD-8289B49E0AE6}"/>
+              </a:ext>
+            </a:extLst>
+          </p:cNvPr>
+          <p:cNvPicPr>
+            <a:picLocks noChangeAspect="1" noChangeArrowheads="1"/>
+          </p:cNvPicPr>
+          <p:nvPr/>
+        </p:nvPicPr>
+        <p:blipFill rotWithShape="1">
+          <a:blip r:embed="rId2">
+            <a:extLst>
+              <a:ext uri="{28A0092B-C50C-407E-A947-70E740481C1C}">
+                <a14:useLocalDpi xmlns:a14="http://schemas.microsoft.com/office/drawing/2010/main" val="0"/>
+              </a:ext>
+            </a:extLst>
+          </a:blip>
+          <a:srcRect t="16242" r="2" b="18455"/>
+          <a:stretch/>
+        </p:blipFill>
+        <p:spPr bwMode="auto">
+          <a:xfrm>
+            <a:off x="7252072" y="1590571"/>
+            <a:ext cx="4595097" cy="2250608"/>
+          </a:xfrm>
+          <a:prstGeom prst="rect">
+            <a:avLst/>
+          </a:prstGeom>
+          <a:noFill/>
+          <a:extLst>
+            <a:ext uri="{909E8E84-426E-40DD-AFC4-6F175D3DCCD1}">
+              <a14:hiddenFill xmlns:a14="http://schemas.microsoft.com/office/drawing/2010/main">
+                <a:solidFill>
+                  <a:srgbClr val="FFFFFF"/>
+                </a:solidFill>
+              </a14:hiddenFill>
+            </a:ext>
+          </a:extLst>
+        </p:spPr>
+      </p:pic>
+      <p:pic>
+        <p:nvPicPr>
+          <p:cNvPr id="9" name="Picture 6" descr="What is a Rave? - Guide to Raving | iHeartRaves">
+            <a:extLst>
+              <a:ext uri="{FF2B5EF4-FFF2-40B4-BE49-F238E27FC236}">
+                <a16:creationId xmlns:a16="http://schemas.microsoft.com/office/drawing/2014/main" id="{F553666A-98C0-2612-9523-D00A06404631}"/>
+              </a:ext>
+            </a:extLst>
+          </p:cNvPr>
+          <p:cNvPicPr>
+            <a:picLocks noChangeAspect="1" noChangeArrowheads="1"/>
+          </p:cNvPicPr>
+          <p:nvPr/>
+        </p:nvPicPr>
+        <p:blipFill rotWithShape="1">
+          <a:blip r:embed="rId3">
+            <a:extLst>
+              <a:ext uri="{28A0092B-C50C-407E-A947-70E740481C1C}">
+                <a14:useLocalDpi xmlns:a14="http://schemas.microsoft.com/office/drawing/2010/main" val="0"/>
+              </a:ext>
+            </a:extLst>
+          </a:blip>
+          <a:srcRect t="21021" r="1" b="1"/>
+          <a:stretch/>
+        </p:blipFill>
+        <p:spPr bwMode="auto">
+          <a:xfrm>
+            <a:off x="7252072" y="3245258"/>
+            <a:ext cx="4262808" cy="2354039"/>
+          </a:xfrm>
+          <a:custGeom>
+            <a:avLst/>
+            <a:gdLst/>
+            <a:ahLst/>
+            <a:cxnLst/>
+            <a:rect l="l" t="t" r="r" b="b"/>
+            <a:pathLst>
+              <a:path w="7279913" h="3895335">
+                <a:moveTo>
+                  <a:pt x="0" y="0"/>
+                </a:moveTo>
+                <a:lnTo>
+                  <a:pt x="7279913" y="0"/>
+                </a:lnTo>
+                <a:lnTo>
+                  <a:pt x="7279913" y="3116976"/>
+                </a:lnTo>
+                <a:lnTo>
+                  <a:pt x="5011287" y="3116976"/>
+                </a:lnTo>
+                <a:lnTo>
+                  <a:pt x="5011287" y="3895335"/>
+                </a:lnTo>
+                <a:lnTo>
+                  <a:pt x="0" y="3895335"/>
+                </a:lnTo>
+                <a:close/>
+              </a:path>
+            </a:pathLst>
+          </a:custGeom>
+          <a:noFill/>
+          <a:extLst>
+            <a:ext uri="{909E8E84-426E-40DD-AFC4-6F175D3DCCD1}">
+              <a14:hiddenFill xmlns:a14="http://schemas.microsoft.com/office/drawing/2010/main">
+                <a:solidFill>
+                  <a:srgbClr val="FFFFFF"/>
+                </a:solidFill>
+              </a14:hiddenFill>
+            </a:ext>
+          </a:extLst>
+        </p:spPr>
+      </p:pic>
       <p:sp>
         <p:nvSpPr>
           <p:cNvPr id="2" name="Title 1">
@@ -5944,7 +6189,7 @@
           <p:nvPr/>
         </p:nvPicPr>
         <p:blipFill>
-          <a:blip r:embed="rId2" cstate="print">
+          <a:blip r:embed="rId4" cstate="print">
             <a:extLst>
               <a:ext uri="{28A0092B-C50C-407E-A947-70E740481C1C}">
                 <a14:useLocalDpi xmlns:a14="http://schemas.microsoft.com/office/drawing/2010/main" val="0"/>
@@ -5958,7 +6203,7 @@
         </p:blipFill>
         <p:spPr bwMode="auto">
           <a:xfrm>
-            <a:off x="330742" y="2295722"/>
+            <a:off x="330742" y="2048585"/>
             <a:ext cx="4679004" cy="2631939"/>
           </a:xfrm>
           <a:prstGeom prst="rect">
@@ -5991,7 +6236,7 @@
           <p:nvPr/>
         </p:nvPicPr>
         <p:blipFill rotWithShape="1">
-          <a:blip r:embed="rId3">
+          <a:blip r:embed="rId5">
             <a:extLst>
               <a:ext uri="{28A0092B-C50C-407E-A947-70E740481C1C}">
                 <a14:useLocalDpi xmlns:a14="http://schemas.microsoft.com/office/drawing/2010/main" val="0"/>
@@ -6003,7 +6248,7 @@
         </p:blipFill>
         <p:spPr bwMode="auto">
           <a:xfrm>
-            <a:off x="1906624" y="2558946"/>
+            <a:off x="1906624" y="2344758"/>
             <a:ext cx="2081716" cy="1262971"/>
           </a:xfrm>
           <a:prstGeom prst="rect">
@@ -6035,7 +6280,7 @@
         </p:nvSpPr>
         <p:spPr>
           <a:xfrm>
-            <a:off x="3007468" y="1794778"/>
+            <a:off x="3007468" y="1547641"/>
             <a:ext cx="3307405" cy="369332"/>
           </a:xfrm>
           <a:prstGeom prst="rect">
@@ -6078,7 +6323,7 @@
         </p:nvCxnSpPr>
         <p:spPr>
           <a:xfrm>
-            <a:off x="3007468" y="1979444"/>
+            <a:off x="3007468" y="1732307"/>
             <a:ext cx="76200" cy="1152862"/>
           </a:xfrm>
           <a:prstGeom prst="line">
@@ -6119,7 +6364,7 @@
           <p:nvPr/>
         </p:nvPicPr>
         <p:blipFill rotWithShape="1">
-          <a:blip r:embed="rId4"/>
+          <a:blip r:embed="rId6"/>
           <a:srcRect l="61266" t="5324" r="7937" b="80601"/>
           <a:stretch/>
         </p:blipFill>
@@ -6148,11 +6393,11 @@
           <p:nvPr/>
         </p:nvPicPr>
         <p:blipFill rotWithShape="1">
-          <a:blip r:embed="rId5">
+          <a:blip r:embed="rId7">
             <a:extLst>
               <a:ext uri="{BEBA8EAE-BF5A-486C-A8C5-ECC9F3942E4B}">
                 <a14:imgProps xmlns:a14="http://schemas.microsoft.com/office/drawing/2010/main">
-                  <a14:imgLayer r:embed="rId6">
+                  <a14:imgLayer r:embed="rId8">
                     <a14:imgEffect>
                       <a14:backgroundRemoval t="22819" b="32349" l="64525" r="89385">
                         <a14:foregroundMark x1="64804" y1="32483" x2="64804" y2="31946"/>
@@ -6193,7 +6438,7 @@
           <p:nvPr/>
         </p:nvPicPr>
         <p:blipFill rotWithShape="1">
-          <a:blip r:embed="rId3">
+          <a:blip r:embed="rId5">
             <a:extLst>
               <a:ext uri="{28A0092B-C50C-407E-A947-70E740481C1C}">
                 <a14:useLocalDpi xmlns:a14="http://schemas.microsoft.com/office/drawing/2010/main" val="0"/>
@@ -6238,7 +6483,7 @@
           <p:nvPr/>
         </p:nvPicPr>
         <p:blipFill rotWithShape="1">
-          <a:blip r:embed="rId4"/>
+          <a:blip r:embed="rId6"/>
           <a:srcRect l="61266" t="5324" r="7937" b="80601"/>
           <a:stretch/>
         </p:blipFill>
@@ -6267,7 +6512,7 @@
           <p:nvPr/>
         </p:nvPicPr>
         <p:blipFill rotWithShape="1">
-          <a:blip r:embed="rId4"/>
+          <a:blip r:embed="rId6"/>
           <a:srcRect l="61266" t="5324" r="7937" b="80601"/>
           <a:stretch/>
         </p:blipFill>
@@ -7952,7 +8197,7 @@
         </p:nvSpPr>
         <p:spPr>
           <a:xfrm>
-            <a:off x="10090825" y="1635652"/>
+            <a:off x="10090825" y="6293255"/>
             <a:ext cx="2101175" cy="398828"/>
           </a:xfrm>
           <a:prstGeom prst="rect">
@@ -7987,6 +8232,179 @@
           </a:p>
         </p:txBody>
       </p:sp>
+      <p:pic>
+        <p:nvPicPr>
+          <p:cNvPr id="6" name="Picture 4" descr="american english - What is the name of a room in which hotel staff use to  store their equipment and provide room service? - English Language Learners  Stack Exchange">
+            <a:extLst>
+              <a:ext uri="{FF2B5EF4-FFF2-40B4-BE49-F238E27FC236}">
+                <a16:creationId xmlns:a16="http://schemas.microsoft.com/office/drawing/2014/main" id="{76A6A473-54F2-F113-B7D2-1FBF41185283}"/>
+              </a:ext>
+            </a:extLst>
+          </p:cNvPr>
+          <p:cNvPicPr>
+            <a:picLocks noChangeAspect="1" noChangeArrowheads="1"/>
+          </p:cNvPicPr>
+          <p:nvPr/>
+        </p:nvPicPr>
+        <p:blipFill rotWithShape="1">
+          <a:blip r:embed="rId9">
+            <a:extLst>
+              <a:ext uri="{28A0092B-C50C-407E-A947-70E740481C1C}">
+                <a14:useLocalDpi xmlns:a14="http://schemas.microsoft.com/office/drawing/2010/main" val="0"/>
+              </a:ext>
+            </a:extLst>
+          </a:blip>
+          <a:srcRect t="13049" r="-5" b="5734"/>
+          <a:stretch/>
+        </p:blipFill>
+        <p:spPr bwMode="auto">
+          <a:xfrm>
+            <a:off x="5168210" y="2186491"/>
+            <a:ext cx="3694988" cy="2250608"/>
+          </a:xfrm>
+          <a:prstGeom prst="rect">
+            <a:avLst/>
+          </a:prstGeom>
+          <a:noFill/>
+          <a:extLst>
+            <a:ext uri="{909E8E84-426E-40DD-AFC4-6F175D3DCCD1}">
+              <a14:hiddenFill xmlns:a14="http://schemas.microsoft.com/office/drawing/2010/main">
+                <a:solidFill>
+                  <a:srgbClr val="FFFFFF"/>
+                </a:solidFill>
+              </a14:hiddenFill>
+            </a:ext>
+          </a:extLst>
+        </p:spPr>
+      </p:pic>
+      <p:pic>
+        <p:nvPicPr>
+          <p:cNvPr id="7" name="Picture 8" descr="42 Festival Accessories, Gear &amp; Must Haves To Bring To a Rave">
+            <a:extLst>
+              <a:ext uri="{FF2B5EF4-FFF2-40B4-BE49-F238E27FC236}">
+                <a16:creationId xmlns:a16="http://schemas.microsoft.com/office/drawing/2014/main" id="{74104CD4-19E2-98FE-18C5-859DF9183DA0}"/>
+              </a:ext>
+            </a:extLst>
+          </p:cNvPr>
+          <p:cNvPicPr>
+            <a:picLocks noChangeAspect="1" noChangeArrowheads="1"/>
+          </p:cNvPicPr>
+          <p:nvPr/>
+        </p:nvPicPr>
+        <p:blipFill rotWithShape="1">
+          <a:blip r:embed="rId10" cstate="print">
+            <a:extLst>
+              <a:ext uri="{28A0092B-C50C-407E-A947-70E740481C1C}">
+                <a14:useLocalDpi xmlns:a14="http://schemas.microsoft.com/office/drawing/2010/main" val="0"/>
+              </a:ext>
+            </a:extLst>
+          </a:blip>
+          <a:srcRect t="17511" r="2" b="9114"/>
+          <a:stretch/>
+        </p:blipFill>
+        <p:spPr bwMode="auto">
+          <a:xfrm>
+            <a:off x="8823691" y="4633210"/>
+            <a:ext cx="3243681" cy="1588705"/>
+          </a:xfrm>
+          <a:prstGeom prst="rect">
+            <a:avLst/>
+          </a:prstGeom>
+          <a:noFill/>
+          <a:extLst>
+            <a:ext uri="{909E8E84-426E-40DD-AFC4-6F175D3DCCD1}">
+              <a14:hiddenFill xmlns:a14="http://schemas.microsoft.com/office/drawing/2010/main">
+                <a:solidFill>
+                  <a:srgbClr val="FFFFFF"/>
+                </a:solidFill>
+              </a14:hiddenFill>
+            </a:ext>
+          </a:extLst>
+        </p:spPr>
+      </p:pic>
+      <p:sp>
+        <p:nvSpPr>
+          <p:cNvPr id="11" name="TextBox 10">
+            <a:extLst>
+              <a:ext uri="{FF2B5EF4-FFF2-40B4-BE49-F238E27FC236}">
+                <a16:creationId xmlns:a16="http://schemas.microsoft.com/office/drawing/2014/main" id="{899219C9-9666-3ACC-1CC8-97C1E3175CE0}"/>
+              </a:ext>
+            </a:extLst>
+          </p:cNvPr>
+          <p:cNvSpPr txBox="1"/>
+          <p:nvPr/>
+        </p:nvSpPr>
+        <p:spPr>
+          <a:xfrm>
+            <a:off x="6559529" y="5929868"/>
+            <a:ext cx="2264162" cy="646331"/>
+          </a:xfrm>
+          <a:prstGeom prst="rect">
+            <a:avLst/>
+          </a:prstGeom>
+          <a:noFill/>
+          <a:ln>
+            <a:solidFill>
+              <a:schemeClr val="tx1"/>
+            </a:solidFill>
+          </a:ln>
+        </p:spPr>
+        <p:txBody>
+          <a:bodyPr wrap="square" rtlCol="0">
+            <a:spAutoFit/>
+          </a:bodyPr>
+          <a:lstStyle/>
+          <a:p>
+            <a:r>
+              <a:rPr lang="en-GB" dirty="0"/>
+              <a:t>Empty hotel turned (rave/show) fight club</a:t>
+            </a:r>
+          </a:p>
+        </p:txBody>
+      </p:sp>
+      <p:cxnSp>
+        <p:nvCxnSpPr>
+          <p:cNvPr id="12" name="Straight Connector 11">
+            <a:extLst>
+              <a:ext uri="{FF2B5EF4-FFF2-40B4-BE49-F238E27FC236}">
+                <a16:creationId xmlns:a16="http://schemas.microsoft.com/office/drawing/2014/main" id="{DDBCFDF5-02F7-AAB3-FBCB-18E8E5883CF3}"/>
+              </a:ext>
+            </a:extLst>
+          </p:cNvPr>
+          <p:cNvCxnSpPr>
+            <a:cxnSpLocks/>
+            <a:stCxn id="11" idx="0"/>
+          </p:cNvCxnSpPr>
+          <p:nvPr/>
+        </p:nvCxnSpPr>
+        <p:spPr>
+          <a:xfrm flipV="1">
+            <a:off x="7691610" y="5657975"/>
+            <a:ext cx="293775" cy="271893"/>
+          </a:xfrm>
+          <a:prstGeom prst="line">
+            <a:avLst/>
+          </a:prstGeom>
+          <a:ln>
+            <a:headEnd type="none" w="med" len="med"/>
+            <a:tailEnd type="arrow" w="med" len="med"/>
+          </a:ln>
+        </p:spPr>
+        <p:style>
+          <a:lnRef idx="3">
+            <a:schemeClr val="dk1"/>
+          </a:lnRef>
+          <a:fillRef idx="0">
+            <a:schemeClr val="dk1"/>
+          </a:fillRef>
+          <a:effectRef idx="2">
+            <a:schemeClr val="dk1"/>
+          </a:effectRef>
+          <a:fontRef idx="minor">
+            <a:schemeClr val="tx1"/>
+          </a:fontRef>
+        </p:style>
+      </p:cxnSp>
     </p:spTree>
     <p:extLst>
       <p:ext uri="{BB962C8B-B14F-4D97-AF65-F5344CB8AC3E}">
@@ -8095,7 +8513,7 @@
                 <a:ea typeface="Calibri"/>
                 <a:cs typeface="Calibri"/>
               </a:rPr>
-              <a:t>they dress up as they please then enjoy beating each other up for entertainment</a:t>
+              <a:t>they wear costumes then fight each other for entertainment</a:t>
             </a:r>
             <a:endParaRPr lang="en-US" dirty="0"/>
           </a:p>
@@ -8355,31 +8773,1951 @@
           </a:p>
         </p:txBody>
       </p:sp>
-      <p:sp>
-        <p:nvSpPr>
-          <p:cNvPr id="3" name="Content Placeholder 2">
+      <p:pic>
+        <p:nvPicPr>
+          <p:cNvPr id="4" name="Picture 3">
             <a:extLst>
               <a:ext uri="{FF2B5EF4-FFF2-40B4-BE49-F238E27FC236}">
-                <a16:creationId xmlns:a16="http://schemas.microsoft.com/office/drawing/2014/main" id="{C4B58CB3-AF42-C703-12F4-A9DCAD3E14B4}"/>
+                <a16:creationId xmlns:a16="http://schemas.microsoft.com/office/drawing/2014/main" id="{EC6D6E17-C299-008E-B444-293A21BA0AB2}"/>
               </a:ext>
             </a:extLst>
           </p:cNvPr>
-          <p:cNvSpPr>
-            <a:spLocks noGrp="1"/>
-          </p:cNvSpPr>
-          <p:nvPr>
-            <p:ph idx="1"/>
-          </p:nvPr>
-        </p:nvSpPr>
-        <p:spPr/>
-        <p:txBody>
-          <a:bodyPr/>
-          <a:lstStyle/>
-          <a:p>
-            <a:endParaRPr lang="en-US"/>
-          </a:p>
-        </p:txBody>
-      </p:sp>
+          <p:cNvPicPr>
+            <a:picLocks noChangeAspect="1"/>
+          </p:cNvPicPr>
+          <p:nvPr/>
+        </p:nvPicPr>
+        <p:blipFill rotWithShape="1">
+          <a:blip r:embed="rId2"/>
+          <a:srcRect l="61266" t="5324" r="7937" b="80601"/>
+          <a:stretch/>
+        </p:blipFill>
+        <p:spPr>
+          <a:xfrm>
+            <a:off x="5569395" y="4822275"/>
+            <a:ext cx="1014918" cy="965299"/>
+          </a:xfrm>
+          <a:prstGeom prst="rect">
+            <a:avLst/>
+          </a:prstGeom>
+        </p:spPr>
+      </p:pic>
+      <p:pic>
+        <p:nvPicPr>
+          <p:cNvPr id="5" name="Picture 4">
+            <a:extLst>
+              <a:ext uri="{FF2B5EF4-FFF2-40B4-BE49-F238E27FC236}">
+                <a16:creationId xmlns:a16="http://schemas.microsoft.com/office/drawing/2014/main" id="{626121D3-8E3C-CCB1-FC73-03FA1BF4B7CE}"/>
+              </a:ext>
+            </a:extLst>
+          </p:cNvPr>
+          <p:cNvPicPr>
+            <a:picLocks noChangeAspect="1"/>
+          </p:cNvPicPr>
+          <p:nvPr/>
+        </p:nvPicPr>
+        <p:blipFill rotWithShape="1">
+          <a:blip r:embed="rId3">
+            <a:extLst>
+              <a:ext uri="{BEBA8EAE-BF5A-486C-A8C5-ECC9F3942E4B}">
+                <a14:imgProps xmlns:a14="http://schemas.microsoft.com/office/drawing/2010/main">
+                  <a14:imgLayer r:embed="rId4">
+                    <a14:imgEffect>
+                      <a14:backgroundRemoval t="22819" b="32349" l="64525" r="89385">
+                        <a14:foregroundMark x1="64804" y1="32483" x2="64804" y2="31946"/>
+                        <a14:foregroundMark x1="79050" y1="23893" x2="70950" y2="23356"/>
+                        <a14:foregroundMark x1="89385" y1="24027" x2="88827" y2="23624"/>
+                      </a14:backgroundRemoval>
+                    </a14:imgEffect>
+                  </a14:imgLayer>
+                </a14:imgProps>
+              </a:ext>
+            </a:extLst>
+          </a:blip>
+          <a:srcRect l="62447" t="21882" r="7937" b="66525"/>
+          <a:stretch/>
+        </p:blipFill>
+        <p:spPr>
+          <a:xfrm>
+            <a:off x="8455263" y="5118455"/>
+            <a:ext cx="976008" cy="795065"/>
+          </a:xfrm>
+          <a:prstGeom prst="rect">
+            <a:avLst/>
+          </a:prstGeom>
+        </p:spPr>
+      </p:pic>
+      <p:pic>
+        <p:nvPicPr>
+          <p:cNvPr id="6" name="Picture 2" descr="Image result for gang beasts punch force mod">
+            <a:extLst>
+              <a:ext uri="{FF2B5EF4-FFF2-40B4-BE49-F238E27FC236}">
+                <a16:creationId xmlns:a16="http://schemas.microsoft.com/office/drawing/2014/main" id="{F6A36327-8E5F-2DBA-D81A-9299BF34A313}"/>
+              </a:ext>
+            </a:extLst>
+          </p:cNvPr>
+          <p:cNvPicPr>
+            <a:picLocks noChangeAspect="1" noChangeArrowheads="1"/>
+          </p:cNvPicPr>
+          <p:nvPr/>
+        </p:nvPicPr>
+        <p:blipFill rotWithShape="1">
+          <a:blip r:embed="rId5">
+            <a:extLst>
+              <a:ext uri="{28A0092B-C50C-407E-A947-70E740481C1C}">
+                <a14:useLocalDpi xmlns:a14="http://schemas.microsoft.com/office/drawing/2010/main" val="0"/>
+              </a:ext>
+            </a:extLst>
+          </a:blip>
+          <a:srcRect r="23112" b="21217"/>
+          <a:stretch/>
+        </p:blipFill>
+        <p:spPr bwMode="auto">
+          <a:xfrm>
+            <a:off x="9431270" y="4822275"/>
+            <a:ext cx="2571059" cy="1559854"/>
+          </a:xfrm>
+          <a:prstGeom prst="rect">
+            <a:avLst/>
+          </a:prstGeom>
+          <a:noFill/>
+          <a:extLst>
+            <a:ext uri="{909E8E84-426E-40DD-AFC4-6F175D3DCCD1}">
+              <a14:hiddenFill xmlns:a14="http://schemas.microsoft.com/office/drawing/2010/main">
+                <a:solidFill>
+                  <a:srgbClr val="FFFFFF"/>
+                </a:solidFill>
+              </a14:hiddenFill>
+            </a:ext>
+          </a:extLst>
+        </p:spPr>
+      </p:pic>
+      <p:pic>
+        <p:nvPicPr>
+          <p:cNvPr id="7" name="Picture 6">
+            <a:extLst>
+              <a:ext uri="{FF2B5EF4-FFF2-40B4-BE49-F238E27FC236}">
+                <a16:creationId xmlns:a16="http://schemas.microsoft.com/office/drawing/2014/main" id="{2C69D1E3-7B52-C311-7DE9-749BEA6C4C3A}"/>
+              </a:ext>
+            </a:extLst>
+          </p:cNvPr>
+          <p:cNvPicPr>
+            <a:picLocks noChangeAspect="1"/>
+          </p:cNvPicPr>
+          <p:nvPr/>
+        </p:nvPicPr>
+        <p:blipFill rotWithShape="1">
+          <a:blip r:embed="rId2"/>
+          <a:srcRect l="61266" t="5324" r="7937" b="80601"/>
+          <a:stretch/>
+        </p:blipFill>
+        <p:spPr>
+          <a:xfrm>
+            <a:off x="7129871" y="4635806"/>
+            <a:ext cx="1014918" cy="965299"/>
+          </a:xfrm>
+          <a:prstGeom prst="rect">
+            <a:avLst/>
+          </a:prstGeom>
+        </p:spPr>
+      </p:pic>
+      <p:pic>
+        <p:nvPicPr>
+          <p:cNvPr id="8" name="Picture 7">
+            <a:extLst>
+              <a:ext uri="{FF2B5EF4-FFF2-40B4-BE49-F238E27FC236}">
+                <a16:creationId xmlns:a16="http://schemas.microsoft.com/office/drawing/2014/main" id="{2396B002-3C99-3B76-4CE0-7300824E0DBC}"/>
+              </a:ext>
+            </a:extLst>
+          </p:cNvPr>
+          <p:cNvPicPr>
+            <a:picLocks noChangeAspect="1"/>
+          </p:cNvPicPr>
+          <p:nvPr/>
+        </p:nvPicPr>
+        <p:blipFill rotWithShape="1">
+          <a:blip r:embed="rId2"/>
+          <a:srcRect l="61266" t="5324" r="7937" b="80601"/>
+          <a:stretch/>
+        </p:blipFill>
+        <p:spPr>
+          <a:xfrm>
+            <a:off x="6654029" y="5422675"/>
+            <a:ext cx="1014918" cy="965299"/>
+          </a:xfrm>
+          <a:prstGeom prst="rect">
+            <a:avLst/>
+          </a:prstGeom>
+        </p:spPr>
+      </p:pic>
+      <p:cxnSp>
+        <p:nvCxnSpPr>
+          <p:cNvPr id="9" name="Straight Connector 8">
+            <a:extLst>
+              <a:ext uri="{FF2B5EF4-FFF2-40B4-BE49-F238E27FC236}">
+                <a16:creationId xmlns:a16="http://schemas.microsoft.com/office/drawing/2014/main" id="{251E7B5A-ECA8-3316-5A9A-84196669E20D}"/>
+              </a:ext>
+            </a:extLst>
+          </p:cNvPr>
+          <p:cNvCxnSpPr>
+            <a:cxnSpLocks/>
+          </p:cNvCxnSpPr>
+          <p:nvPr/>
+        </p:nvCxnSpPr>
+        <p:spPr>
+          <a:xfrm flipH="1">
+            <a:off x="6258230" y="4877130"/>
+            <a:ext cx="318989" cy="482649"/>
+          </a:xfrm>
+          <a:prstGeom prst="line">
+            <a:avLst/>
+          </a:prstGeom>
+        </p:spPr>
+        <p:style>
+          <a:lnRef idx="3">
+            <a:schemeClr val="dk1"/>
+          </a:lnRef>
+          <a:fillRef idx="0">
+            <a:schemeClr val="dk1"/>
+          </a:fillRef>
+          <a:effectRef idx="2">
+            <a:schemeClr val="dk1"/>
+          </a:effectRef>
+          <a:fontRef idx="minor">
+            <a:schemeClr val="tx1"/>
+          </a:fontRef>
+        </p:style>
+      </p:cxnSp>
+      <p:cxnSp>
+        <p:nvCxnSpPr>
+          <p:cNvPr id="10" name="Straight Connector 9">
+            <a:extLst>
+              <a:ext uri="{FF2B5EF4-FFF2-40B4-BE49-F238E27FC236}">
+                <a16:creationId xmlns:a16="http://schemas.microsoft.com/office/drawing/2014/main" id="{953D64D2-3286-2EE9-9F8F-76500FA4E38B}"/>
+              </a:ext>
+            </a:extLst>
+          </p:cNvPr>
+          <p:cNvCxnSpPr>
+            <a:cxnSpLocks/>
+          </p:cNvCxnSpPr>
+          <p:nvPr/>
+        </p:nvCxnSpPr>
+        <p:spPr>
+          <a:xfrm flipH="1">
+            <a:off x="8390815" y="5185849"/>
+            <a:ext cx="318989" cy="482649"/>
+          </a:xfrm>
+          <a:prstGeom prst="line">
+            <a:avLst/>
+          </a:prstGeom>
+        </p:spPr>
+        <p:style>
+          <a:lnRef idx="3">
+            <a:schemeClr val="dk1"/>
+          </a:lnRef>
+          <a:fillRef idx="0">
+            <a:schemeClr val="dk1"/>
+          </a:fillRef>
+          <a:effectRef idx="2">
+            <a:schemeClr val="dk1"/>
+          </a:effectRef>
+          <a:fontRef idx="minor">
+            <a:schemeClr val="tx1"/>
+          </a:fontRef>
+        </p:style>
+      </p:cxnSp>
+      <p:cxnSp>
+        <p:nvCxnSpPr>
+          <p:cNvPr id="11" name="Straight Connector 10">
+            <a:extLst>
+              <a:ext uri="{FF2B5EF4-FFF2-40B4-BE49-F238E27FC236}">
+                <a16:creationId xmlns:a16="http://schemas.microsoft.com/office/drawing/2014/main" id="{53B69A09-6C84-3FC9-BF5B-E20C78BA6DD5}"/>
+              </a:ext>
+            </a:extLst>
+          </p:cNvPr>
+          <p:cNvCxnSpPr>
+            <a:cxnSpLocks/>
+          </p:cNvCxnSpPr>
+          <p:nvPr/>
+        </p:nvCxnSpPr>
+        <p:spPr>
+          <a:xfrm flipH="1">
+            <a:off x="7787700" y="5753215"/>
+            <a:ext cx="318989" cy="482649"/>
+          </a:xfrm>
+          <a:prstGeom prst="line">
+            <a:avLst/>
+          </a:prstGeom>
+        </p:spPr>
+        <p:style>
+          <a:lnRef idx="3">
+            <a:schemeClr val="dk1"/>
+          </a:lnRef>
+          <a:fillRef idx="0">
+            <a:schemeClr val="dk1"/>
+          </a:fillRef>
+          <a:effectRef idx="2">
+            <a:schemeClr val="dk1"/>
+          </a:effectRef>
+          <a:fontRef idx="minor">
+            <a:schemeClr val="tx1"/>
+          </a:fontRef>
+        </p:style>
+      </p:cxnSp>
+      <p:cxnSp>
+        <p:nvCxnSpPr>
+          <p:cNvPr id="12" name="Straight Connector 11">
+            <a:extLst>
+              <a:ext uri="{FF2B5EF4-FFF2-40B4-BE49-F238E27FC236}">
+                <a16:creationId xmlns:a16="http://schemas.microsoft.com/office/drawing/2014/main" id="{40F945CF-F7B4-4EDD-11E6-6774044F572D}"/>
+              </a:ext>
+            </a:extLst>
+          </p:cNvPr>
+          <p:cNvCxnSpPr>
+            <a:cxnSpLocks/>
+          </p:cNvCxnSpPr>
+          <p:nvPr/>
+        </p:nvCxnSpPr>
+        <p:spPr>
+          <a:xfrm flipH="1" flipV="1">
+            <a:off x="7941318" y="6112063"/>
+            <a:ext cx="284124" cy="123801"/>
+          </a:xfrm>
+          <a:prstGeom prst="line">
+            <a:avLst/>
+          </a:prstGeom>
+        </p:spPr>
+        <p:style>
+          <a:lnRef idx="3">
+            <a:schemeClr val="dk1"/>
+          </a:lnRef>
+          <a:fillRef idx="0">
+            <a:schemeClr val="dk1"/>
+          </a:fillRef>
+          <a:effectRef idx="2">
+            <a:schemeClr val="dk1"/>
+          </a:effectRef>
+          <a:fontRef idx="minor">
+            <a:schemeClr val="tx1"/>
+          </a:fontRef>
+        </p:style>
+      </p:cxnSp>
+      <p:grpSp>
+        <p:nvGrpSpPr>
+          <p:cNvPr id="13" name="Group 12">
+            <a:extLst>
+              <a:ext uri="{FF2B5EF4-FFF2-40B4-BE49-F238E27FC236}">
+                <a16:creationId xmlns:a16="http://schemas.microsoft.com/office/drawing/2014/main" id="{10962385-5AA9-AF9C-3F25-F269DBB31F60}"/>
+              </a:ext>
+            </a:extLst>
+          </p:cNvPr>
+          <p:cNvGrpSpPr/>
+          <p:nvPr/>
+        </p:nvGrpSpPr>
+        <p:grpSpPr>
+          <a:xfrm rot="18461864">
+            <a:off x="11343005" y="4005496"/>
+            <a:ext cx="809952" cy="656730"/>
+            <a:chOff x="5811970" y="4568844"/>
+            <a:chExt cx="685189" cy="482649"/>
+          </a:xfrm>
+        </p:grpSpPr>
+        <p:cxnSp>
+          <p:nvCxnSpPr>
+            <p:cNvPr id="14" name="Straight Connector 13">
+              <a:extLst>
+                <a:ext uri="{FF2B5EF4-FFF2-40B4-BE49-F238E27FC236}">
+                  <a16:creationId xmlns:a16="http://schemas.microsoft.com/office/drawing/2014/main" id="{899B76BA-DAAA-AF74-4C6C-1D4D73CDA2A9}"/>
+                </a:ext>
+              </a:extLst>
+            </p:cNvPr>
+            <p:cNvCxnSpPr>
+              <a:cxnSpLocks/>
+            </p:cNvCxnSpPr>
+            <p:nvPr/>
+          </p:nvCxnSpPr>
+          <p:spPr>
+            <a:xfrm flipH="1">
+              <a:off x="5877531" y="4712406"/>
+              <a:ext cx="536235" cy="195524"/>
+            </a:xfrm>
+            <a:prstGeom prst="line">
+              <a:avLst/>
+            </a:prstGeom>
+            <a:ln>
+              <a:solidFill>
+                <a:schemeClr val="bg2">
+                  <a:lumMod val="75000"/>
+                </a:schemeClr>
+              </a:solidFill>
+            </a:ln>
+          </p:spPr>
+          <p:style>
+            <a:lnRef idx="3">
+              <a:schemeClr val="dk1"/>
+            </a:lnRef>
+            <a:fillRef idx="0">
+              <a:schemeClr val="dk1"/>
+            </a:fillRef>
+            <a:effectRef idx="2">
+              <a:schemeClr val="dk1"/>
+            </a:effectRef>
+            <a:fontRef idx="minor">
+              <a:schemeClr val="tx1"/>
+            </a:fontRef>
+          </p:style>
+        </p:cxnSp>
+        <p:cxnSp>
+          <p:nvCxnSpPr>
+            <p:cNvPr id="15" name="Straight Connector 14">
+              <a:extLst>
+                <a:ext uri="{FF2B5EF4-FFF2-40B4-BE49-F238E27FC236}">
+                  <a16:creationId xmlns:a16="http://schemas.microsoft.com/office/drawing/2014/main" id="{9557E761-5A17-1E1F-33F8-B8E2CA279324}"/>
+                </a:ext>
+              </a:extLst>
+            </p:cNvPr>
+            <p:cNvCxnSpPr>
+              <a:cxnSpLocks/>
+            </p:cNvCxnSpPr>
+            <p:nvPr/>
+          </p:nvCxnSpPr>
+          <p:spPr>
+            <a:xfrm flipH="1">
+              <a:off x="5995884" y="4568844"/>
+              <a:ext cx="318989" cy="482649"/>
+            </a:xfrm>
+            <a:prstGeom prst="line">
+              <a:avLst/>
+            </a:prstGeom>
+          </p:spPr>
+          <p:style>
+            <a:lnRef idx="3">
+              <a:schemeClr val="dk1"/>
+            </a:lnRef>
+            <a:fillRef idx="0">
+              <a:schemeClr val="dk1"/>
+            </a:fillRef>
+            <a:effectRef idx="2">
+              <a:schemeClr val="dk1"/>
+            </a:effectRef>
+            <a:fontRef idx="minor">
+              <a:schemeClr val="tx1"/>
+            </a:fontRef>
+          </p:style>
+        </p:cxnSp>
+        <p:cxnSp>
+          <p:nvCxnSpPr>
+            <p:cNvPr id="16" name="Straight Connector 15">
+              <a:extLst>
+                <a:ext uri="{FF2B5EF4-FFF2-40B4-BE49-F238E27FC236}">
+                  <a16:creationId xmlns:a16="http://schemas.microsoft.com/office/drawing/2014/main" id="{F6605FDC-C7E4-C743-EB68-CC3A4ABC263A}"/>
+                </a:ext>
+              </a:extLst>
+            </p:cNvPr>
+            <p:cNvCxnSpPr>
+              <a:cxnSpLocks/>
+            </p:cNvCxnSpPr>
+            <p:nvPr/>
+          </p:nvCxnSpPr>
+          <p:spPr>
+            <a:xfrm flipH="1" flipV="1">
+              <a:off x="5834670" y="4761528"/>
+              <a:ext cx="17222" cy="125080"/>
+            </a:xfrm>
+            <a:prstGeom prst="line">
+              <a:avLst/>
+            </a:prstGeom>
+            <a:ln>
+              <a:solidFill>
+                <a:schemeClr val="bg2">
+                  <a:lumMod val="75000"/>
+                </a:schemeClr>
+              </a:solidFill>
+            </a:ln>
+          </p:spPr>
+          <p:style>
+            <a:lnRef idx="3">
+              <a:schemeClr val="dk1"/>
+            </a:lnRef>
+            <a:fillRef idx="0">
+              <a:schemeClr val="dk1"/>
+            </a:fillRef>
+            <a:effectRef idx="2">
+              <a:schemeClr val="dk1"/>
+            </a:effectRef>
+            <a:fontRef idx="minor">
+              <a:schemeClr val="tx1"/>
+            </a:fontRef>
+          </p:style>
+        </p:cxnSp>
+        <p:cxnSp>
+          <p:nvCxnSpPr>
+            <p:cNvPr id="17" name="Straight Connector 16">
+              <a:extLst>
+                <a:ext uri="{FF2B5EF4-FFF2-40B4-BE49-F238E27FC236}">
+                  <a16:creationId xmlns:a16="http://schemas.microsoft.com/office/drawing/2014/main" id="{BAB939D4-C53B-2D34-870F-C009778C5253}"/>
+                </a:ext>
+              </a:extLst>
+            </p:cNvPr>
+            <p:cNvCxnSpPr>
+              <a:cxnSpLocks/>
+            </p:cNvCxnSpPr>
+            <p:nvPr/>
+          </p:nvCxnSpPr>
+          <p:spPr>
+            <a:xfrm flipH="1" flipV="1">
+              <a:off x="6434541" y="4777738"/>
+              <a:ext cx="17222" cy="125080"/>
+            </a:xfrm>
+            <a:prstGeom prst="line">
+              <a:avLst/>
+            </a:prstGeom>
+            <a:ln>
+              <a:solidFill>
+                <a:schemeClr val="bg2">
+                  <a:lumMod val="75000"/>
+                </a:schemeClr>
+              </a:solidFill>
+            </a:ln>
+          </p:spPr>
+          <p:style>
+            <a:lnRef idx="3">
+              <a:schemeClr val="dk1"/>
+            </a:lnRef>
+            <a:fillRef idx="0">
+              <a:schemeClr val="dk1"/>
+            </a:fillRef>
+            <a:effectRef idx="2">
+              <a:schemeClr val="dk1"/>
+            </a:effectRef>
+            <a:fontRef idx="minor">
+              <a:schemeClr val="tx1"/>
+            </a:fontRef>
+          </p:style>
+        </p:cxnSp>
+        <p:cxnSp>
+          <p:nvCxnSpPr>
+            <p:cNvPr id="18" name="Straight Connector 17">
+              <a:extLst>
+                <a:ext uri="{FF2B5EF4-FFF2-40B4-BE49-F238E27FC236}">
+                  <a16:creationId xmlns:a16="http://schemas.microsoft.com/office/drawing/2014/main" id="{8794FD96-4FC8-A249-8E54-74C53DF9F690}"/>
+                </a:ext>
+              </a:extLst>
+            </p:cNvPr>
+            <p:cNvCxnSpPr>
+              <a:cxnSpLocks/>
+            </p:cNvCxnSpPr>
+            <p:nvPr/>
+          </p:nvCxnSpPr>
+          <p:spPr>
+            <a:xfrm flipH="1" flipV="1">
+              <a:off x="6479937" y="4648034"/>
+              <a:ext cx="17222" cy="125080"/>
+            </a:xfrm>
+            <a:prstGeom prst="line">
+              <a:avLst/>
+            </a:prstGeom>
+            <a:ln>
+              <a:solidFill>
+                <a:schemeClr val="bg2">
+                  <a:lumMod val="75000"/>
+                </a:schemeClr>
+              </a:solidFill>
+            </a:ln>
+          </p:spPr>
+          <p:style>
+            <a:lnRef idx="3">
+              <a:schemeClr val="dk1"/>
+            </a:lnRef>
+            <a:fillRef idx="0">
+              <a:schemeClr val="dk1"/>
+            </a:fillRef>
+            <a:effectRef idx="2">
+              <a:schemeClr val="dk1"/>
+            </a:effectRef>
+            <a:fontRef idx="minor">
+              <a:schemeClr val="tx1"/>
+            </a:fontRef>
+          </p:style>
+        </p:cxnSp>
+        <p:cxnSp>
+          <p:nvCxnSpPr>
+            <p:cNvPr id="19" name="Straight Connector 18">
+              <a:extLst>
+                <a:ext uri="{FF2B5EF4-FFF2-40B4-BE49-F238E27FC236}">
+                  <a16:creationId xmlns:a16="http://schemas.microsoft.com/office/drawing/2014/main" id="{31A656F3-CB35-9DAA-F5A4-DBF3DBE2B75B}"/>
+                </a:ext>
+              </a:extLst>
+            </p:cNvPr>
+            <p:cNvCxnSpPr>
+              <a:cxnSpLocks/>
+            </p:cNvCxnSpPr>
+            <p:nvPr/>
+          </p:nvCxnSpPr>
+          <p:spPr>
+            <a:xfrm flipH="1" flipV="1">
+              <a:off x="5811970" y="4836104"/>
+              <a:ext cx="17222" cy="125080"/>
+            </a:xfrm>
+            <a:prstGeom prst="line">
+              <a:avLst/>
+            </a:prstGeom>
+            <a:ln>
+              <a:solidFill>
+                <a:schemeClr val="bg2">
+                  <a:lumMod val="75000"/>
+                </a:schemeClr>
+              </a:solidFill>
+            </a:ln>
+          </p:spPr>
+          <p:style>
+            <a:lnRef idx="3">
+              <a:schemeClr val="dk1"/>
+            </a:lnRef>
+            <a:fillRef idx="0">
+              <a:schemeClr val="dk1"/>
+            </a:fillRef>
+            <a:effectRef idx="2">
+              <a:schemeClr val="dk1"/>
+            </a:effectRef>
+            <a:fontRef idx="minor">
+              <a:schemeClr val="tx1"/>
+            </a:fontRef>
+          </p:style>
+        </p:cxnSp>
+      </p:grpSp>
+      <p:grpSp>
+        <p:nvGrpSpPr>
+          <p:cNvPr id="20" name="Group 19">
+            <a:extLst>
+              <a:ext uri="{FF2B5EF4-FFF2-40B4-BE49-F238E27FC236}">
+                <a16:creationId xmlns:a16="http://schemas.microsoft.com/office/drawing/2014/main" id="{07415EB5-C1ED-AF73-C98A-83D90E7C8153}"/>
+              </a:ext>
+            </a:extLst>
+          </p:cNvPr>
+          <p:cNvGrpSpPr/>
+          <p:nvPr/>
+        </p:nvGrpSpPr>
+        <p:grpSpPr>
+          <a:xfrm>
+            <a:off x="8680619" y="4990135"/>
+            <a:ext cx="285945" cy="77185"/>
+            <a:chOff x="3581398" y="5343186"/>
+            <a:chExt cx="285945" cy="77185"/>
+          </a:xfrm>
+        </p:grpSpPr>
+        <p:cxnSp>
+          <p:nvCxnSpPr>
+            <p:cNvPr id="21" name="Straight Connector 20">
+              <a:extLst>
+                <a:ext uri="{FF2B5EF4-FFF2-40B4-BE49-F238E27FC236}">
+                  <a16:creationId xmlns:a16="http://schemas.microsoft.com/office/drawing/2014/main" id="{F0A86D0F-27A5-BBCA-FAAB-DBF48419A6DD}"/>
+                </a:ext>
+              </a:extLst>
+            </p:cNvPr>
+            <p:cNvCxnSpPr>
+              <a:cxnSpLocks/>
+            </p:cNvCxnSpPr>
+            <p:nvPr/>
+          </p:nvCxnSpPr>
+          <p:spPr>
+            <a:xfrm flipH="1" flipV="1">
+              <a:off x="3581398" y="5414526"/>
+              <a:ext cx="143273" cy="5845"/>
+            </a:xfrm>
+            <a:prstGeom prst="line">
+              <a:avLst/>
+            </a:prstGeom>
+            <a:ln>
+              <a:solidFill>
+                <a:schemeClr val="bg2">
+                  <a:lumMod val="90000"/>
+                </a:schemeClr>
+              </a:solidFill>
+            </a:ln>
+          </p:spPr>
+          <p:style>
+            <a:lnRef idx="3">
+              <a:schemeClr val="dk1"/>
+            </a:lnRef>
+            <a:fillRef idx="0">
+              <a:schemeClr val="dk1"/>
+            </a:fillRef>
+            <a:effectRef idx="2">
+              <a:schemeClr val="dk1"/>
+            </a:effectRef>
+            <a:fontRef idx="minor">
+              <a:schemeClr val="tx1"/>
+            </a:fontRef>
+          </p:style>
+        </p:cxnSp>
+        <p:cxnSp>
+          <p:nvCxnSpPr>
+            <p:cNvPr id="22" name="Straight Connector 21">
+              <a:extLst>
+                <a:ext uri="{FF2B5EF4-FFF2-40B4-BE49-F238E27FC236}">
+                  <a16:creationId xmlns:a16="http://schemas.microsoft.com/office/drawing/2014/main" id="{810D9CBC-4FB9-565E-D43F-E31342485931}"/>
+                </a:ext>
+              </a:extLst>
+            </p:cNvPr>
+            <p:cNvCxnSpPr>
+              <a:cxnSpLocks/>
+            </p:cNvCxnSpPr>
+            <p:nvPr/>
+          </p:nvCxnSpPr>
+          <p:spPr>
+            <a:xfrm flipH="1" flipV="1">
+              <a:off x="3724070" y="5343186"/>
+              <a:ext cx="143273" cy="5845"/>
+            </a:xfrm>
+            <a:prstGeom prst="line">
+              <a:avLst/>
+            </a:prstGeom>
+            <a:ln>
+              <a:solidFill>
+                <a:schemeClr val="bg2">
+                  <a:lumMod val="90000"/>
+                </a:schemeClr>
+              </a:solidFill>
+            </a:ln>
+          </p:spPr>
+          <p:style>
+            <a:lnRef idx="3">
+              <a:schemeClr val="dk1"/>
+            </a:lnRef>
+            <a:fillRef idx="0">
+              <a:schemeClr val="dk1"/>
+            </a:fillRef>
+            <a:effectRef idx="2">
+              <a:schemeClr val="dk1"/>
+            </a:effectRef>
+            <a:fontRef idx="minor">
+              <a:schemeClr val="tx1"/>
+            </a:fontRef>
+          </p:style>
+        </p:cxnSp>
+      </p:grpSp>
+      <p:grpSp>
+        <p:nvGrpSpPr>
+          <p:cNvPr id="23" name="Group 22">
+            <a:extLst>
+              <a:ext uri="{FF2B5EF4-FFF2-40B4-BE49-F238E27FC236}">
+                <a16:creationId xmlns:a16="http://schemas.microsoft.com/office/drawing/2014/main" id="{F9D27C61-751E-F4B9-A590-98A3B90A285E}"/>
+              </a:ext>
+            </a:extLst>
+          </p:cNvPr>
+          <p:cNvGrpSpPr/>
+          <p:nvPr/>
+        </p:nvGrpSpPr>
+        <p:grpSpPr>
+          <a:xfrm>
+            <a:off x="8278541" y="5677557"/>
+            <a:ext cx="285945" cy="77185"/>
+            <a:chOff x="3581398" y="5343186"/>
+            <a:chExt cx="285945" cy="77185"/>
+          </a:xfrm>
+        </p:grpSpPr>
+        <p:cxnSp>
+          <p:nvCxnSpPr>
+            <p:cNvPr id="24" name="Straight Connector 23">
+              <a:extLst>
+                <a:ext uri="{FF2B5EF4-FFF2-40B4-BE49-F238E27FC236}">
+                  <a16:creationId xmlns:a16="http://schemas.microsoft.com/office/drawing/2014/main" id="{F3E74EAC-5ACD-23CA-CE86-70C8D948BAB4}"/>
+                </a:ext>
+              </a:extLst>
+            </p:cNvPr>
+            <p:cNvCxnSpPr>
+              <a:cxnSpLocks/>
+            </p:cNvCxnSpPr>
+            <p:nvPr/>
+          </p:nvCxnSpPr>
+          <p:spPr>
+            <a:xfrm flipH="1" flipV="1">
+              <a:off x="3581398" y="5414526"/>
+              <a:ext cx="143273" cy="5845"/>
+            </a:xfrm>
+            <a:prstGeom prst="line">
+              <a:avLst/>
+            </a:prstGeom>
+            <a:ln>
+              <a:solidFill>
+                <a:schemeClr val="bg2">
+                  <a:lumMod val="90000"/>
+                </a:schemeClr>
+              </a:solidFill>
+            </a:ln>
+          </p:spPr>
+          <p:style>
+            <a:lnRef idx="3">
+              <a:schemeClr val="dk1"/>
+            </a:lnRef>
+            <a:fillRef idx="0">
+              <a:schemeClr val="dk1"/>
+            </a:fillRef>
+            <a:effectRef idx="2">
+              <a:schemeClr val="dk1"/>
+            </a:effectRef>
+            <a:fontRef idx="minor">
+              <a:schemeClr val="tx1"/>
+            </a:fontRef>
+          </p:style>
+        </p:cxnSp>
+        <p:cxnSp>
+          <p:nvCxnSpPr>
+            <p:cNvPr id="25" name="Straight Connector 24">
+              <a:extLst>
+                <a:ext uri="{FF2B5EF4-FFF2-40B4-BE49-F238E27FC236}">
+                  <a16:creationId xmlns:a16="http://schemas.microsoft.com/office/drawing/2014/main" id="{DF62BC6B-A01D-B06C-AFFE-C7729C415B97}"/>
+                </a:ext>
+              </a:extLst>
+            </p:cNvPr>
+            <p:cNvCxnSpPr>
+              <a:cxnSpLocks/>
+            </p:cNvCxnSpPr>
+            <p:nvPr/>
+          </p:nvCxnSpPr>
+          <p:spPr>
+            <a:xfrm flipH="1" flipV="1">
+              <a:off x="3724070" y="5343186"/>
+              <a:ext cx="143273" cy="5845"/>
+            </a:xfrm>
+            <a:prstGeom prst="line">
+              <a:avLst/>
+            </a:prstGeom>
+            <a:ln>
+              <a:solidFill>
+                <a:schemeClr val="bg2">
+                  <a:lumMod val="90000"/>
+                </a:schemeClr>
+              </a:solidFill>
+            </a:ln>
+          </p:spPr>
+          <p:style>
+            <a:lnRef idx="3">
+              <a:schemeClr val="dk1"/>
+            </a:lnRef>
+            <a:fillRef idx="0">
+              <a:schemeClr val="dk1"/>
+            </a:fillRef>
+            <a:effectRef idx="2">
+              <a:schemeClr val="dk1"/>
+            </a:effectRef>
+            <a:fontRef idx="minor">
+              <a:schemeClr val="tx1"/>
+            </a:fontRef>
+          </p:style>
+        </p:cxnSp>
+      </p:grpSp>
+      <p:grpSp>
+        <p:nvGrpSpPr>
+          <p:cNvPr id="26" name="Group 25">
+            <a:extLst>
+              <a:ext uri="{FF2B5EF4-FFF2-40B4-BE49-F238E27FC236}">
+                <a16:creationId xmlns:a16="http://schemas.microsoft.com/office/drawing/2014/main" id="{9F054D70-FEE7-89F1-793E-00C7C83B994E}"/>
+              </a:ext>
+            </a:extLst>
+          </p:cNvPr>
+          <p:cNvGrpSpPr/>
+          <p:nvPr/>
+        </p:nvGrpSpPr>
+        <p:grpSpPr>
+          <a:xfrm>
+            <a:off x="6446496" y="5868864"/>
+            <a:ext cx="285945" cy="77185"/>
+            <a:chOff x="3581398" y="5343186"/>
+            <a:chExt cx="285945" cy="77185"/>
+          </a:xfrm>
+        </p:grpSpPr>
+        <p:cxnSp>
+          <p:nvCxnSpPr>
+            <p:cNvPr id="27" name="Straight Connector 26">
+              <a:extLst>
+                <a:ext uri="{FF2B5EF4-FFF2-40B4-BE49-F238E27FC236}">
+                  <a16:creationId xmlns:a16="http://schemas.microsoft.com/office/drawing/2014/main" id="{26E6A160-20E2-A806-004C-B5FD5AD3512E}"/>
+                </a:ext>
+              </a:extLst>
+            </p:cNvPr>
+            <p:cNvCxnSpPr>
+              <a:cxnSpLocks/>
+            </p:cNvCxnSpPr>
+            <p:nvPr/>
+          </p:nvCxnSpPr>
+          <p:spPr>
+            <a:xfrm flipH="1" flipV="1">
+              <a:off x="3581398" y="5414526"/>
+              <a:ext cx="143273" cy="5845"/>
+            </a:xfrm>
+            <a:prstGeom prst="line">
+              <a:avLst/>
+            </a:prstGeom>
+            <a:ln>
+              <a:solidFill>
+                <a:schemeClr val="bg2">
+                  <a:lumMod val="90000"/>
+                </a:schemeClr>
+              </a:solidFill>
+            </a:ln>
+          </p:spPr>
+          <p:style>
+            <a:lnRef idx="3">
+              <a:schemeClr val="dk1"/>
+            </a:lnRef>
+            <a:fillRef idx="0">
+              <a:schemeClr val="dk1"/>
+            </a:fillRef>
+            <a:effectRef idx="2">
+              <a:schemeClr val="dk1"/>
+            </a:effectRef>
+            <a:fontRef idx="minor">
+              <a:schemeClr val="tx1"/>
+            </a:fontRef>
+          </p:style>
+        </p:cxnSp>
+        <p:cxnSp>
+          <p:nvCxnSpPr>
+            <p:cNvPr id="28" name="Straight Connector 27">
+              <a:extLst>
+                <a:ext uri="{FF2B5EF4-FFF2-40B4-BE49-F238E27FC236}">
+                  <a16:creationId xmlns:a16="http://schemas.microsoft.com/office/drawing/2014/main" id="{C0918458-F5EB-64A2-9D47-6ADEE185D1C8}"/>
+                </a:ext>
+              </a:extLst>
+            </p:cNvPr>
+            <p:cNvCxnSpPr>
+              <a:cxnSpLocks/>
+            </p:cNvCxnSpPr>
+            <p:nvPr/>
+          </p:nvCxnSpPr>
+          <p:spPr>
+            <a:xfrm flipH="1" flipV="1">
+              <a:off x="3724070" y="5343186"/>
+              <a:ext cx="143273" cy="5845"/>
+            </a:xfrm>
+            <a:prstGeom prst="line">
+              <a:avLst/>
+            </a:prstGeom>
+            <a:ln>
+              <a:solidFill>
+                <a:schemeClr val="bg2">
+                  <a:lumMod val="90000"/>
+                </a:schemeClr>
+              </a:solidFill>
+            </a:ln>
+          </p:spPr>
+          <p:style>
+            <a:lnRef idx="3">
+              <a:schemeClr val="dk1"/>
+            </a:lnRef>
+            <a:fillRef idx="0">
+              <a:schemeClr val="dk1"/>
+            </a:fillRef>
+            <a:effectRef idx="2">
+              <a:schemeClr val="dk1"/>
+            </a:effectRef>
+            <a:fontRef idx="minor">
+              <a:schemeClr val="tx1"/>
+            </a:fontRef>
+          </p:style>
+        </p:cxnSp>
+      </p:grpSp>
+      <p:grpSp>
+        <p:nvGrpSpPr>
+          <p:cNvPr id="29" name="Group 28">
+            <a:extLst>
+              <a:ext uri="{FF2B5EF4-FFF2-40B4-BE49-F238E27FC236}">
+                <a16:creationId xmlns:a16="http://schemas.microsoft.com/office/drawing/2014/main" id="{37BC24FF-E7F4-2880-5141-F7FCD8F9B8F6}"/>
+              </a:ext>
+            </a:extLst>
+          </p:cNvPr>
+          <p:cNvGrpSpPr/>
+          <p:nvPr/>
+        </p:nvGrpSpPr>
+        <p:grpSpPr>
+          <a:xfrm>
+            <a:off x="5914718" y="4918786"/>
+            <a:ext cx="285945" cy="77185"/>
+            <a:chOff x="3581398" y="5343186"/>
+            <a:chExt cx="285945" cy="77185"/>
+          </a:xfrm>
+        </p:grpSpPr>
+        <p:cxnSp>
+          <p:nvCxnSpPr>
+            <p:cNvPr id="30" name="Straight Connector 29">
+              <a:extLst>
+                <a:ext uri="{FF2B5EF4-FFF2-40B4-BE49-F238E27FC236}">
+                  <a16:creationId xmlns:a16="http://schemas.microsoft.com/office/drawing/2014/main" id="{E28097F6-655B-9C55-D539-52F454321344}"/>
+                </a:ext>
+              </a:extLst>
+            </p:cNvPr>
+            <p:cNvCxnSpPr>
+              <a:cxnSpLocks/>
+            </p:cNvCxnSpPr>
+            <p:nvPr/>
+          </p:nvCxnSpPr>
+          <p:spPr>
+            <a:xfrm flipH="1" flipV="1">
+              <a:off x="3581398" y="5414526"/>
+              <a:ext cx="143273" cy="5845"/>
+            </a:xfrm>
+            <a:prstGeom prst="line">
+              <a:avLst/>
+            </a:prstGeom>
+            <a:ln>
+              <a:solidFill>
+                <a:schemeClr val="bg2">
+                  <a:lumMod val="90000"/>
+                </a:schemeClr>
+              </a:solidFill>
+            </a:ln>
+          </p:spPr>
+          <p:style>
+            <a:lnRef idx="3">
+              <a:schemeClr val="dk1"/>
+            </a:lnRef>
+            <a:fillRef idx="0">
+              <a:schemeClr val="dk1"/>
+            </a:fillRef>
+            <a:effectRef idx="2">
+              <a:schemeClr val="dk1"/>
+            </a:effectRef>
+            <a:fontRef idx="minor">
+              <a:schemeClr val="tx1"/>
+            </a:fontRef>
+          </p:style>
+        </p:cxnSp>
+        <p:cxnSp>
+          <p:nvCxnSpPr>
+            <p:cNvPr id="31" name="Straight Connector 30">
+              <a:extLst>
+                <a:ext uri="{FF2B5EF4-FFF2-40B4-BE49-F238E27FC236}">
+                  <a16:creationId xmlns:a16="http://schemas.microsoft.com/office/drawing/2014/main" id="{1674744D-DF6B-67D2-32A6-9F5ABC870EB7}"/>
+                </a:ext>
+              </a:extLst>
+            </p:cNvPr>
+            <p:cNvCxnSpPr>
+              <a:cxnSpLocks/>
+            </p:cNvCxnSpPr>
+            <p:nvPr/>
+          </p:nvCxnSpPr>
+          <p:spPr>
+            <a:xfrm flipH="1" flipV="1">
+              <a:off x="3724070" y="5343186"/>
+              <a:ext cx="143273" cy="5845"/>
+            </a:xfrm>
+            <a:prstGeom prst="line">
+              <a:avLst/>
+            </a:prstGeom>
+            <a:ln>
+              <a:solidFill>
+                <a:schemeClr val="bg2">
+                  <a:lumMod val="90000"/>
+                </a:schemeClr>
+              </a:solidFill>
+            </a:ln>
+          </p:spPr>
+          <p:style>
+            <a:lnRef idx="3">
+              <a:schemeClr val="dk1"/>
+            </a:lnRef>
+            <a:fillRef idx="0">
+              <a:schemeClr val="dk1"/>
+            </a:fillRef>
+            <a:effectRef idx="2">
+              <a:schemeClr val="dk1"/>
+            </a:effectRef>
+            <a:fontRef idx="minor">
+              <a:schemeClr val="tx1"/>
+            </a:fontRef>
+          </p:style>
+        </p:cxnSp>
+      </p:grpSp>
+      <p:grpSp>
+        <p:nvGrpSpPr>
+          <p:cNvPr id="32" name="Group 31">
+            <a:extLst>
+              <a:ext uri="{FF2B5EF4-FFF2-40B4-BE49-F238E27FC236}">
+                <a16:creationId xmlns:a16="http://schemas.microsoft.com/office/drawing/2014/main" id="{CDF16B14-79B1-CD41-8D82-0283C084898F}"/>
+              </a:ext>
+            </a:extLst>
+          </p:cNvPr>
+          <p:cNvGrpSpPr/>
+          <p:nvPr/>
+        </p:nvGrpSpPr>
+        <p:grpSpPr>
+          <a:xfrm>
+            <a:off x="7526270" y="4711261"/>
+            <a:ext cx="285945" cy="77185"/>
+            <a:chOff x="3581398" y="5343186"/>
+            <a:chExt cx="285945" cy="77185"/>
+          </a:xfrm>
+        </p:grpSpPr>
+        <p:cxnSp>
+          <p:nvCxnSpPr>
+            <p:cNvPr id="33" name="Straight Connector 32">
+              <a:extLst>
+                <a:ext uri="{FF2B5EF4-FFF2-40B4-BE49-F238E27FC236}">
+                  <a16:creationId xmlns:a16="http://schemas.microsoft.com/office/drawing/2014/main" id="{2DCBFFCA-8837-B70B-3F08-596FE21E4818}"/>
+                </a:ext>
+              </a:extLst>
+            </p:cNvPr>
+            <p:cNvCxnSpPr>
+              <a:cxnSpLocks/>
+            </p:cNvCxnSpPr>
+            <p:nvPr/>
+          </p:nvCxnSpPr>
+          <p:spPr>
+            <a:xfrm flipH="1" flipV="1">
+              <a:off x="3581398" y="5414526"/>
+              <a:ext cx="143273" cy="5845"/>
+            </a:xfrm>
+            <a:prstGeom prst="line">
+              <a:avLst/>
+            </a:prstGeom>
+            <a:ln>
+              <a:solidFill>
+                <a:schemeClr val="bg2">
+                  <a:lumMod val="90000"/>
+                </a:schemeClr>
+              </a:solidFill>
+            </a:ln>
+          </p:spPr>
+          <p:style>
+            <a:lnRef idx="3">
+              <a:schemeClr val="dk1"/>
+            </a:lnRef>
+            <a:fillRef idx="0">
+              <a:schemeClr val="dk1"/>
+            </a:fillRef>
+            <a:effectRef idx="2">
+              <a:schemeClr val="dk1"/>
+            </a:effectRef>
+            <a:fontRef idx="minor">
+              <a:schemeClr val="tx1"/>
+            </a:fontRef>
+          </p:style>
+        </p:cxnSp>
+        <p:cxnSp>
+          <p:nvCxnSpPr>
+            <p:cNvPr id="34" name="Straight Connector 33">
+              <a:extLst>
+                <a:ext uri="{FF2B5EF4-FFF2-40B4-BE49-F238E27FC236}">
+                  <a16:creationId xmlns:a16="http://schemas.microsoft.com/office/drawing/2014/main" id="{67A00CC6-2615-7FF4-450B-3E9BD30D9419}"/>
+                </a:ext>
+              </a:extLst>
+            </p:cNvPr>
+            <p:cNvCxnSpPr>
+              <a:cxnSpLocks/>
+            </p:cNvCxnSpPr>
+            <p:nvPr/>
+          </p:nvCxnSpPr>
+          <p:spPr>
+            <a:xfrm flipH="1" flipV="1">
+              <a:off x="3724070" y="5343186"/>
+              <a:ext cx="143273" cy="5845"/>
+            </a:xfrm>
+            <a:prstGeom prst="line">
+              <a:avLst/>
+            </a:prstGeom>
+            <a:ln>
+              <a:solidFill>
+                <a:schemeClr val="bg2">
+                  <a:lumMod val="90000"/>
+                </a:schemeClr>
+              </a:solidFill>
+            </a:ln>
+          </p:spPr>
+          <p:style>
+            <a:lnRef idx="3">
+              <a:schemeClr val="dk1"/>
+            </a:lnRef>
+            <a:fillRef idx="0">
+              <a:schemeClr val="dk1"/>
+            </a:fillRef>
+            <a:effectRef idx="2">
+              <a:schemeClr val="dk1"/>
+            </a:effectRef>
+            <a:fontRef idx="minor">
+              <a:schemeClr val="tx1"/>
+            </a:fontRef>
+          </p:style>
+        </p:cxnSp>
+      </p:grpSp>
+      <p:grpSp>
+        <p:nvGrpSpPr>
+          <p:cNvPr id="35" name="Group 34">
+            <a:extLst>
+              <a:ext uri="{FF2B5EF4-FFF2-40B4-BE49-F238E27FC236}">
+                <a16:creationId xmlns:a16="http://schemas.microsoft.com/office/drawing/2014/main" id="{A2A847BE-6026-5EA6-2B34-567298A427AF}"/>
+              </a:ext>
+            </a:extLst>
+          </p:cNvPr>
+          <p:cNvGrpSpPr/>
+          <p:nvPr/>
+        </p:nvGrpSpPr>
+        <p:grpSpPr>
+          <a:xfrm>
+            <a:off x="9935491" y="5048489"/>
+            <a:ext cx="285945" cy="77185"/>
+            <a:chOff x="3581398" y="5343186"/>
+            <a:chExt cx="285945" cy="77185"/>
+          </a:xfrm>
+        </p:grpSpPr>
+        <p:cxnSp>
+          <p:nvCxnSpPr>
+            <p:cNvPr id="36" name="Straight Connector 35">
+              <a:extLst>
+                <a:ext uri="{FF2B5EF4-FFF2-40B4-BE49-F238E27FC236}">
+                  <a16:creationId xmlns:a16="http://schemas.microsoft.com/office/drawing/2014/main" id="{02E54EA7-7C14-A7F3-3C7C-90CD99B8A7E8}"/>
+                </a:ext>
+              </a:extLst>
+            </p:cNvPr>
+            <p:cNvCxnSpPr>
+              <a:cxnSpLocks/>
+            </p:cNvCxnSpPr>
+            <p:nvPr/>
+          </p:nvCxnSpPr>
+          <p:spPr>
+            <a:xfrm flipH="1" flipV="1">
+              <a:off x="3581398" y="5414526"/>
+              <a:ext cx="143273" cy="5845"/>
+            </a:xfrm>
+            <a:prstGeom prst="line">
+              <a:avLst/>
+            </a:prstGeom>
+            <a:ln>
+              <a:solidFill>
+                <a:schemeClr val="bg2">
+                  <a:lumMod val="90000"/>
+                </a:schemeClr>
+              </a:solidFill>
+            </a:ln>
+          </p:spPr>
+          <p:style>
+            <a:lnRef idx="3">
+              <a:schemeClr val="dk1"/>
+            </a:lnRef>
+            <a:fillRef idx="0">
+              <a:schemeClr val="dk1"/>
+            </a:fillRef>
+            <a:effectRef idx="2">
+              <a:schemeClr val="dk1"/>
+            </a:effectRef>
+            <a:fontRef idx="minor">
+              <a:schemeClr val="tx1"/>
+            </a:fontRef>
+          </p:style>
+        </p:cxnSp>
+        <p:cxnSp>
+          <p:nvCxnSpPr>
+            <p:cNvPr id="37" name="Straight Connector 36">
+              <a:extLst>
+                <a:ext uri="{FF2B5EF4-FFF2-40B4-BE49-F238E27FC236}">
+                  <a16:creationId xmlns:a16="http://schemas.microsoft.com/office/drawing/2014/main" id="{43AD53CA-5022-4775-1770-FFED74FEF914}"/>
+                </a:ext>
+              </a:extLst>
+            </p:cNvPr>
+            <p:cNvCxnSpPr>
+              <a:cxnSpLocks/>
+            </p:cNvCxnSpPr>
+            <p:nvPr/>
+          </p:nvCxnSpPr>
+          <p:spPr>
+            <a:xfrm flipH="1" flipV="1">
+              <a:off x="3724070" y="5343186"/>
+              <a:ext cx="143273" cy="5845"/>
+            </a:xfrm>
+            <a:prstGeom prst="line">
+              <a:avLst/>
+            </a:prstGeom>
+            <a:ln>
+              <a:solidFill>
+                <a:schemeClr val="bg2">
+                  <a:lumMod val="90000"/>
+                </a:schemeClr>
+              </a:solidFill>
+            </a:ln>
+          </p:spPr>
+          <p:style>
+            <a:lnRef idx="3">
+              <a:schemeClr val="dk1"/>
+            </a:lnRef>
+            <a:fillRef idx="0">
+              <a:schemeClr val="dk1"/>
+            </a:fillRef>
+            <a:effectRef idx="2">
+              <a:schemeClr val="dk1"/>
+            </a:effectRef>
+            <a:fontRef idx="minor">
+              <a:schemeClr val="tx1"/>
+            </a:fontRef>
+          </p:style>
+        </p:cxnSp>
+      </p:grpSp>
+      <p:grpSp>
+        <p:nvGrpSpPr>
+          <p:cNvPr id="38" name="Group 37">
+            <a:extLst>
+              <a:ext uri="{FF2B5EF4-FFF2-40B4-BE49-F238E27FC236}">
+                <a16:creationId xmlns:a16="http://schemas.microsoft.com/office/drawing/2014/main" id="{DD0BE690-955D-842C-B52A-55EF6E14886A}"/>
+              </a:ext>
+            </a:extLst>
+          </p:cNvPr>
+          <p:cNvGrpSpPr/>
+          <p:nvPr/>
+        </p:nvGrpSpPr>
+        <p:grpSpPr>
+          <a:xfrm>
+            <a:off x="10525636" y="5074430"/>
+            <a:ext cx="285945" cy="77185"/>
+            <a:chOff x="3581398" y="5343186"/>
+            <a:chExt cx="285945" cy="77185"/>
+          </a:xfrm>
+        </p:grpSpPr>
+        <p:cxnSp>
+          <p:nvCxnSpPr>
+            <p:cNvPr id="39" name="Straight Connector 38">
+              <a:extLst>
+                <a:ext uri="{FF2B5EF4-FFF2-40B4-BE49-F238E27FC236}">
+                  <a16:creationId xmlns:a16="http://schemas.microsoft.com/office/drawing/2014/main" id="{E0290D71-BCCD-2795-8F6B-09E1159AF993}"/>
+                </a:ext>
+              </a:extLst>
+            </p:cNvPr>
+            <p:cNvCxnSpPr>
+              <a:cxnSpLocks/>
+            </p:cNvCxnSpPr>
+            <p:nvPr/>
+          </p:nvCxnSpPr>
+          <p:spPr>
+            <a:xfrm flipH="1" flipV="1">
+              <a:off x="3581398" y="5414526"/>
+              <a:ext cx="143273" cy="5845"/>
+            </a:xfrm>
+            <a:prstGeom prst="line">
+              <a:avLst/>
+            </a:prstGeom>
+            <a:ln>
+              <a:solidFill>
+                <a:schemeClr val="bg2">
+                  <a:lumMod val="90000"/>
+                </a:schemeClr>
+              </a:solidFill>
+            </a:ln>
+          </p:spPr>
+          <p:style>
+            <a:lnRef idx="3">
+              <a:schemeClr val="dk1"/>
+            </a:lnRef>
+            <a:fillRef idx="0">
+              <a:schemeClr val="dk1"/>
+            </a:fillRef>
+            <a:effectRef idx="2">
+              <a:schemeClr val="dk1"/>
+            </a:effectRef>
+            <a:fontRef idx="minor">
+              <a:schemeClr val="tx1"/>
+            </a:fontRef>
+          </p:style>
+        </p:cxnSp>
+        <p:cxnSp>
+          <p:nvCxnSpPr>
+            <p:cNvPr id="40" name="Straight Connector 39">
+              <a:extLst>
+                <a:ext uri="{FF2B5EF4-FFF2-40B4-BE49-F238E27FC236}">
+                  <a16:creationId xmlns:a16="http://schemas.microsoft.com/office/drawing/2014/main" id="{39B4245A-0508-F571-A0EF-8B797ADB89DA}"/>
+                </a:ext>
+              </a:extLst>
+            </p:cNvPr>
+            <p:cNvCxnSpPr>
+              <a:cxnSpLocks/>
+            </p:cNvCxnSpPr>
+            <p:nvPr/>
+          </p:nvCxnSpPr>
+          <p:spPr>
+            <a:xfrm flipH="1" flipV="1">
+              <a:off x="3724070" y="5343186"/>
+              <a:ext cx="143273" cy="5845"/>
+            </a:xfrm>
+            <a:prstGeom prst="line">
+              <a:avLst/>
+            </a:prstGeom>
+            <a:ln>
+              <a:solidFill>
+                <a:schemeClr val="bg2">
+                  <a:lumMod val="90000"/>
+                </a:schemeClr>
+              </a:solidFill>
+            </a:ln>
+          </p:spPr>
+          <p:style>
+            <a:lnRef idx="3">
+              <a:schemeClr val="dk1"/>
+            </a:lnRef>
+            <a:fillRef idx="0">
+              <a:schemeClr val="dk1"/>
+            </a:fillRef>
+            <a:effectRef idx="2">
+              <a:schemeClr val="dk1"/>
+            </a:effectRef>
+            <a:fontRef idx="minor">
+              <a:schemeClr val="tx1"/>
+            </a:fontRef>
+          </p:style>
+        </p:cxnSp>
+      </p:grpSp>
+      <p:grpSp>
+        <p:nvGrpSpPr>
+          <p:cNvPr id="41" name="Group 40">
+            <a:extLst>
+              <a:ext uri="{FF2B5EF4-FFF2-40B4-BE49-F238E27FC236}">
+                <a16:creationId xmlns:a16="http://schemas.microsoft.com/office/drawing/2014/main" id="{DF6FBD9A-9617-95F0-2A4E-62A5D3FE9781}"/>
+              </a:ext>
+            </a:extLst>
+          </p:cNvPr>
+          <p:cNvGrpSpPr/>
+          <p:nvPr/>
+        </p:nvGrpSpPr>
+        <p:grpSpPr>
+          <a:xfrm>
+            <a:off x="9452349" y="5703488"/>
+            <a:ext cx="285945" cy="77185"/>
+            <a:chOff x="3581398" y="5343186"/>
+            <a:chExt cx="285945" cy="77185"/>
+          </a:xfrm>
+        </p:grpSpPr>
+        <p:cxnSp>
+          <p:nvCxnSpPr>
+            <p:cNvPr id="42" name="Straight Connector 41">
+              <a:extLst>
+                <a:ext uri="{FF2B5EF4-FFF2-40B4-BE49-F238E27FC236}">
+                  <a16:creationId xmlns:a16="http://schemas.microsoft.com/office/drawing/2014/main" id="{2D364756-E848-E4AF-5C5E-799A265FAF17}"/>
+                </a:ext>
+              </a:extLst>
+            </p:cNvPr>
+            <p:cNvCxnSpPr>
+              <a:cxnSpLocks/>
+            </p:cNvCxnSpPr>
+            <p:nvPr/>
+          </p:nvCxnSpPr>
+          <p:spPr>
+            <a:xfrm flipH="1" flipV="1">
+              <a:off x="3581398" y="5414526"/>
+              <a:ext cx="143273" cy="5845"/>
+            </a:xfrm>
+            <a:prstGeom prst="line">
+              <a:avLst/>
+            </a:prstGeom>
+            <a:ln>
+              <a:solidFill>
+                <a:schemeClr val="bg2">
+                  <a:lumMod val="90000"/>
+                </a:schemeClr>
+              </a:solidFill>
+            </a:ln>
+          </p:spPr>
+          <p:style>
+            <a:lnRef idx="3">
+              <a:schemeClr val="dk1"/>
+            </a:lnRef>
+            <a:fillRef idx="0">
+              <a:schemeClr val="dk1"/>
+            </a:fillRef>
+            <a:effectRef idx="2">
+              <a:schemeClr val="dk1"/>
+            </a:effectRef>
+            <a:fontRef idx="minor">
+              <a:schemeClr val="tx1"/>
+            </a:fontRef>
+          </p:style>
+        </p:cxnSp>
+        <p:cxnSp>
+          <p:nvCxnSpPr>
+            <p:cNvPr id="43" name="Straight Connector 42">
+              <a:extLst>
+                <a:ext uri="{FF2B5EF4-FFF2-40B4-BE49-F238E27FC236}">
+                  <a16:creationId xmlns:a16="http://schemas.microsoft.com/office/drawing/2014/main" id="{AECA4EF8-961A-3963-C352-0EAA9114E612}"/>
+                </a:ext>
+              </a:extLst>
+            </p:cNvPr>
+            <p:cNvCxnSpPr>
+              <a:cxnSpLocks/>
+            </p:cNvCxnSpPr>
+            <p:nvPr/>
+          </p:nvCxnSpPr>
+          <p:spPr>
+            <a:xfrm flipH="1" flipV="1">
+              <a:off x="3724070" y="5343186"/>
+              <a:ext cx="143273" cy="5845"/>
+            </a:xfrm>
+            <a:prstGeom prst="line">
+              <a:avLst/>
+            </a:prstGeom>
+            <a:ln>
+              <a:solidFill>
+                <a:schemeClr val="bg2">
+                  <a:lumMod val="90000"/>
+                </a:schemeClr>
+              </a:solidFill>
+            </a:ln>
+          </p:spPr>
+          <p:style>
+            <a:lnRef idx="3">
+              <a:schemeClr val="dk1"/>
+            </a:lnRef>
+            <a:fillRef idx="0">
+              <a:schemeClr val="dk1"/>
+            </a:fillRef>
+            <a:effectRef idx="2">
+              <a:schemeClr val="dk1"/>
+            </a:effectRef>
+            <a:fontRef idx="minor">
+              <a:schemeClr val="tx1"/>
+            </a:fontRef>
+          </p:style>
+        </p:cxnSp>
+      </p:grpSp>
+      <p:grpSp>
+        <p:nvGrpSpPr>
+          <p:cNvPr id="44" name="Group 43">
+            <a:extLst>
+              <a:ext uri="{FF2B5EF4-FFF2-40B4-BE49-F238E27FC236}">
+                <a16:creationId xmlns:a16="http://schemas.microsoft.com/office/drawing/2014/main" id="{1C5FA76D-838A-8628-4479-79900045B374}"/>
+              </a:ext>
+            </a:extLst>
+          </p:cNvPr>
+          <p:cNvGrpSpPr/>
+          <p:nvPr/>
+        </p:nvGrpSpPr>
+        <p:grpSpPr>
+          <a:xfrm>
+            <a:off x="7036644" y="5495965"/>
+            <a:ext cx="285945" cy="77185"/>
+            <a:chOff x="3581398" y="5343186"/>
+            <a:chExt cx="285945" cy="77185"/>
+          </a:xfrm>
+        </p:grpSpPr>
+        <p:cxnSp>
+          <p:nvCxnSpPr>
+            <p:cNvPr id="45" name="Straight Connector 44">
+              <a:extLst>
+                <a:ext uri="{FF2B5EF4-FFF2-40B4-BE49-F238E27FC236}">
+                  <a16:creationId xmlns:a16="http://schemas.microsoft.com/office/drawing/2014/main" id="{C54C900A-02D1-1E7F-175D-1CDCCD4667A6}"/>
+                </a:ext>
+              </a:extLst>
+            </p:cNvPr>
+            <p:cNvCxnSpPr>
+              <a:cxnSpLocks/>
+            </p:cNvCxnSpPr>
+            <p:nvPr/>
+          </p:nvCxnSpPr>
+          <p:spPr>
+            <a:xfrm flipH="1" flipV="1">
+              <a:off x="3581398" y="5414526"/>
+              <a:ext cx="143273" cy="5845"/>
+            </a:xfrm>
+            <a:prstGeom prst="line">
+              <a:avLst/>
+            </a:prstGeom>
+            <a:ln>
+              <a:solidFill>
+                <a:schemeClr val="bg2">
+                  <a:lumMod val="90000"/>
+                </a:schemeClr>
+              </a:solidFill>
+            </a:ln>
+          </p:spPr>
+          <p:style>
+            <a:lnRef idx="3">
+              <a:schemeClr val="dk1"/>
+            </a:lnRef>
+            <a:fillRef idx="0">
+              <a:schemeClr val="dk1"/>
+            </a:fillRef>
+            <a:effectRef idx="2">
+              <a:schemeClr val="dk1"/>
+            </a:effectRef>
+            <a:fontRef idx="minor">
+              <a:schemeClr val="tx1"/>
+            </a:fontRef>
+          </p:style>
+        </p:cxnSp>
+        <p:cxnSp>
+          <p:nvCxnSpPr>
+            <p:cNvPr id="46" name="Straight Connector 45">
+              <a:extLst>
+                <a:ext uri="{FF2B5EF4-FFF2-40B4-BE49-F238E27FC236}">
+                  <a16:creationId xmlns:a16="http://schemas.microsoft.com/office/drawing/2014/main" id="{3344E66A-D840-577A-CEB6-C014DBDF0126}"/>
+                </a:ext>
+              </a:extLst>
+            </p:cNvPr>
+            <p:cNvCxnSpPr>
+              <a:cxnSpLocks/>
+            </p:cNvCxnSpPr>
+            <p:nvPr/>
+          </p:nvCxnSpPr>
+          <p:spPr>
+            <a:xfrm flipH="1" flipV="1">
+              <a:off x="3724070" y="5343186"/>
+              <a:ext cx="143273" cy="5845"/>
+            </a:xfrm>
+            <a:prstGeom prst="line">
+              <a:avLst/>
+            </a:prstGeom>
+            <a:ln>
+              <a:solidFill>
+                <a:schemeClr val="bg2">
+                  <a:lumMod val="90000"/>
+                </a:schemeClr>
+              </a:solidFill>
+            </a:ln>
+          </p:spPr>
+          <p:style>
+            <a:lnRef idx="3">
+              <a:schemeClr val="dk1"/>
+            </a:lnRef>
+            <a:fillRef idx="0">
+              <a:schemeClr val="dk1"/>
+            </a:fillRef>
+            <a:effectRef idx="2">
+              <a:schemeClr val="dk1"/>
+            </a:effectRef>
+            <a:fontRef idx="minor">
+              <a:schemeClr val="tx1"/>
+            </a:fontRef>
+          </p:style>
+        </p:cxnSp>
+      </p:grpSp>
+      <p:grpSp>
+        <p:nvGrpSpPr>
+          <p:cNvPr id="47" name="Group 46">
+            <a:extLst>
+              <a:ext uri="{FF2B5EF4-FFF2-40B4-BE49-F238E27FC236}">
+                <a16:creationId xmlns:a16="http://schemas.microsoft.com/office/drawing/2014/main" id="{88E36DAD-BF69-4B07-2513-1872FE949EE6}"/>
+              </a:ext>
+            </a:extLst>
+          </p:cNvPr>
+          <p:cNvGrpSpPr/>
+          <p:nvPr/>
+        </p:nvGrpSpPr>
+        <p:grpSpPr>
+          <a:xfrm>
+            <a:off x="6936131" y="5084158"/>
+            <a:ext cx="285945" cy="77185"/>
+            <a:chOff x="3581398" y="5343186"/>
+            <a:chExt cx="285945" cy="77185"/>
+          </a:xfrm>
+        </p:grpSpPr>
+        <p:cxnSp>
+          <p:nvCxnSpPr>
+            <p:cNvPr id="48" name="Straight Connector 47">
+              <a:extLst>
+                <a:ext uri="{FF2B5EF4-FFF2-40B4-BE49-F238E27FC236}">
+                  <a16:creationId xmlns:a16="http://schemas.microsoft.com/office/drawing/2014/main" id="{BAA70129-FD33-72E6-8587-523910CE858B}"/>
+                </a:ext>
+              </a:extLst>
+            </p:cNvPr>
+            <p:cNvCxnSpPr>
+              <a:cxnSpLocks/>
+            </p:cNvCxnSpPr>
+            <p:nvPr/>
+          </p:nvCxnSpPr>
+          <p:spPr>
+            <a:xfrm flipH="1" flipV="1">
+              <a:off x="3581398" y="5414526"/>
+              <a:ext cx="143273" cy="5845"/>
+            </a:xfrm>
+            <a:prstGeom prst="line">
+              <a:avLst/>
+            </a:prstGeom>
+            <a:ln>
+              <a:solidFill>
+                <a:schemeClr val="bg2">
+                  <a:lumMod val="90000"/>
+                </a:schemeClr>
+              </a:solidFill>
+            </a:ln>
+          </p:spPr>
+          <p:style>
+            <a:lnRef idx="3">
+              <a:schemeClr val="dk1"/>
+            </a:lnRef>
+            <a:fillRef idx="0">
+              <a:schemeClr val="dk1"/>
+            </a:fillRef>
+            <a:effectRef idx="2">
+              <a:schemeClr val="dk1"/>
+            </a:effectRef>
+            <a:fontRef idx="minor">
+              <a:schemeClr val="tx1"/>
+            </a:fontRef>
+          </p:style>
+        </p:cxnSp>
+        <p:cxnSp>
+          <p:nvCxnSpPr>
+            <p:cNvPr id="49" name="Straight Connector 48">
+              <a:extLst>
+                <a:ext uri="{FF2B5EF4-FFF2-40B4-BE49-F238E27FC236}">
+                  <a16:creationId xmlns:a16="http://schemas.microsoft.com/office/drawing/2014/main" id="{AB4ED836-3ACF-0200-137A-4D73A4F34017}"/>
+                </a:ext>
+              </a:extLst>
+            </p:cNvPr>
+            <p:cNvCxnSpPr>
+              <a:cxnSpLocks/>
+            </p:cNvCxnSpPr>
+            <p:nvPr/>
+          </p:nvCxnSpPr>
+          <p:spPr>
+            <a:xfrm flipH="1" flipV="1">
+              <a:off x="3724070" y="5343186"/>
+              <a:ext cx="143273" cy="5845"/>
+            </a:xfrm>
+            <a:prstGeom prst="line">
+              <a:avLst/>
+            </a:prstGeom>
+            <a:ln>
+              <a:solidFill>
+                <a:schemeClr val="bg2">
+                  <a:lumMod val="90000"/>
+                </a:schemeClr>
+              </a:solidFill>
+            </a:ln>
+          </p:spPr>
+          <p:style>
+            <a:lnRef idx="3">
+              <a:schemeClr val="dk1"/>
+            </a:lnRef>
+            <a:fillRef idx="0">
+              <a:schemeClr val="dk1"/>
+            </a:fillRef>
+            <a:effectRef idx="2">
+              <a:schemeClr val="dk1"/>
+            </a:effectRef>
+            <a:fontRef idx="minor">
+              <a:schemeClr val="tx1"/>
+            </a:fontRef>
+          </p:style>
+        </p:cxnSp>
+      </p:grpSp>
+      <p:grpSp>
+        <p:nvGrpSpPr>
+          <p:cNvPr id="50" name="Group 49">
+            <a:extLst>
+              <a:ext uri="{FF2B5EF4-FFF2-40B4-BE49-F238E27FC236}">
+                <a16:creationId xmlns:a16="http://schemas.microsoft.com/office/drawing/2014/main" id="{F6141B08-AE50-437B-97F2-E2FD94B39F45}"/>
+              </a:ext>
+            </a:extLst>
+          </p:cNvPr>
+          <p:cNvGrpSpPr/>
+          <p:nvPr/>
+        </p:nvGrpSpPr>
+        <p:grpSpPr>
+          <a:xfrm>
+            <a:off x="5395920" y="5266331"/>
+            <a:ext cx="285945" cy="77185"/>
+            <a:chOff x="3581398" y="5343186"/>
+            <a:chExt cx="285945" cy="77185"/>
+          </a:xfrm>
+        </p:grpSpPr>
+        <p:cxnSp>
+          <p:nvCxnSpPr>
+            <p:cNvPr id="51" name="Straight Connector 50">
+              <a:extLst>
+                <a:ext uri="{FF2B5EF4-FFF2-40B4-BE49-F238E27FC236}">
+                  <a16:creationId xmlns:a16="http://schemas.microsoft.com/office/drawing/2014/main" id="{61C938D9-CA4E-3F54-C21F-FE4220C730B1}"/>
+                </a:ext>
+              </a:extLst>
+            </p:cNvPr>
+            <p:cNvCxnSpPr>
+              <a:cxnSpLocks/>
+            </p:cNvCxnSpPr>
+            <p:nvPr/>
+          </p:nvCxnSpPr>
+          <p:spPr>
+            <a:xfrm flipH="1" flipV="1">
+              <a:off x="3581398" y="5414526"/>
+              <a:ext cx="143273" cy="5845"/>
+            </a:xfrm>
+            <a:prstGeom prst="line">
+              <a:avLst/>
+            </a:prstGeom>
+            <a:ln>
+              <a:solidFill>
+                <a:schemeClr val="bg2">
+                  <a:lumMod val="90000"/>
+                </a:schemeClr>
+              </a:solidFill>
+            </a:ln>
+          </p:spPr>
+          <p:style>
+            <a:lnRef idx="3">
+              <a:schemeClr val="dk1"/>
+            </a:lnRef>
+            <a:fillRef idx="0">
+              <a:schemeClr val="dk1"/>
+            </a:fillRef>
+            <a:effectRef idx="2">
+              <a:schemeClr val="dk1"/>
+            </a:effectRef>
+            <a:fontRef idx="minor">
+              <a:schemeClr val="tx1"/>
+            </a:fontRef>
+          </p:style>
+        </p:cxnSp>
+        <p:cxnSp>
+          <p:nvCxnSpPr>
+            <p:cNvPr id="52" name="Straight Connector 51">
+              <a:extLst>
+                <a:ext uri="{FF2B5EF4-FFF2-40B4-BE49-F238E27FC236}">
+                  <a16:creationId xmlns:a16="http://schemas.microsoft.com/office/drawing/2014/main" id="{9E1FC9BE-19E8-4A79-E68A-A9DED61F7EE9}"/>
+                </a:ext>
+              </a:extLst>
+            </p:cNvPr>
+            <p:cNvCxnSpPr>
+              <a:cxnSpLocks/>
+            </p:cNvCxnSpPr>
+            <p:nvPr/>
+          </p:nvCxnSpPr>
+          <p:spPr>
+            <a:xfrm flipH="1" flipV="1">
+              <a:off x="3724070" y="5343186"/>
+              <a:ext cx="143273" cy="5845"/>
+            </a:xfrm>
+            <a:prstGeom prst="line">
+              <a:avLst/>
+            </a:prstGeom>
+            <a:ln>
+              <a:solidFill>
+                <a:schemeClr val="bg2">
+                  <a:lumMod val="90000"/>
+                </a:schemeClr>
+              </a:solidFill>
+            </a:ln>
+          </p:spPr>
+          <p:style>
+            <a:lnRef idx="3">
+              <a:schemeClr val="dk1"/>
+            </a:lnRef>
+            <a:fillRef idx="0">
+              <a:schemeClr val="dk1"/>
+            </a:fillRef>
+            <a:effectRef idx="2">
+              <a:schemeClr val="dk1"/>
+            </a:effectRef>
+            <a:fontRef idx="minor">
+              <a:schemeClr val="tx1"/>
+            </a:fontRef>
+          </p:style>
+        </p:cxnSp>
+      </p:grpSp>
+      <p:grpSp>
+        <p:nvGrpSpPr>
+          <p:cNvPr id="53" name="Group 52">
+            <a:extLst>
+              <a:ext uri="{FF2B5EF4-FFF2-40B4-BE49-F238E27FC236}">
+                <a16:creationId xmlns:a16="http://schemas.microsoft.com/office/drawing/2014/main" id="{4F994A52-E372-8B82-89E6-54EBBE34CAE5}"/>
+              </a:ext>
+            </a:extLst>
+          </p:cNvPr>
+          <p:cNvGrpSpPr/>
+          <p:nvPr/>
+        </p:nvGrpSpPr>
+        <p:grpSpPr>
+          <a:xfrm>
+            <a:off x="6343849" y="4855091"/>
+            <a:ext cx="285945" cy="77185"/>
+            <a:chOff x="3581398" y="5343186"/>
+            <a:chExt cx="285945" cy="77185"/>
+          </a:xfrm>
+        </p:grpSpPr>
+        <p:cxnSp>
+          <p:nvCxnSpPr>
+            <p:cNvPr id="54" name="Straight Connector 53">
+              <a:extLst>
+                <a:ext uri="{FF2B5EF4-FFF2-40B4-BE49-F238E27FC236}">
+                  <a16:creationId xmlns:a16="http://schemas.microsoft.com/office/drawing/2014/main" id="{ED6A2FEE-DB79-A772-F54B-2817947A4AF6}"/>
+                </a:ext>
+              </a:extLst>
+            </p:cNvPr>
+            <p:cNvCxnSpPr>
+              <a:cxnSpLocks/>
+            </p:cNvCxnSpPr>
+            <p:nvPr/>
+          </p:nvCxnSpPr>
+          <p:spPr>
+            <a:xfrm flipH="1" flipV="1">
+              <a:off x="3581398" y="5414526"/>
+              <a:ext cx="143273" cy="5845"/>
+            </a:xfrm>
+            <a:prstGeom prst="line">
+              <a:avLst/>
+            </a:prstGeom>
+            <a:ln>
+              <a:solidFill>
+                <a:schemeClr val="bg2">
+                  <a:lumMod val="90000"/>
+                </a:schemeClr>
+              </a:solidFill>
+            </a:ln>
+          </p:spPr>
+          <p:style>
+            <a:lnRef idx="3">
+              <a:schemeClr val="dk1"/>
+            </a:lnRef>
+            <a:fillRef idx="0">
+              <a:schemeClr val="dk1"/>
+            </a:fillRef>
+            <a:effectRef idx="2">
+              <a:schemeClr val="dk1"/>
+            </a:effectRef>
+            <a:fontRef idx="minor">
+              <a:schemeClr val="tx1"/>
+            </a:fontRef>
+          </p:style>
+        </p:cxnSp>
+        <p:cxnSp>
+          <p:nvCxnSpPr>
+            <p:cNvPr id="55" name="Straight Connector 54">
+              <a:extLst>
+                <a:ext uri="{FF2B5EF4-FFF2-40B4-BE49-F238E27FC236}">
+                  <a16:creationId xmlns:a16="http://schemas.microsoft.com/office/drawing/2014/main" id="{FD8E2FC5-57D8-A17E-D1F5-F1C6D358580B}"/>
+                </a:ext>
+              </a:extLst>
+            </p:cNvPr>
+            <p:cNvCxnSpPr>
+              <a:cxnSpLocks/>
+            </p:cNvCxnSpPr>
+            <p:nvPr/>
+          </p:nvCxnSpPr>
+          <p:spPr>
+            <a:xfrm flipH="1" flipV="1">
+              <a:off x="3724070" y="5343186"/>
+              <a:ext cx="143273" cy="5845"/>
+            </a:xfrm>
+            <a:prstGeom prst="line">
+              <a:avLst/>
+            </a:prstGeom>
+            <a:ln>
+              <a:solidFill>
+                <a:schemeClr val="bg2">
+                  <a:lumMod val="90000"/>
+                </a:schemeClr>
+              </a:solidFill>
+            </a:ln>
+          </p:spPr>
+          <p:style>
+            <a:lnRef idx="3">
+              <a:schemeClr val="dk1"/>
+            </a:lnRef>
+            <a:fillRef idx="0">
+              <a:schemeClr val="dk1"/>
+            </a:fillRef>
+            <a:effectRef idx="2">
+              <a:schemeClr val="dk1"/>
+            </a:effectRef>
+            <a:fontRef idx="minor">
+              <a:schemeClr val="tx1"/>
+            </a:fontRef>
+          </p:style>
+        </p:cxnSp>
+      </p:grpSp>
     </p:spTree>
     <p:extLst>
       <p:ext uri="{BB962C8B-B14F-4D97-AF65-F5344CB8AC3E}">

</xml_diff>